<commit_message>
introduction to databases -- slides
</commit_message>
<xml_diff>
--- a/databases/databases_slides.pptx
+++ b/databases/databases_slides.pptx
@@ -5,7 +5,7 @@
     <p:sldMasterId id="2147483834" r:id="rId1"/>
   </p:sldMasterIdLst>
   <p:notesMasterIdLst>
-    <p:notesMasterId r:id="rId12"/>
+    <p:notesMasterId r:id="rId13"/>
   </p:notesMasterIdLst>
   <p:sldIdLst>
     <p:sldId id="256" r:id="rId2"/>
@@ -14,10 +14,11 @@
     <p:sldId id="284" r:id="rId5"/>
     <p:sldId id="285" r:id="rId6"/>
     <p:sldId id="287" r:id="rId7"/>
-    <p:sldId id="288" r:id="rId8"/>
-    <p:sldId id="289" r:id="rId9"/>
-    <p:sldId id="290" r:id="rId10"/>
-    <p:sldId id="291" r:id="rId11"/>
+    <p:sldId id="289" r:id="rId8"/>
+    <p:sldId id="290" r:id="rId9"/>
+    <p:sldId id="291" r:id="rId10"/>
+    <p:sldId id="288" r:id="rId11"/>
+    <p:sldId id="292" r:id="rId12"/>
   </p:sldIdLst>
   <p:sldSz cx="12192000" cy="6858000"/>
   <p:notesSz cx="6858000" cy="9144000"/>
@@ -227,7 +228,7 @@
           <a:p>
             <a:fld id="{FB4ABF83-DE1D-439A-9038-821E6E7BE630}" type="datetimeFigureOut">
               <a:rPr lang="en-US" smtClean="0"/>
-              <a:t>8/19/2020</a:t>
+              <a:t>8/20/2020</a:t>
             </a:fld>
             <a:endParaRPr lang="en-US"/>
           </a:p>
@@ -649,6 +650,94 @@
 </p:notes>
 </file>
 
+<file path=ppt/notesSlides/notesSlide10.xml><?xml version="1.0" encoding="utf-8"?>
+<p:notes xmlns:a="http://schemas.openxmlformats.org/drawingml/2006/main" xmlns:r="http://schemas.openxmlformats.org/officeDocument/2006/relationships" xmlns:p="http://schemas.openxmlformats.org/presentationml/2006/main">
+  <p:cSld>
+    <p:spTree>
+      <p:nvGrpSpPr>
+        <p:cNvPr id="1" name=""/>
+        <p:cNvGrpSpPr/>
+        <p:nvPr/>
+      </p:nvGrpSpPr>
+      <p:grpSpPr>
+        <a:xfrm>
+          <a:off x="0" y="0"/>
+          <a:ext cx="0" cy="0"/>
+          <a:chOff x="0" y="0"/>
+          <a:chExt cx="0" cy="0"/>
+        </a:xfrm>
+      </p:grpSpPr>
+      <p:sp>
+        <p:nvSpPr>
+          <p:cNvPr id="2" name="Slide Image Placeholder 1"/>
+          <p:cNvSpPr>
+            <a:spLocks noGrp="1" noRot="1" noChangeAspect="1"/>
+          </p:cNvSpPr>
+          <p:nvPr>
+            <p:ph type="sldImg"/>
+          </p:nvPr>
+        </p:nvSpPr>
+        <p:spPr/>
+      </p:sp>
+      <p:sp>
+        <p:nvSpPr>
+          <p:cNvPr id="3" name="Notes Placeholder 2"/>
+          <p:cNvSpPr>
+            <a:spLocks noGrp="1"/>
+          </p:cNvSpPr>
+          <p:nvPr>
+            <p:ph type="body" idx="1"/>
+          </p:nvPr>
+        </p:nvSpPr>
+        <p:spPr/>
+        <p:txBody>
+          <a:bodyPr/>
+          <a:lstStyle/>
+          <a:p>
+            <a:pPr marL="171450" indent="-171450">
+              <a:buFont typeface="Wingdings" panose="05000000000000000000" pitchFamily="2" charset="2"/>
+              <a:buChar char="Ø"/>
+            </a:pPr>
+            <a:endParaRPr lang="en-US" baseline="0" dirty="0" smtClean="0"/>
+          </a:p>
+        </p:txBody>
+      </p:sp>
+      <p:sp>
+        <p:nvSpPr>
+          <p:cNvPr id="4" name="Slide Number Placeholder 3"/>
+          <p:cNvSpPr>
+            <a:spLocks noGrp="1"/>
+          </p:cNvSpPr>
+          <p:nvPr>
+            <p:ph type="sldNum" sz="quarter" idx="10"/>
+          </p:nvPr>
+        </p:nvSpPr>
+        <p:spPr/>
+        <p:txBody>
+          <a:bodyPr/>
+          <a:lstStyle/>
+          <a:p>
+            <a:fld id="{AE1DE67C-C920-44E4-BE40-876EA236BA1A}" type="slidenum">
+              <a:rPr lang="en-US" smtClean="0"/>
+              <a:t>11</a:t>
+            </a:fld>
+            <a:endParaRPr lang="en-US"/>
+          </a:p>
+        </p:txBody>
+      </p:sp>
+    </p:spTree>
+    <p:extLst>
+      <p:ext uri="{BB962C8B-B14F-4D97-AF65-F5344CB8AC3E}">
+        <p14:creationId xmlns:p14="http://schemas.microsoft.com/office/powerpoint/2010/main" val="1570150243"/>
+      </p:ext>
+    </p:extLst>
+  </p:cSld>
+  <p:clrMapOvr>
+    <a:masterClrMapping/>
+  </p:clrMapOvr>
+</p:notes>
+</file>
+
 <file path=ppt/notesSlides/notesSlide2.xml><?xml version="1.0" encoding="utf-8"?>
 <p:notes xmlns:a="http://schemas.openxmlformats.org/drawingml/2006/main" xmlns:r="http://schemas.openxmlformats.org/officeDocument/2006/relationships" xmlns:p="http://schemas.openxmlformats.org/presentationml/2006/main">
   <p:cSld>
@@ -1171,20 +1260,7 @@
               <a:buFont typeface="Wingdings" panose="05000000000000000000" pitchFamily="2" charset="2"/>
               <a:buChar char="Ø"/>
             </a:pPr>
-            <a:r>
-              <a:rPr lang="en-US" baseline="0" dirty="0" smtClean="0"/>
-              <a:t>SQL is a standardized language for managing RDBMS</a:t>
-            </a:r>
-          </a:p>
-          <a:p>
-            <a:pPr marL="171450" indent="-171450">
-              <a:buFont typeface="Wingdings" panose="05000000000000000000" pitchFamily="2" charset="2"/>
-              <a:buChar char="Ø"/>
-            </a:pPr>
-            <a:r>
-              <a:rPr lang="en-US" baseline="0" dirty="0" smtClean="0"/>
-              <a:t>Different flavors like MySQL or Oracle SQL are akin to dialects of the same language</a:t>
-            </a:r>
+            <a:endParaRPr lang="en-US" baseline="0" dirty="0" smtClean="0"/>
           </a:p>
         </p:txBody>
       </p:sp>
@@ -1214,7 +1290,7 @@
     </p:spTree>
     <p:extLst>
       <p:ext uri="{BB962C8B-B14F-4D97-AF65-F5344CB8AC3E}">
-        <p14:creationId xmlns:p14="http://schemas.microsoft.com/office/powerpoint/2010/main" val="1004342444"/>
+        <p14:creationId xmlns:p14="http://schemas.microsoft.com/office/powerpoint/2010/main" val="646505092"/>
       </p:ext>
     </p:extLst>
   </p:cSld>
@@ -1272,44 +1348,7 @@
               <a:buFont typeface="Wingdings" panose="05000000000000000000" pitchFamily="2" charset="2"/>
               <a:buChar char="Ø"/>
             </a:pPr>
-            <a:r>
-              <a:rPr lang="en-US" baseline="0" dirty="0" smtClean="0"/>
-              <a:t>SQL is a standardized language for managing RDBMS</a:t>
-            </a:r>
-          </a:p>
-          <a:p>
-            <a:pPr marL="171450" indent="-171450">
-              <a:buFont typeface="Wingdings" panose="05000000000000000000" pitchFamily="2" charset="2"/>
-              <a:buChar char="Ø"/>
-            </a:pPr>
             <a:endParaRPr lang="en-US" baseline="0" dirty="0" smtClean="0"/>
-          </a:p>
-          <a:p>
-            <a:pPr marL="171450" indent="-171450">
-              <a:buFont typeface="Wingdings" panose="05000000000000000000" pitchFamily="2" charset="2"/>
-              <a:buChar char="Ø"/>
-            </a:pPr>
-            <a:r>
-              <a:rPr lang="en-US" baseline="0" dirty="0" smtClean="0"/>
-              <a:t>Different flavors like MySQL or Oracle SQL are akin to dialects of the same language</a:t>
-            </a:r>
-          </a:p>
-          <a:p>
-            <a:pPr marL="171450" indent="-171450">
-              <a:buFont typeface="Wingdings" panose="05000000000000000000" pitchFamily="2" charset="2"/>
-              <a:buChar char="Ø"/>
-            </a:pPr>
-            <a:endParaRPr lang="en-US" baseline="0" dirty="0" smtClean="0"/>
-          </a:p>
-          <a:p>
-            <a:pPr marL="171450" indent="-171450">
-              <a:buFont typeface="Wingdings" panose="05000000000000000000" pitchFamily="2" charset="2"/>
-              <a:buChar char="Ø"/>
-            </a:pPr>
-            <a:r>
-              <a:rPr lang="en-US" baseline="0" dirty="0" smtClean="0"/>
-              <a:t>Relational means relations within each row, not between different tables</a:t>
-            </a:r>
           </a:p>
         </p:txBody>
       </p:sp>
@@ -1339,7 +1378,7 @@
     </p:spTree>
     <p:extLst>
       <p:ext uri="{BB962C8B-B14F-4D97-AF65-F5344CB8AC3E}">
-        <p14:creationId xmlns:p14="http://schemas.microsoft.com/office/powerpoint/2010/main" val="646505092"/>
+        <p14:creationId xmlns:p14="http://schemas.microsoft.com/office/powerpoint/2010/main" val="3184359657"/>
       </p:ext>
     </p:extLst>
   </p:cSld>
@@ -1397,44 +1436,7 @@
               <a:buFont typeface="Wingdings" panose="05000000000000000000" pitchFamily="2" charset="2"/>
               <a:buChar char="Ø"/>
             </a:pPr>
-            <a:r>
-              <a:rPr lang="en-US" baseline="0" dirty="0" smtClean="0"/>
-              <a:t>SQL is a standardized language for managing RDBMS</a:t>
-            </a:r>
-          </a:p>
-          <a:p>
-            <a:pPr marL="171450" indent="-171450">
-              <a:buFont typeface="Wingdings" panose="05000000000000000000" pitchFamily="2" charset="2"/>
-              <a:buChar char="Ø"/>
-            </a:pPr>
             <a:endParaRPr lang="en-US" baseline="0" dirty="0" smtClean="0"/>
-          </a:p>
-          <a:p>
-            <a:pPr marL="171450" indent="-171450">
-              <a:buFont typeface="Wingdings" panose="05000000000000000000" pitchFamily="2" charset="2"/>
-              <a:buChar char="Ø"/>
-            </a:pPr>
-            <a:r>
-              <a:rPr lang="en-US" baseline="0" dirty="0" smtClean="0"/>
-              <a:t>Different flavors like MySQL or Oracle SQL are akin to dialects of the same language</a:t>
-            </a:r>
-          </a:p>
-          <a:p>
-            <a:pPr marL="171450" indent="-171450">
-              <a:buFont typeface="Wingdings" panose="05000000000000000000" pitchFamily="2" charset="2"/>
-              <a:buChar char="Ø"/>
-            </a:pPr>
-            <a:endParaRPr lang="en-US" baseline="0" dirty="0" smtClean="0"/>
-          </a:p>
-          <a:p>
-            <a:pPr marL="171450" indent="-171450">
-              <a:buFont typeface="Wingdings" panose="05000000000000000000" pitchFamily="2" charset="2"/>
-              <a:buChar char="Ø"/>
-            </a:pPr>
-            <a:r>
-              <a:rPr lang="en-US" baseline="0" dirty="0" smtClean="0"/>
-              <a:t>Relational means relations within each row, not between different tables</a:t>
-            </a:r>
           </a:p>
         </p:txBody>
       </p:sp>
@@ -1464,7 +1466,7 @@
     </p:spTree>
     <p:extLst>
       <p:ext uri="{BB962C8B-B14F-4D97-AF65-F5344CB8AC3E}">
-        <p14:creationId xmlns:p14="http://schemas.microsoft.com/office/powerpoint/2010/main" val="3184359657"/>
+        <p14:creationId xmlns:p14="http://schemas.microsoft.com/office/powerpoint/2010/main" val="1733271830"/>
       </p:ext>
     </p:extLst>
   </p:cSld>
@@ -1522,44 +1524,7 @@
               <a:buFont typeface="Wingdings" panose="05000000000000000000" pitchFamily="2" charset="2"/>
               <a:buChar char="Ø"/>
             </a:pPr>
-            <a:r>
-              <a:rPr lang="en-US" baseline="0" dirty="0" smtClean="0"/>
-              <a:t>SQL is a standardized language for managing RDBMS</a:t>
-            </a:r>
-          </a:p>
-          <a:p>
-            <a:pPr marL="171450" indent="-171450">
-              <a:buFont typeface="Wingdings" panose="05000000000000000000" pitchFamily="2" charset="2"/>
-              <a:buChar char="Ø"/>
-            </a:pPr>
             <a:endParaRPr lang="en-US" baseline="0" dirty="0" smtClean="0"/>
-          </a:p>
-          <a:p>
-            <a:pPr marL="171450" indent="-171450">
-              <a:buFont typeface="Wingdings" panose="05000000000000000000" pitchFamily="2" charset="2"/>
-              <a:buChar char="Ø"/>
-            </a:pPr>
-            <a:r>
-              <a:rPr lang="en-US" baseline="0" dirty="0" smtClean="0"/>
-              <a:t>Different flavors like MySQL or Oracle SQL are akin to dialects of the same language</a:t>
-            </a:r>
-          </a:p>
-          <a:p>
-            <a:pPr marL="171450" indent="-171450">
-              <a:buFont typeface="Wingdings" panose="05000000000000000000" pitchFamily="2" charset="2"/>
-              <a:buChar char="Ø"/>
-            </a:pPr>
-            <a:endParaRPr lang="en-US" baseline="0" dirty="0" smtClean="0"/>
-          </a:p>
-          <a:p>
-            <a:pPr marL="171450" indent="-171450">
-              <a:buFont typeface="Wingdings" panose="05000000000000000000" pitchFamily="2" charset="2"/>
-              <a:buChar char="Ø"/>
-            </a:pPr>
-            <a:r>
-              <a:rPr lang="en-US" baseline="0" dirty="0" smtClean="0"/>
-              <a:t>Relational means relations within each row, not between different tables</a:t>
-            </a:r>
           </a:p>
         </p:txBody>
       </p:sp>
@@ -1589,7 +1554,7 @@
     </p:spTree>
     <p:extLst>
       <p:ext uri="{BB962C8B-B14F-4D97-AF65-F5344CB8AC3E}">
-        <p14:creationId xmlns:p14="http://schemas.microsoft.com/office/powerpoint/2010/main" val="1733271830"/>
+        <p14:creationId xmlns:p14="http://schemas.microsoft.com/office/powerpoint/2010/main" val="1004342444"/>
       </p:ext>
     </p:extLst>
   </p:cSld>
@@ -1730,7 +1695,7 @@
           <a:p>
             <a:fld id="{BAEB4113-CC9A-4791-AE56-CF423D86ED9A}" type="datetimeFigureOut">
               <a:rPr lang="en-US" smtClean="0"/>
-              <a:t>8/19/2020</a:t>
+              <a:t>8/20/2020</a:t>
             </a:fld>
             <a:endParaRPr lang="en-US"/>
           </a:p>
@@ -1900,7 +1865,7 @@
           <a:p>
             <a:fld id="{BAEB4113-CC9A-4791-AE56-CF423D86ED9A}" type="datetimeFigureOut">
               <a:rPr lang="en-US" smtClean="0"/>
-              <a:t>8/19/2020</a:t>
+              <a:t>8/20/2020</a:t>
             </a:fld>
             <a:endParaRPr lang="en-US"/>
           </a:p>
@@ -2080,7 +2045,7 @@
           <a:p>
             <a:fld id="{BAEB4113-CC9A-4791-AE56-CF423D86ED9A}" type="datetimeFigureOut">
               <a:rPr lang="en-US" smtClean="0"/>
-              <a:t>8/19/2020</a:t>
+              <a:t>8/20/2020</a:t>
             </a:fld>
             <a:endParaRPr lang="en-US"/>
           </a:p>
@@ -2250,7 +2215,7 @@
           <a:p>
             <a:fld id="{BAEB4113-CC9A-4791-AE56-CF423D86ED9A}" type="datetimeFigureOut">
               <a:rPr lang="en-US" smtClean="0"/>
-              <a:t>8/19/2020</a:t>
+              <a:t>8/20/2020</a:t>
             </a:fld>
             <a:endParaRPr lang="en-US"/>
           </a:p>
@@ -2496,7 +2461,7 @@
           <a:p>
             <a:fld id="{BAEB4113-CC9A-4791-AE56-CF423D86ED9A}" type="datetimeFigureOut">
               <a:rPr lang="en-US" smtClean="0"/>
-              <a:t>8/19/2020</a:t>
+              <a:t>8/20/2020</a:t>
             </a:fld>
             <a:endParaRPr lang="en-US"/>
           </a:p>
@@ -2728,7 +2693,7 @@
           <a:p>
             <a:fld id="{BAEB4113-CC9A-4791-AE56-CF423D86ED9A}" type="datetimeFigureOut">
               <a:rPr lang="en-US" smtClean="0"/>
-              <a:t>8/19/2020</a:t>
+              <a:t>8/20/2020</a:t>
             </a:fld>
             <a:endParaRPr lang="en-US"/>
           </a:p>
@@ -3095,7 +3060,7 @@
           <a:p>
             <a:fld id="{BAEB4113-CC9A-4791-AE56-CF423D86ED9A}" type="datetimeFigureOut">
               <a:rPr lang="en-US" smtClean="0"/>
-              <a:t>8/19/2020</a:t>
+              <a:t>8/20/2020</a:t>
             </a:fld>
             <a:endParaRPr lang="en-US"/>
           </a:p>
@@ -3213,7 +3178,7 @@
           <a:p>
             <a:fld id="{BAEB4113-CC9A-4791-AE56-CF423D86ED9A}" type="datetimeFigureOut">
               <a:rPr lang="en-US" smtClean="0"/>
-              <a:t>8/19/2020</a:t>
+              <a:t>8/20/2020</a:t>
             </a:fld>
             <a:endParaRPr lang="en-US"/>
           </a:p>
@@ -3308,7 +3273,7 @@
           <a:p>
             <a:fld id="{BAEB4113-CC9A-4791-AE56-CF423D86ED9A}" type="datetimeFigureOut">
               <a:rPr lang="en-US" smtClean="0"/>
-              <a:t>8/19/2020</a:t>
+              <a:t>8/20/2020</a:t>
             </a:fld>
             <a:endParaRPr lang="en-US"/>
           </a:p>
@@ -3585,7 +3550,7 @@
           <a:p>
             <a:fld id="{BAEB4113-CC9A-4791-AE56-CF423D86ED9A}" type="datetimeFigureOut">
               <a:rPr lang="en-US" smtClean="0"/>
-              <a:t>8/19/2020</a:t>
+              <a:t>8/20/2020</a:t>
             </a:fld>
             <a:endParaRPr lang="en-US"/>
           </a:p>
@@ -3838,7 +3803,7 @@
           <a:p>
             <a:fld id="{BAEB4113-CC9A-4791-AE56-CF423D86ED9A}" type="datetimeFigureOut">
               <a:rPr lang="en-US" smtClean="0"/>
-              <a:t>8/19/2020</a:t>
+              <a:t>8/20/2020</a:t>
             </a:fld>
             <a:endParaRPr lang="en-US"/>
           </a:p>
@@ -4051,7 +4016,7 @@
           <a:p>
             <a:fld id="{BAEB4113-CC9A-4791-AE56-CF423D86ED9A}" type="datetimeFigureOut">
               <a:rPr lang="en-US" smtClean="0"/>
-              <a:t>8/19/2020</a:t>
+              <a:t>8/20/2020</a:t>
             </a:fld>
             <a:endParaRPr lang="en-US"/>
           </a:p>
@@ -4559,7 +4524,7 @@
           <a:p>
             <a:r>
               <a:rPr lang="en-US" sz="3800" dirty="0" smtClean="0"/>
-              <a:t>SQL: Composite Keys</a:t>
+              <a:t>Summary</a:t>
             </a:r>
             <a:endParaRPr lang="en-US" sz="3800" dirty="0"/>
           </a:p>
@@ -4600,23 +4565,7 @@
             </a:pPr>
             <a:r>
               <a:rPr lang="en-US" sz="2400" dirty="0" smtClean="0"/>
-              <a:t>This one is easy, we can uniquely identify a row with two columns, which totally makes sense in the case of the </a:t>
-            </a:r>
-            <a:r>
-              <a:rPr lang="en-US" sz="2400" b="1" dirty="0" smtClean="0"/>
-              <a:t>`</a:t>
-            </a:r>
-            <a:r>
-              <a:rPr lang="en-US" sz="2400" b="1" dirty="0" err="1" smtClean="0"/>
-              <a:t>stock_info</a:t>
-            </a:r>
-            <a:r>
-              <a:rPr lang="en-US" sz="2400" b="1" dirty="0" smtClean="0"/>
-              <a:t>`</a:t>
-            </a:r>
-            <a:r>
-              <a:rPr lang="en-US" sz="2400" dirty="0" smtClean="0"/>
-              <a:t> table:</a:t>
+              <a:t>DBMS provide an interface between the user and database</a:t>
             </a:r>
           </a:p>
           <a:p>
@@ -4631,7 +4580,10 @@
                 <a:spcPts val="1200"/>
               </a:spcAft>
             </a:pPr>
-            <a:endParaRPr lang="en-US" sz="2400" dirty="0" smtClean="0"/>
+            <a:r>
+              <a:rPr lang="en-US" sz="2400" dirty="0" smtClean="0"/>
+              <a:t>Key functions of DBMS is CRUD operations + maintenance, administration, security</a:t>
+            </a:r>
           </a:p>
           <a:p>
             <a:pPr>
@@ -4645,7 +4597,10 @@
                 <a:spcPts val="1200"/>
               </a:spcAft>
             </a:pPr>
-            <a:endParaRPr lang="en-US" sz="2400" dirty="0" smtClean="0"/>
+            <a:r>
+              <a:rPr lang="en-US" sz="2400" dirty="0" smtClean="0"/>
+              <a:t>Relational databases are synonymous to SQL represent the data as tables with rows and columns </a:t>
+            </a:r>
           </a:p>
           <a:p>
             <a:pPr>
@@ -4659,6 +4614,83 @@
                 <a:spcPts val="1200"/>
               </a:spcAft>
             </a:pPr>
+            <a:r>
+              <a:rPr lang="en-US" sz="2400" dirty="0" smtClean="0"/>
+              <a:t>SQL is standardized, but there are different dialects</a:t>
+            </a:r>
+          </a:p>
+          <a:p>
+            <a:pPr>
+              <a:lnSpc>
+                <a:spcPct val="100000"/>
+              </a:lnSpc>
+              <a:spcBef>
+                <a:spcPts val="1200"/>
+              </a:spcBef>
+              <a:spcAft>
+                <a:spcPts val="1200"/>
+              </a:spcAft>
+            </a:pPr>
+            <a:r>
+              <a:rPr lang="en-US" sz="2400" dirty="0" smtClean="0"/>
+              <a:t>Non-relational (NoSQL) databases admit any representation, however the language is DBMS-specific</a:t>
+            </a:r>
+            <a:endParaRPr lang="en-US" sz="2400" dirty="0"/>
+          </a:p>
+          <a:p>
+            <a:pPr>
+              <a:lnSpc>
+                <a:spcPct val="100000"/>
+              </a:lnSpc>
+              <a:spcBef>
+                <a:spcPts val="1200"/>
+              </a:spcBef>
+              <a:spcAft>
+                <a:spcPts val="1200"/>
+              </a:spcAft>
+            </a:pPr>
+            <a:endParaRPr lang="en-US" sz="2400" dirty="0" smtClean="0"/>
+          </a:p>
+          <a:p>
+            <a:pPr>
+              <a:lnSpc>
+                <a:spcPct val="100000"/>
+              </a:lnSpc>
+              <a:spcBef>
+                <a:spcPts val="1200"/>
+              </a:spcBef>
+              <a:spcAft>
+                <a:spcPts val="1200"/>
+              </a:spcAft>
+            </a:pPr>
+            <a:endParaRPr lang="en-US" sz="2400" dirty="0"/>
+          </a:p>
+          <a:p>
+            <a:pPr>
+              <a:lnSpc>
+                <a:spcPct val="100000"/>
+              </a:lnSpc>
+              <a:spcBef>
+                <a:spcPts val="1200"/>
+              </a:spcBef>
+              <a:spcAft>
+                <a:spcPts val="1200"/>
+              </a:spcAft>
+            </a:pPr>
+            <a:endParaRPr lang="en-US" sz="2400" dirty="0" smtClean="0"/>
+          </a:p>
+          <a:p>
+            <a:pPr>
+              <a:lnSpc>
+                <a:spcPct val="100000"/>
+              </a:lnSpc>
+              <a:spcBef>
+                <a:spcPts val="1200"/>
+              </a:spcBef>
+              <a:spcAft>
+                <a:spcPts val="1200"/>
+              </a:spcAft>
+            </a:pPr>
             <a:endParaRPr lang="en-US" sz="2400" dirty="0"/>
           </a:p>
           <a:p>
@@ -4716,6 +4748,20 @@
                 <a:spcPts val="1200"/>
               </a:spcAft>
             </a:pPr>
+            <a:endParaRPr lang="en-US" sz="2400" dirty="0"/>
+          </a:p>
+          <a:p>
+            <a:pPr>
+              <a:lnSpc>
+                <a:spcPct val="100000"/>
+              </a:lnSpc>
+              <a:spcBef>
+                <a:spcPts val="1200"/>
+              </a:spcBef>
+              <a:spcAft>
+                <a:spcPts val="1200"/>
+              </a:spcAft>
+            </a:pPr>
             <a:endParaRPr lang="en-US" sz="2400" dirty="0" smtClean="0"/>
           </a:p>
           <a:p>
@@ -4731,8 +4777,113 @@
               </a:spcAft>
               <a:buNone/>
             </a:pPr>
-            <a:endParaRPr lang="en-US" sz="2400" dirty="0"/>
-          </a:p>
+            <a:endParaRPr lang="en-US" sz="2400" dirty="0" smtClean="0"/>
+          </a:p>
+          <a:p>
+            <a:pPr marL="0" indent="0">
+              <a:lnSpc>
+                <a:spcPct val="100000"/>
+              </a:lnSpc>
+              <a:spcBef>
+                <a:spcPts val="1200"/>
+              </a:spcBef>
+              <a:spcAft>
+                <a:spcPts val="1200"/>
+              </a:spcAft>
+              <a:buNone/>
+            </a:pPr>
+            <a:endParaRPr lang="en-US" sz="2400" dirty="0" smtClean="0"/>
+          </a:p>
+        </p:txBody>
+      </p:sp>
+    </p:spTree>
+    <p:extLst>
+      <p:ext uri="{BB962C8B-B14F-4D97-AF65-F5344CB8AC3E}">
+        <p14:creationId xmlns:p14="http://schemas.microsoft.com/office/powerpoint/2010/main" val="2019232606"/>
+      </p:ext>
+    </p:extLst>
+  </p:cSld>
+  <p:clrMapOvr>
+    <a:masterClrMapping/>
+  </p:clrMapOvr>
+  <p:timing>
+    <p:tnLst>
+      <p:par>
+        <p:cTn id="1" dur="indefinite" restart="never" nodeType="tmRoot"/>
+      </p:par>
+    </p:tnLst>
+  </p:timing>
+</p:sld>
+</file>
+
+<file path=ppt/slides/slide11.xml><?xml version="1.0" encoding="utf-8"?>
+<p:sld xmlns:a="http://schemas.openxmlformats.org/drawingml/2006/main" xmlns:r="http://schemas.openxmlformats.org/officeDocument/2006/relationships" xmlns:p="http://schemas.openxmlformats.org/presentationml/2006/main">
+  <p:cSld>
+    <p:spTree>
+      <p:nvGrpSpPr>
+        <p:cNvPr id="1" name=""/>
+        <p:cNvGrpSpPr/>
+        <p:nvPr/>
+      </p:nvGrpSpPr>
+      <p:grpSpPr>
+        <a:xfrm>
+          <a:off x="0" y="0"/>
+          <a:ext cx="0" cy="0"/>
+          <a:chOff x="0" y="0"/>
+          <a:chExt cx="0" cy="0"/>
+        </a:xfrm>
+      </p:grpSpPr>
+      <p:sp>
+        <p:nvSpPr>
+          <p:cNvPr id="2" name="Title 1"/>
+          <p:cNvSpPr>
+            <a:spLocks noGrp="1"/>
+          </p:cNvSpPr>
+          <p:nvPr>
+            <p:ph type="title"/>
+          </p:nvPr>
+        </p:nvSpPr>
+        <p:spPr>
+          <a:xfrm>
+            <a:off x="838200" y="1"/>
+            <a:ext cx="10515600" cy="876300"/>
+          </a:xfrm>
+        </p:spPr>
+        <p:txBody>
+          <a:bodyPr>
+            <a:normAutofit/>
+          </a:bodyPr>
+          <a:lstStyle/>
+          <a:p>
+            <a:r>
+              <a:rPr lang="en-US" sz="3800" dirty="0" smtClean="0"/>
+              <a:t>Links</a:t>
+            </a:r>
+            <a:endParaRPr lang="en-US" sz="3800" dirty="0"/>
+          </a:p>
+        </p:txBody>
+      </p:sp>
+      <p:sp>
+        <p:nvSpPr>
+          <p:cNvPr id="33" name="Content Placeholder 2"/>
+          <p:cNvSpPr>
+            <a:spLocks noGrp="1"/>
+          </p:cNvSpPr>
+          <p:nvPr>
+            <p:ph idx="1"/>
+          </p:nvPr>
+        </p:nvSpPr>
+        <p:spPr>
+          <a:xfrm>
+            <a:off x="838200" y="1312015"/>
+            <a:ext cx="10882745" cy="5312521"/>
+          </a:xfrm>
+        </p:spPr>
+        <p:txBody>
+          <a:bodyPr>
+            <a:normAutofit/>
+          </a:bodyPr>
+          <a:lstStyle/>
           <a:p>
             <a:pPr>
               <a:lnSpc>
@@ -4745,7 +4896,75 @@
                 <a:spcPts val="1200"/>
               </a:spcAft>
             </a:pPr>
+            <a:r>
+              <a:rPr lang="en-US" sz="2400" dirty="0" smtClean="0">
+                <a:hlinkClick r:id="rId3"/>
+              </a:rPr>
+              <a:t>A very good general tutorial about MySQL</a:t>
+            </a:r>
             <a:endParaRPr lang="en-US" sz="2400" dirty="0" smtClean="0"/>
+          </a:p>
+          <a:p>
+            <a:pPr>
+              <a:lnSpc>
+                <a:spcPct val="100000"/>
+              </a:lnSpc>
+              <a:spcBef>
+                <a:spcPts val="1200"/>
+              </a:spcBef>
+              <a:spcAft>
+                <a:spcPts val="1200"/>
+              </a:spcAft>
+            </a:pPr>
+            <a:r>
+              <a:rPr lang="en-US" sz="2400" dirty="0" smtClean="0">
+                <a:hlinkClick r:id="rId4"/>
+              </a:rPr>
+              <a:t>Another good tutorial</a:t>
+            </a:r>
+            <a:endParaRPr lang="en-US" sz="2400" dirty="0" smtClean="0"/>
+          </a:p>
+          <a:p>
+            <a:pPr>
+              <a:lnSpc>
+                <a:spcPct val="100000"/>
+              </a:lnSpc>
+              <a:spcBef>
+                <a:spcPts val="1200"/>
+              </a:spcBef>
+              <a:spcAft>
+                <a:spcPts val="1200"/>
+              </a:spcAft>
+            </a:pPr>
+            <a:endParaRPr lang="en-US" sz="2400" dirty="0"/>
+          </a:p>
+          <a:p>
+            <a:pPr>
+              <a:lnSpc>
+                <a:spcPct val="100000"/>
+              </a:lnSpc>
+              <a:spcBef>
+                <a:spcPts val="1200"/>
+              </a:spcBef>
+              <a:spcAft>
+                <a:spcPts val="1200"/>
+              </a:spcAft>
+            </a:pPr>
+            <a:endParaRPr lang="en-US" sz="2400" dirty="0" smtClean="0"/>
+          </a:p>
+          <a:p>
+            <a:pPr>
+              <a:lnSpc>
+                <a:spcPct val="100000"/>
+              </a:lnSpc>
+              <a:spcBef>
+                <a:spcPts val="1200"/>
+              </a:spcBef>
+              <a:spcAft>
+                <a:spcPts val="1200"/>
+              </a:spcAft>
+            </a:pPr>
+            <a:endParaRPr lang="en-US" sz="2400" dirty="0"/>
           </a:p>
           <a:p>
             <a:pPr marL="0" indent="0">
@@ -4763,6 +4982,62 @@
             <a:endParaRPr lang="en-US" sz="2400" dirty="0" smtClean="0"/>
           </a:p>
           <a:p>
+            <a:pPr>
+              <a:lnSpc>
+                <a:spcPct val="100000"/>
+              </a:lnSpc>
+              <a:spcBef>
+                <a:spcPts val="1200"/>
+              </a:spcBef>
+              <a:spcAft>
+                <a:spcPts val="1200"/>
+              </a:spcAft>
+            </a:pPr>
+            <a:endParaRPr lang="en-US" sz="2400" dirty="0"/>
+          </a:p>
+          <a:p>
+            <a:pPr>
+              <a:lnSpc>
+                <a:spcPct val="100000"/>
+              </a:lnSpc>
+              <a:spcBef>
+                <a:spcPts val="1200"/>
+              </a:spcBef>
+              <a:spcAft>
+                <a:spcPts val="1200"/>
+              </a:spcAft>
+            </a:pPr>
+            <a:endParaRPr lang="en-US" sz="2400" dirty="0" smtClean="0"/>
+          </a:p>
+          <a:p>
+            <a:pPr>
+              <a:lnSpc>
+                <a:spcPct val="100000"/>
+              </a:lnSpc>
+              <a:spcBef>
+                <a:spcPts val="1200"/>
+              </a:spcBef>
+              <a:spcAft>
+                <a:spcPts val="1200"/>
+              </a:spcAft>
+            </a:pPr>
+            <a:endParaRPr lang="en-US" sz="2400" dirty="0"/>
+          </a:p>
+          <a:p>
+            <a:pPr>
+              <a:lnSpc>
+                <a:spcPct val="100000"/>
+              </a:lnSpc>
+              <a:spcBef>
+                <a:spcPts val="1200"/>
+              </a:spcBef>
+              <a:spcAft>
+                <a:spcPts val="1200"/>
+              </a:spcAft>
+            </a:pPr>
+            <a:endParaRPr lang="en-US" sz="2400" dirty="0" smtClean="0"/>
+          </a:p>
+          <a:p>
             <a:pPr marL="0" indent="0">
               <a:lnSpc>
                 <a:spcPct val="100000"/>
@@ -4777,735 +5052,27 @@
             </a:pPr>
             <a:endParaRPr lang="en-US" sz="2400" dirty="0" smtClean="0"/>
           </a:p>
+          <a:p>
+            <a:pPr marL="0" indent="0">
+              <a:lnSpc>
+                <a:spcPct val="100000"/>
+              </a:lnSpc>
+              <a:spcBef>
+                <a:spcPts val="1200"/>
+              </a:spcBef>
+              <a:spcAft>
+                <a:spcPts val="1200"/>
+              </a:spcAft>
+              <a:buNone/>
+            </a:pPr>
+            <a:endParaRPr lang="en-US" sz="2400" dirty="0" smtClean="0"/>
+          </a:p>
         </p:txBody>
       </p:sp>
-      <p:graphicFrame>
-        <p:nvGraphicFramePr>
-          <p:cNvPr id="8" name="Table 7"/>
-          <p:cNvGraphicFramePr>
-            <a:graphicFrameLocks noGrp="1"/>
-          </p:cNvGraphicFramePr>
-          <p:nvPr>
-            <p:extLst>
-              <p:ext uri="{D42A27DB-BD31-4B8C-83A1-F6EECF244321}">
-                <p14:modId xmlns:p14="http://schemas.microsoft.com/office/powerpoint/2010/main" val="763819018"/>
-              </p:ext>
-            </p:extLst>
-          </p:nvPr>
-        </p:nvGraphicFramePr>
-        <p:xfrm>
-          <a:off x="1760166" y="2497577"/>
-          <a:ext cx="4335834" cy="2377440"/>
-        </p:xfrm>
-        <a:graphic>
-          <a:graphicData uri="http://schemas.openxmlformats.org/drawingml/2006/table">
-            <a:tbl>
-              <a:tblPr firstRow="1" bandRow="1">
-                <a:tableStyleId>{5C22544A-7EE6-4342-B048-85BDC9FD1C3A}</a:tableStyleId>
-              </a:tblPr>
-              <a:tblGrid>
-                <a:gridCol w="826851"/>
-                <a:gridCol w="1417536"/>
-                <a:gridCol w="1001949"/>
-                <a:gridCol w="1089498"/>
-              </a:tblGrid>
-              <a:tr h="370840">
-                <a:tc>
-                  <a:txBody>
-                    <a:bodyPr/>
-                    <a:lstStyle/>
-                    <a:p>
-                      <a:pPr algn="l"/>
-                      <a:r>
-                        <a:rPr lang="en-US" sz="2000" dirty="0" smtClean="0">
-                          <a:solidFill>
-                            <a:schemeClr val="bg2">
-                              <a:lumMod val="25000"/>
-                            </a:schemeClr>
-                          </a:solidFill>
-                        </a:rPr>
-                        <a:t>ticker</a:t>
-                      </a:r>
-                      <a:endParaRPr lang="en-US" sz="2000" dirty="0">
-                        <a:solidFill>
-                          <a:schemeClr val="bg2">
-                            <a:lumMod val="25000"/>
-                          </a:schemeClr>
-                        </a:solidFill>
-                      </a:endParaRPr>
-                    </a:p>
-                  </a:txBody>
-                  <a:tcPr>
-                    <a:solidFill>
-                      <a:schemeClr val="accent2">
-                        <a:lumMod val="40000"/>
-                        <a:lumOff val="60000"/>
-                      </a:schemeClr>
-                    </a:solidFill>
-                  </a:tcPr>
-                </a:tc>
-                <a:tc>
-                  <a:txBody>
-                    <a:bodyPr/>
-                    <a:lstStyle/>
-                    <a:p>
-                      <a:pPr algn="ctr"/>
-                      <a:r>
-                        <a:rPr lang="en-US" sz="2000" dirty="0" smtClean="0">
-                          <a:solidFill>
-                            <a:schemeClr val="bg2">
-                              <a:lumMod val="25000"/>
-                            </a:schemeClr>
-                          </a:solidFill>
-                        </a:rPr>
-                        <a:t>date</a:t>
-                      </a:r>
-                      <a:endParaRPr lang="en-US" sz="2000" dirty="0">
-                        <a:solidFill>
-                          <a:schemeClr val="bg2">
-                            <a:lumMod val="25000"/>
-                          </a:schemeClr>
-                        </a:solidFill>
-                      </a:endParaRPr>
-                    </a:p>
-                  </a:txBody>
-                  <a:tcPr>
-                    <a:solidFill>
-                      <a:schemeClr val="accent2">
-                        <a:lumMod val="40000"/>
-                        <a:lumOff val="60000"/>
-                      </a:schemeClr>
-                    </a:solidFill>
-                  </a:tcPr>
-                </a:tc>
-                <a:tc>
-                  <a:txBody>
-                    <a:bodyPr/>
-                    <a:lstStyle/>
-                    <a:p>
-                      <a:pPr algn="ctr"/>
-                      <a:r>
-                        <a:rPr lang="en-US" sz="2000" dirty="0" smtClean="0"/>
-                        <a:t>return</a:t>
-                      </a:r>
-                      <a:endParaRPr lang="en-US" sz="2000" dirty="0"/>
-                    </a:p>
-                  </a:txBody>
-                  <a:tcPr/>
-                </a:tc>
-                <a:tc>
-                  <a:txBody>
-                    <a:bodyPr/>
-                    <a:lstStyle/>
-                    <a:p>
-                      <a:pPr algn="ctr"/>
-                      <a:r>
-                        <a:rPr lang="en-US" sz="2000" dirty="0" smtClean="0"/>
-                        <a:t>price</a:t>
-                      </a:r>
-                      <a:endParaRPr lang="en-US" sz="2000" dirty="0"/>
-                    </a:p>
-                  </a:txBody>
-                  <a:tcPr/>
-                </a:tc>
-              </a:tr>
-              <a:tr h="370840">
-                <a:tc>
-                  <a:txBody>
-                    <a:bodyPr/>
-                    <a:lstStyle/>
-                    <a:p>
-                      <a:pPr algn="l"/>
-                      <a:r>
-                        <a:rPr lang="en-US" sz="2000" dirty="0" smtClean="0"/>
-                        <a:t>AAPL</a:t>
-                      </a:r>
-                      <a:endParaRPr lang="en-US" sz="2000" dirty="0"/>
-                    </a:p>
-                  </a:txBody>
-                  <a:tcPr>
-                    <a:solidFill>
-                      <a:schemeClr val="accent2">
-                        <a:lumMod val="40000"/>
-                        <a:lumOff val="60000"/>
-                      </a:schemeClr>
-                    </a:solidFill>
-                  </a:tcPr>
-                </a:tc>
-                <a:tc>
-                  <a:txBody>
-                    <a:bodyPr/>
-                    <a:lstStyle/>
-                    <a:p>
-                      <a:pPr algn="r"/>
-                      <a:r>
-                        <a:rPr lang="en-US" sz="2000" dirty="0" smtClean="0"/>
-                        <a:t>2020-08-18</a:t>
-                      </a:r>
-                      <a:endParaRPr lang="en-US" sz="2000" dirty="0"/>
-                    </a:p>
-                  </a:txBody>
-                  <a:tcPr>
-                    <a:solidFill>
-                      <a:schemeClr val="accent2">
-                        <a:lumMod val="40000"/>
-                        <a:lumOff val="60000"/>
-                      </a:schemeClr>
-                    </a:solidFill>
-                  </a:tcPr>
-                </a:tc>
-                <a:tc>
-                  <a:txBody>
-                    <a:bodyPr/>
-                    <a:lstStyle/>
-                    <a:p>
-                      <a:pPr algn="r"/>
-                      <a:r>
-                        <a:rPr lang="en-US" sz="2000" dirty="0" smtClean="0"/>
-                        <a:t>0.0083</a:t>
-                      </a:r>
-                      <a:endParaRPr lang="en-US" sz="2000" dirty="0"/>
-                    </a:p>
-                  </a:txBody>
-                  <a:tcPr/>
-                </a:tc>
-                <a:tc>
-                  <a:txBody>
-                    <a:bodyPr/>
-                    <a:lstStyle/>
-                    <a:p>
-                      <a:pPr algn="r"/>
-                      <a:r>
-                        <a:rPr lang="en-US" sz="2000" dirty="0" smtClean="0"/>
-                        <a:t>462.25</a:t>
-                      </a:r>
-                      <a:endParaRPr lang="en-US" sz="2000" dirty="0"/>
-                    </a:p>
-                  </a:txBody>
-                  <a:tcPr/>
-                </a:tc>
-              </a:tr>
-              <a:tr h="370840">
-                <a:tc>
-                  <a:txBody>
-                    <a:bodyPr/>
-                    <a:lstStyle/>
-                    <a:p>
-                      <a:pPr algn="l"/>
-                      <a:r>
-                        <a:rPr lang="en-US" sz="2000" dirty="0" smtClean="0"/>
-                        <a:t>AAPL</a:t>
-                      </a:r>
-                      <a:endParaRPr lang="en-US" sz="2000" dirty="0"/>
-                    </a:p>
-                  </a:txBody>
-                  <a:tcPr>
-                    <a:solidFill>
-                      <a:schemeClr val="accent2">
-                        <a:lumMod val="40000"/>
-                        <a:lumOff val="60000"/>
-                      </a:schemeClr>
-                    </a:solidFill>
-                  </a:tcPr>
-                </a:tc>
-                <a:tc>
-                  <a:txBody>
-                    <a:bodyPr/>
-                    <a:lstStyle/>
-                    <a:p>
-                      <a:pPr algn="r"/>
-                      <a:r>
-                        <a:rPr lang="en-US" sz="2000" dirty="0" smtClean="0"/>
-                        <a:t>2020-08-19</a:t>
-                      </a:r>
-                      <a:endParaRPr lang="en-US" sz="2000" dirty="0"/>
-                    </a:p>
-                  </a:txBody>
-                  <a:tcPr>
-                    <a:solidFill>
-                      <a:schemeClr val="accent2">
-                        <a:lumMod val="40000"/>
-                        <a:lumOff val="60000"/>
-                      </a:schemeClr>
-                    </a:solidFill>
-                  </a:tcPr>
-                </a:tc>
-                <a:tc>
-                  <a:txBody>
-                    <a:bodyPr/>
-                    <a:lstStyle/>
-                    <a:p>
-                      <a:pPr algn="r"/>
-                      <a:r>
-                        <a:rPr lang="en-US" sz="2000" dirty="0" smtClean="0"/>
-                        <a:t>0.0013</a:t>
-                      </a:r>
-                      <a:endParaRPr lang="en-US" sz="2000" dirty="0"/>
-                    </a:p>
-                  </a:txBody>
-                  <a:tcPr/>
-                </a:tc>
-                <a:tc>
-                  <a:txBody>
-                    <a:bodyPr/>
-                    <a:lstStyle/>
-                    <a:p>
-                      <a:pPr algn="r"/>
-                      <a:r>
-                        <a:rPr lang="en-US" sz="2000" dirty="0" smtClean="0"/>
-                        <a:t>462.83</a:t>
-                      </a:r>
-                      <a:endParaRPr lang="en-US" sz="2000" dirty="0"/>
-                    </a:p>
-                  </a:txBody>
-                  <a:tcPr/>
-                </a:tc>
-              </a:tr>
-              <a:tr h="370840">
-                <a:tc>
-                  <a:txBody>
-                    <a:bodyPr/>
-                    <a:lstStyle/>
-                    <a:p>
-                      <a:pPr algn="l"/>
-                      <a:r>
-                        <a:rPr lang="en-US" sz="2000" dirty="0" smtClean="0"/>
-                        <a:t>MSFT</a:t>
-                      </a:r>
-                      <a:endParaRPr lang="en-US" sz="2000" dirty="0"/>
-                    </a:p>
-                  </a:txBody>
-                  <a:tcPr>
-                    <a:solidFill>
-                      <a:schemeClr val="accent2">
-                        <a:lumMod val="40000"/>
-                        <a:lumOff val="60000"/>
-                      </a:schemeClr>
-                    </a:solidFill>
-                  </a:tcPr>
-                </a:tc>
-                <a:tc>
-                  <a:txBody>
-                    <a:bodyPr/>
-                    <a:lstStyle/>
-                    <a:p>
-                      <a:pPr algn="r"/>
-                      <a:r>
-                        <a:rPr lang="en-US" sz="2000" dirty="0" smtClean="0"/>
-                        <a:t>2020-08-18</a:t>
-                      </a:r>
-                      <a:endParaRPr lang="en-US" sz="2000" dirty="0"/>
-                    </a:p>
-                  </a:txBody>
-                  <a:tcPr>
-                    <a:solidFill>
-                      <a:schemeClr val="accent2">
-                        <a:lumMod val="40000"/>
-                        <a:lumOff val="60000"/>
-                      </a:schemeClr>
-                    </a:solidFill>
-                  </a:tcPr>
-                </a:tc>
-                <a:tc>
-                  <a:txBody>
-                    <a:bodyPr/>
-                    <a:lstStyle/>
-                    <a:p>
-                      <a:pPr algn="r"/>
-                      <a:r>
-                        <a:rPr lang="en-US" sz="2000" dirty="0" smtClean="0"/>
-                        <a:t>0.0058</a:t>
-                      </a:r>
-                      <a:endParaRPr lang="en-US" sz="2000" dirty="0"/>
-                    </a:p>
-                  </a:txBody>
-                  <a:tcPr/>
-                </a:tc>
-                <a:tc>
-                  <a:txBody>
-                    <a:bodyPr/>
-                    <a:lstStyle/>
-                    <a:p>
-                      <a:pPr algn="r"/>
-                      <a:r>
-                        <a:rPr lang="en-US" sz="2000" dirty="0" smtClean="0"/>
-                        <a:t>211.49</a:t>
-                      </a:r>
-                      <a:endParaRPr lang="en-US" sz="2000" dirty="0"/>
-                    </a:p>
-                  </a:txBody>
-                  <a:tcPr/>
-                </a:tc>
-              </a:tr>
-              <a:tr h="370840">
-                <a:tc>
-                  <a:txBody>
-                    <a:bodyPr/>
-                    <a:lstStyle/>
-                    <a:p>
-                      <a:pPr algn="l"/>
-                      <a:r>
-                        <a:rPr lang="en-US" sz="2000" dirty="0" smtClean="0"/>
-                        <a:t>MSFT</a:t>
-                      </a:r>
-                      <a:endParaRPr lang="en-US" sz="2000" dirty="0"/>
-                    </a:p>
-                  </a:txBody>
-                  <a:tcPr>
-                    <a:solidFill>
-                      <a:schemeClr val="accent2">
-                        <a:lumMod val="40000"/>
-                        <a:lumOff val="60000"/>
-                      </a:schemeClr>
-                    </a:solidFill>
-                  </a:tcPr>
-                </a:tc>
-                <a:tc>
-                  <a:txBody>
-                    <a:bodyPr/>
-                    <a:lstStyle/>
-                    <a:p>
-                      <a:pPr algn="r"/>
-                      <a:r>
-                        <a:rPr lang="en-US" sz="2000" dirty="0" smtClean="0"/>
-                        <a:t>2020-08-19</a:t>
-                      </a:r>
-                      <a:endParaRPr lang="en-US" sz="2000" dirty="0"/>
-                    </a:p>
-                  </a:txBody>
-                  <a:tcPr>
-                    <a:solidFill>
-                      <a:schemeClr val="accent2">
-                        <a:lumMod val="40000"/>
-                        <a:lumOff val="60000"/>
-                      </a:schemeClr>
-                    </a:solidFill>
-                  </a:tcPr>
-                </a:tc>
-                <a:tc>
-                  <a:txBody>
-                    <a:bodyPr/>
-                    <a:lstStyle/>
-                    <a:p>
-                      <a:pPr algn="r"/>
-                      <a:r>
-                        <a:rPr lang="en-US" sz="2000" dirty="0" smtClean="0"/>
-                        <a:t>-0.0085</a:t>
-                      </a:r>
-                      <a:endParaRPr lang="en-US" sz="2000" dirty="0"/>
-                    </a:p>
-                  </a:txBody>
-                  <a:tcPr/>
-                </a:tc>
-                <a:tc>
-                  <a:txBody>
-                    <a:bodyPr/>
-                    <a:lstStyle/>
-                    <a:p>
-                      <a:pPr algn="r"/>
-                      <a:r>
-                        <a:rPr lang="en-US" sz="2000" dirty="0" smtClean="0"/>
-                        <a:t>209.70</a:t>
-                      </a:r>
-                      <a:endParaRPr lang="en-US" sz="2000" dirty="0"/>
-                    </a:p>
-                  </a:txBody>
-                  <a:tcPr/>
-                </a:tc>
-              </a:tr>
-              <a:tr h="370840">
-                <a:tc>
-                  <a:txBody>
-                    <a:bodyPr/>
-                    <a:lstStyle/>
-                    <a:p>
-                      <a:pPr algn="l"/>
-                      <a:r>
-                        <a:rPr lang="en-US" sz="2000" dirty="0" smtClean="0"/>
-                        <a:t>XOM</a:t>
-                      </a:r>
-                      <a:endParaRPr lang="en-US" sz="2000" dirty="0"/>
-                    </a:p>
-                  </a:txBody>
-                  <a:tcPr>
-                    <a:solidFill>
-                      <a:schemeClr val="accent2">
-                        <a:lumMod val="40000"/>
-                        <a:lumOff val="60000"/>
-                      </a:schemeClr>
-                    </a:solidFill>
-                  </a:tcPr>
-                </a:tc>
-                <a:tc>
-                  <a:txBody>
-                    <a:bodyPr/>
-                    <a:lstStyle/>
-                    <a:p>
-                      <a:pPr algn="r"/>
-                      <a:r>
-                        <a:rPr lang="en-US" sz="2000" dirty="0" smtClean="0"/>
-                        <a:t>2020-08-18</a:t>
-                      </a:r>
-                      <a:endParaRPr lang="en-US" sz="2000" dirty="0"/>
-                    </a:p>
-                  </a:txBody>
-                  <a:tcPr>
-                    <a:solidFill>
-                      <a:schemeClr val="accent2">
-                        <a:lumMod val="40000"/>
-                        <a:lumOff val="60000"/>
-                      </a:schemeClr>
-                    </a:solidFill>
-                  </a:tcPr>
-                </a:tc>
-                <a:tc>
-                  <a:txBody>
-                    <a:bodyPr/>
-                    <a:lstStyle/>
-                    <a:p>
-                      <a:pPr algn="r"/>
-                      <a:r>
-                        <a:rPr lang="en-US" sz="2000" dirty="0" smtClean="0"/>
-                        <a:t>-0.0049</a:t>
-                      </a:r>
-                      <a:endParaRPr lang="en-US" sz="2000" dirty="0"/>
-                    </a:p>
-                  </a:txBody>
-                  <a:tcPr/>
-                </a:tc>
-                <a:tc>
-                  <a:txBody>
-                    <a:bodyPr/>
-                    <a:lstStyle/>
-                    <a:p>
-                      <a:pPr algn="r"/>
-                      <a:r>
-                        <a:rPr lang="en-US" sz="2000" dirty="0" smtClean="0"/>
-                        <a:t>42.43</a:t>
-                      </a:r>
-                      <a:endParaRPr lang="en-US" sz="2000" dirty="0"/>
-                    </a:p>
-                  </a:txBody>
-                  <a:tcPr/>
-                </a:tc>
-              </a:tr>
-            </a:tbl>
-          </a:graphicData>
-        </a:graphic>
-      </p:graphicFrame>
-      <p:graphicFrame>
-        <p:nvGraphicFramePr>
-          <p:cNvPr id="6" name="Table 5"/>
-          <p:cNvGraphicFramePr>
-            <a:graphicFrameLocks noGrp="1"/>
-          </p:cNvGraphicFramePr>
-          <p:nvPr>
-            <p:extLst>
-              <p:ext uri="{D42A27DB-BD31-4B8C-83A1-F6EECF244321}">
-                <p14:modId xmlns:p14="http://schemas.microsoft.com/office/powerpoint/2010/main" val="4061275170"/>
-              </p:ext>
-            </p:extLst>
-          </p:nvPr>
-        </p:nvGraphicFramePr>
-        <p:xfrm>
-          <a:off x="6800273" y="2497577"/>
-          <a:ext cx="4216398" cy="1584960"/>
-        </p:xfrm>
-        <a:graphic>
-          <a:graphicData uri="http://schemas.openxmlformats.org/drawingml/2006/table">
-            <a:tbl>
-              <a:tblPr firstRow="1" bandRow="1">
-                <a:tableStyleId>{5C22544A-7EE6-4342-B048-85BDC9FD1C3A}</a:tableStyleId>
-              </a:tblPr>
-              <a:tblGrid>
-                <a:gridCol w="913761"/>
-                <a:gridCol w="1799617"/>
-                <a:gridCol w="1503020"/>
-              </a:tblGrid>
-              <a:tr h="292523">
-                <a:tc>
-                  <a:txBody>
-                    <a:bodyPr/>
-                    <a:lstStyle/>
-                    <a:p>
-                      <a:r>
-                        <a:rPr lang="en-US" sz="2000" dirty="0" smtClean="0"/>
-                        <a:t>ticker</a:t>
-                      </a:r>
-                      <a:endParaRPr lang="en-US" sz="2000" dirty="0"/>
-                    </a:p>
-                  </a:txBody>
-                  <a:tcPr/>
-                </a:tc>
-                <a:tc>
-                  <a:txBody>
-                    <a:bodyPr/>
-                    <a:lstStyle/>
-                    <a:p>
-                      <a:r>
-                        <a:rPr lang="en-US" sz="2000" dirty="0" smtClean="0"/>
-                        <a:t>name</a:t>
-                      </a:r>
-                      <a:endParaRPr lang="en-US" sz="2000" dirty="0"/>
-                    </a:p>
-                  </a:txBody>
-                  <a:tcPr/>
-                </a:tc>
-                <a:tc>
-                  <a:txBody>
-                    <a:bodyPr/>
-                    <a:lstStyle/>
-                    <a:p>
-                      <a:r>
-                        <a:rPr lang="en-US" sz="2000" dirty="0" smtClean="0"/>
-                        <a:t>sector</a:t>
-                      </a:r>
-                      <a:endParaRPr lang="en-US" sz="2000" dirty="0"/>
-                    </a:p>
-                  </a:txBody>
-                  <a:tcPr/>
-                </a:tc>
-              </a:tr>
-              <a:tr h="292523">
-                <a:tc>
-                  <a:txBody>
-                    <a:bodyPr/>
-                    <a:lstStyle/>
-                    <a:p>
-                      <a:r>
-                        <a:rPr lang="en-US" sz="2000" dirty="0" smtClean="0"/>
-                        <a:t>AAPL</a:t>
-                      </a:r>
-                      <a:endParaRPr lang="en-US" sz="2000" dirty="0"/>
-                    </a:p>
-                  </a:txBody>
-                  <a:tcPr/>
-                </a:tc>
-                <a:tc>
-                  <a:txBody>
-                    <a:bodyPr/>
-                    <a:lstStyle/>
-                    <a:p>
-                      <a:r>
-                        <a:rPr lang="en-US" sz="2000" dirty="0" smtClean="0"/>
-                        <a:t>Apple Inc.</a:t>
-                      </a:r>
-                      <a:endParaRPr lang="en-US" sz="2000" dirty="0"/>
-                    </a:p>
-                  </a:txBody>
-                  <a:tcPr/>
-                </a:tc>
-                <a:tc>
-                  <a:txBody>
-                    <a:bodyPr/>
-                    <a:lstStyle/>
-                    <a:p>
-                      <a:r>
-                        <a:rPr lang="en-US" sz="2000" dirty="0" smtClean="0"/>
-                        <a:t>Technology</a:t>
-                      </a:r>
-                      <a:endParaRPr lang="en-US" sz="2000" dirty="0"/>
-                    </a:p>
-                  </a:txBody>
-                  <a:tcPr/>
-                </a:tc>
-              </a:tr>
-              <a:tr h="292523">
-                <a:tc>
-                  <a:txBody>
-                    <a:bodyPr/>
-                    <a:lstStyle/>
-                    <a:p>
-                      <a:r>
-                        <a:rPr lang="en-US" sz="2000" dirty="0" smtClean="0"/>
-                        <a:t>MSFT</a:t>
-                      </a:r>
-                      <a:endParaRPr lang="en-US" sz="2000" dirty="0"/>
-                    </a:p>
-                  </a:txBody>
-                  <a:tcPr/>
-                </a:tc>
-                <a:tc>
-                  <a:txBody>
-                    <a:bodyPr/>
-                    <a:lstStyle/>
-                    <a:p>
-                      <a:r>
-                        <a:rPr lang="en-US" sz="2000" dirty="0" smtClean="0"/>
-                        <a:t>Microsoft Corp.</a:t>
-                      </a:r>
-                      <a:endParaRPr lang="en-US" sz="2000" dirty="0"/>
-                    </a:p>
-                  </a:txBody>
-                  <a:tcPr/>
-                </a:tc>
-                <a:tc>
-                  <a:txBody>
-                    <a:bodyPr/>
-                    <a:lstStyle/>
-                    <a:p>
-                      <a:r>
-                        <a:rPr lang="en-US" sz="2000" dirty="0" smtClean="0"/>
-                        <a:t>Technology</a:t>
-                      </a:r>
-                      <a:endParaRPr lang="en-US" sz="2000" dirty="0"/>
-                    </a:p>
-                  </a:txBody>
-                  <a:tcPr/>
-                </a:tc>
-              </a:tr>
-              <a:tr h="292523">
-                <a:tc>
-                  <a:txBody>
-                    <a:bodyPr/>
-                    <a:lstStyle/>
-                    <a:p>
-                      <a:r>
-                        <a:rPr lang="en-US" sz="2000" dirty="0" smtClean="0"/>
-                        <a:t>XOM</a:t>
-                      </a:r>
-                      <a:endParaRPr lang="en-US" sz="2000" dirty="0"/>
-                    </a:p>
-                  </a:txBody>
-                  <a:tcPr/>
-                </a:tc>
-                <a:tc>
-                  <a:txBody>
-                    <a:bodyPr/>
-                    <a:lstStyle/>
-                    <a:p>
-                      <a:r>
-                        <a:rPr lang="en-US" sz="2000" dirty="0" smtClean="0"/>
-                        <a:t>ExxonMobil</a:t>
-                      </a:r>
-                      <a:endParaRPr lang="en-US" sz="2000" dirty="0"/>
-                    </a:p>
-                  </a:txBody>
-                  <a:tcPr/>
-                </a:tc>
-                <a:tc>
-                  <a:txBody>
-                    <a:bodyPr/>
-                    <a:lstStyle/>
-                    <a:p>
-                      <a:r>
-                        <a:rPr lang="en-US" sz="2000" dirty="0" smtClean="0"/>
-                        <a:t>Oil &amp; Gas</a:t>
-                      </a:r>
-                      <a:endParaRPr lang="en-US" sz="2000" dirty="0"/>
-                    </a:p>
-                  </a:txBody>
-                  <a:tcPr/>
-                </a:tc>
-              </a:tr>
-            </a:tbl>
-          </a:graphicData>
-        </a:graphic>
-      </p:graphicFrame>
     </p:spTree>
     <p:extLst>
       <p:ext uri="{BB962C8B-B14F-4D97-AF65-F5344CB8AC3E}">
-        <p14:creationId xmlns:p14="http://schemas.microsoft.com/office/powerpoint/2010/main" val="4066648977"/>
+        <p14:creationId xmlns:p14="http://schemas.microsoft.com/office/powerpoint/2010/main" val="374195925"/>
       </p:ext>
     </p:extLst>
   </p:cSld>
@@ -5630,11 +5197,7 @@
             </a:pPr>
             <a:r>
               <a:rPr lang="en-US" sz="2400" dirty="0" smtClean="0"/>
-              <a:t>Overview of databases and database management </a:t>
-            </a:r>
-            <a:r>
-              <a:rPr lang="en-US" sz="2400" dirty="0" smtClean="0"/>
-              <a:t>systems</a:t>
+              <a:t>Overview of databases and database management systems</a:t>
             </a:r>
             <a:endParaRPr lang="en-US" sz="2400" dirty="0"/>
           </a:p>
@@ -5650,7 +5213,6 @@
               <a:rPr lang="en-US" sz="2400" dirty="0" smtClean="0"/>
               <a:t>Key concepts in relational databases</a:t>
             </a:r>
-            <a:endParaRPr lang="en-US" sz="2400" dirty="0" smtClean="0"/>
           </a:p>
           <a:p>
             <a:pPr marL="457200" indent="-457200">
@@ -9105,13 +8667,8 @@
             </a:pPr>
             <a:r>
               <a:rPr lang="en-US" dirty="0" smtClean="0"/>
-              <a:t>DBMS is software providing an interface between user and </a:t>
-            </a:r>
-            <a:r>
-              <a:rPr lang="en-US" dirty="0" smtClean="0"/>
-              <a:t>data:</a:t>
-            </a:r>
-            <a:endParaRPr lang="en-US" dirty="0" smtClean="0"/>
+              <a:t>DBMS is software providing an interface between user and data:</a:t>
+            </a:r>
           </a:p>
           <a:p>
             <a:pPr lvl="1">
@@ -9150,7 +8707,6 @@
               <a:rPr lang="en-US" sz="2800" dirty="0" smtClean="0"/>
               <a:t>languages</a:t>
             </a:r>
-            <a:endParaRPr lang="en-US" sz="2800" dirty="0" smtClean="0"/>
           </a:p>
           <a:p>
             <a:pPr lvl="1">
@@ -9202,7 +8758,6 @@
               <a:rPr lang="en-US" sz="2800" dirty="0" smtClean="0"/>
               <a:t>…</a:t>
             </a:r>
-            <a:endParaRPr lang="en-US" sz="2800" dirty="0" smtClean="0"/>
           </a:p>
           <a:p>
             <a:pPr marL="457200" lvl="1" indent="0">
@@ -9340,11 +8895,7 @@
             </a:pPr>
             <a:r>
               <a:rPr lang="en-US" sz="2400" dirty="0" smtClean="0"/>
-              <a:t>Rows are uniquely identified: </a:t>
-            </a:r>
-            <a:r>
-              <a:rPr lang="en-US" sz="2400" dirty="0" smtClean="0"/>
-              <a:t>`id` (`ticker`) are unique in the left (right) table below</a:t>
+              <a:t>Rows are uniquely identified: `id` (`ticker`) are unique in the left (right) table below</a:t>
             </a:r>
           </a:p>
           <a:p>
@@ -10421,13 +9972,8 @@
             </a:pPr>
             <a:r>
               <a:rPr lang="en-US" sz="2400" dirty="0" smtClean="0"/>
-              <a:t>Data </a:t>
-            </a:r>
-            <a:r>
-              <a:rPr lang="en-US" sz="2400" dirty="0" smtClean="0"/>
-              <a:t>can be organized in any way – no language standard</a:t>
-            </a:r>
-            <a:endParaRPr lang="en-US" sz="2400" dirty="0" smtClean="0"/>
+              <a:t>Data can be organized in any way – no language standard</a:t>
+            </a:r>
           </a:p>
           <a:p>
             <a:pPr>
@@ -10532,7 +10078,6 @@
               <a:rPr lang="en-US" sz="2400" dirty="0" smtClean="0"/>
               <a:t>Examples: MongoDB for storing documents, Oracle NoSQL DB for key-value pairs…</a:t>
             </a:r>
-            <a:endParaRPr lang="en-US" sz="2400" dirty="0" smtClean="0"/>
           </a:p>
         </p:txBody>
       </p:sp>
@@ -11732,7 +11277,7 @@
           <a:p>
             <a:r>
               <a:rPr lang="en-US" sz="3800" dirty="0" smtClean="0"/>
-              <a:t>Summary</a:t>
+              <a:t>SQL: Primary Keys</a:t>
             </a:r>
             <a:endParaRPr lang="en-US" sz="3800" dirty="0"/>
           </a:p>
@@ -11756,7 +11301,7 @@
         </p:spPr>
         <p:txBody>
           <a:bodyPr>
-            <a:normAutofit/>
+            <a:normAutofit fontScale="92500" lnSpcReduction="10000"/>
           </a:bodyPr>
           <a:lstStyle/>
           <a:p>
@@ -11773,9 +11318,16 @@
             </a:pPr>
             <a:r>
               <a:rPr lang="en-US" sz="2400" dirty="0" smtClean="0"/>
-              <a:t>DBMS provide an interface between the user and database</a:t>
-            </a:r>
-            <a:endParaRPr lang="en-US" sz="2400" dirty="0" smtClean="0"/>
+              <a:t>A primary key </a:t>
+            </a:r>
+            <a:r>
+              <a:rPr lang="en-US" sz="2400" b="1" dirty="0" smtClean="0"/>
+              <a:t>uniquely</a:t>
+            </a:r>
+            <a:r>
+              <a:rPr lang="en-US" sz="2400" dirty="0" smtClean="0"/>
+              <a:t> identifies each row in a table</a:t>
+            </a:r>
           </a:p>
           <a:p>
             <a:pPr>
@@ -11789,11 +11341,7 @@
                 <a:spcPts val="1200"/>
               </a:spcAft>
             </a:pPr>
-            <a:r>
-              <a:rPr lang="en-US" sz="2400" dirty="0" smtClean="0"/>
-              <a:t>Key functions of DBMS is CRUD operations + maintenance, administration, security</a:t>
-            </a:r>
-            <a:endParaRPr lang="en-US" sz="2400" dirty="0" smtClean="0"/>
+            <a:endParaRPr lang="en-US" sz="2400" dirty="0"/>
           </a:p>
           <a:p>
             <a:pPr>
@@ -11807,10 +11355,7 @@
                 <a:spcPts val="1200"/>
               </a:spcAft>
             </a:pPr>
-            <a:r>
-              <a:rPr lang="en-US" sz="2400" dirty="0" smtClean="0"/>
-              <a:t>Relational databases are synonymous to SQL represent the data as tables with rows and columns </a:t>
-            </a:r>
+            <a:endParaRPr lang="en-US" sz="2400" dirty="0" smtClean="0"/>
           </a:p>
           <a:p>
             <a:pPr>
@@ -11824,10 +11369,7 @@
                 <a:spcPts val="1200"/>
               </a:spcAft>
             </a:pPr>
-            <a:r>
-              <a:rPr lang="en-US" sz="2400" dirty="0" smtClean="0"/>
-              <a:t>SQL is standardized, but there are different dialects</a:t>
-            </a:r>
+            <a:endParaRPr lang="en-US" sz="2400" dirty="0"/>
           </a:p>
           <a:p>
             <a:pPr>
@@ -11841,11 +11383,7 @@
                 <a:spcPts val="1200"/>
               </a:spcAft>
             </a:pPr>
-            <a:r>
-              <a:rPr lang="en-US" sz="2400" dirty="0" smtClean="0"/>
-              <a:t>Non-relational (NoSQL) databases admit any representation, however the language is DBMS-specific</a:t>
-            </a:r>
-            <a:endParaRPr lang="en-US" sz="2400" dirty="0"/>
+            <a:endParaRPr lang="en-US" sz="2400" dirty="0" smtClean="0"/>
           </a:p>
           <a:p>
             <a:pPr>
@@ -11859,7 +11397,7 @@
                 <a:spcPts val="1200"/>
               </a:spcAft>
             </a:pPr>
-            <a:endParaRPr lang="en-US" sz="2400" dirty="0" smtClean="0"/>
+            <a:endParaRPr lang="en-US" sz="2400" dirty="0"/>
           </a:p>
           <a:p>
             <a:pPr>
@@ -11873,7 +11411,26 @@
                 <a:spcPts val="1200"/>
               </a:spcAft>
             </a:pPr>
-            <a:endParaRPr lang="en-US" sz="2400" dirty="0"/>
+            <a:r>
+              <a:rPr lang="en-US" sz="2400" dirty="0" smtClean="0"/>
+              <a:t>In the </a:t>
+            </a:r>
+            <a:r>
+              <a:rPr lang="en-US" sz="2400" b="1" dirty="0" smtClean="0"/>
+              <a:t>`</a:t>
+            </a:r>
+            <a:r>
+              <a:rPr lang="en-US" sz="2400" b="1" dirty="0" err="1" smtClean="0"/>
+              <a:t>stock_data</a:t>
+            </a:r>
+            <a:r>
+              <a:rPr lang="en-US" sz="2400" b="1" dirty="0" smtClean="0"/>
+              <a:t>` </a:t>
+            </a:r>
+            <a:r>
+              <a:rPr lang="en-US" sz="2400" dirty="0" smtClean="0"/>
+              <a:t>table to the left the primary key is `id` allowing for duplicate rows</a:t>
+            </a:r>
           </a:p>
           <a:p>
             <a:pPr>
@@ -11887,7 +11444,26 @@
                 <a:spcPts val="1200"/>
               </a:spcAft>
             </a:pPr>
-            <a:endParaRPr lang="en-US" sz="2400" dirty="0" smtClean="0"/>
+            <a:r>
+              <a:rPr lang="en-US" sz="2400" dirty="0" smtClean="0"/>
+              <a:t>In the </a:t>
+            </a:r>
+            <a:r>
+              <a:rPr lang="en-US" sz="2400" b="1" dirty="0" smtClean="0"/>
+              <a:t>`</a:t>
+            </a:r>
+            <a:r>
+              <a:rPr lang="en-US" sz="2400" b="1" dirty="0" err="1" smtClean="0"/>
+              <a:t>stock_info</a:t>
+            </a:r>
+            <a:r>
+              <a:rPr lang="en-US" sz="2400" b="1" dirty="0" smtClean="0"/>
+              <a:t>` </a:t>
+            </a:r>
+            <a:r>
+              <a:rPr lang="en-US" sz="2400" dirty="0" smtClean="0"/>
+              <a:t>table to the right the primary key is ticker – we only can have one row for each unique ticker</a:t>
+            </a:r>
           </a:p>
           <a:p>
             <a:pPr>
@@ -11958,6 +11534,21 @@
                 <a:spcPts val="1200"/>
               </a:spcAft>
             </a:pPr>
+            <a:endParaRPr lang="en-US" sz="2400" dirty="0" smtClean="0"/>
+          </a:p>
+          <a:p>
+            <a:pPr marL="0" indent="0">
+              <a:lnSpc>
+                <a:spcPct val="100000"/>
+              </a:lnSpc>
+              <a:spcBef>
+                <a:spcPts val="1200"/>
+              </a:spcBef>
+              <a:spcAft>
+                <a:spcPts val="1200"/>
+              </a:spcAft>
+              <a:buNone/>
+            </a:pPr>
             <a:endParaRPr lang="en-US" sz="2400" dirty="0"/>
           </a:p>
           <a:p>
@@ -12006,10 +11597,828 @@
           </a:p>
         </p:txBody>
       </p:sp>
+      <p:graphicFrame>
+        <p:nvGraphicFramePr>
+          <p:cNvPr id="6" name="Table 5"/>
+          <p:cNvGraphicFramePr>
+            <a:graphicFrameLocks noGrp="1"/>
+          </p:cNvGraphicFramePr>
+          <p:nvPr>
+            <p:extLst>
+              <p:ext uri="{D42A27DB-BD31-4B8C-83A1-F6EECF244321}">
+                <p14:modId xmlns:p14="http://schemas.microsoft.com/office/powerpoint/2010/main" val="2428687625"/>
+              </p:ext>
+            </p:extLst>
+          </p:nvPr>
+        </p:nvGraphicFramePr>
+        <p:xfrm>
+          <a:off x="1224064" y="2004060"/>
+          <a:ext cx="4871936" cy="2773680"/>
+        </p:xfrm>
+        <a:graphic>
+          <a:graphicData uri="http://schemas.openxmlformats.org/drawingml/2006/table">
+            <a:tbl>
+              <a:tblPr firstRow="1" bandRow="1">
+                <a:tableStyleId>{5C22544A-7EE6-4342-B048-85BDC9FD1C3A}</a:tableStyleId>
+              </a:tblPr>
+              <a:tblGrid>
+                <a:gridCol w="536102"/>
+                <a:gridCol w="826851"/>
+                <a:gridCol w="1417536"/>
+                <a:gridCol w="1001949"/>
+                <a:gridCol w="1089498"/>
+              </a:tblGrid>
+              <a:tr h="370840">
+                <a:tc>
+                  <a:txBody>
+                    <a:bodyPr/>
+                    <a:lstStyle/>
+                    <a:p>
+                      <a:pPr algn="l"/>
+                      <a:r>
+                        <a:rPr lang="en-US" sz="2000" dirty="0" smtClean="0"/>
+                        <a:t>id</a:t>
+                      </a:r>
+                      <a:endParaRPr lang="en-US" sz="2000" dirty="0"/>
+                    </a:p>
+                  </a:txBody>
+                  <a:tcPr/>
+                </a:tc>
+                <a:tc>
+                  <a:txBody>
+                    <a:bodyPr/>
+                    <a:lstStyle/>
+                    <a:p>
+                      <a:pPr algn="l"/>
+                      <a:r>
+                        <a:rPr lang="en-US" sz="2000" dirty="0" smtClean="0"/>
+                        <a:t>ticker</a:t>
+                      </a:r>
+                      <a:endParaRPr lang="en-US" sz="2000" dirty="0"/>
+                    </a:p>
+                  </a:txBody>
+                  <a:tcPr/>
+                </a:tc>
+                <a:tc>
+                  <a:txBody>
+                    <a:bodyPr/>
+                    <a:lstStyle/>
+                    <a:p>
+                      <a:pPr algn="ctr"/>
+                      <a:r>
+                        <a:rPr lang="en-US" sz="2000" dirty="0" smtClean="0"/>
+                        <a:t>date</a:t>
+                      </a:r>
+                      <a:endParaRPr lang="en-US" sz="2000" dirty="0"/>
+                    </a:p>
+                  </a:txBody>
+                  <a:tcPr/>
+                </a:tc>
+                <a:tc>
+                  <a:txBody>
+                    <a:bodyPr/>
+                    <a:lstStyle/>
+                    <a:p>
+                      <a:pPr algn="ctr"/>
+                      <a:r>
+                        <a:rPr lang="en-US" sz="2000" dirty="0" smtClean="0"/>
+                        <a:t>return</a:t>
+                      </a:r>
+                      <a:endParaRPr lang="en-US" sz="2000" dirty="0"/>
+                    </a:p>
+                  </a:txBody>
+                  <a:tcPr/>
+                </a:tc>
+                <a:tc>
+                  <a:txBody>
+                    <a:bodyPr/>
+                    <a:lstStyle/>
+                    <a:p>
+                      <a:pPr algn="ctr"/>
+                      <a:r>
+                        <a:rPr lang="en-US" sz="2000" dirty="0" smtClean="0"/>
+                        <a:t>price</a:t>
+                      </a:r>
+                      <a:endParaRPr lang="en-US" sz="2000" dirty="0"/>
+                    </a:p>
+                  </a:txBody>
+                  <a:tcPr/>
+                </a:tc>
+              </a:tr>
+              <a:tr h="370840">
+                <a:tc>
+                  <a:txBody>
+                    <a:bodyPr/>
+                    <a:lstStyle/>
+                    <a:p>
+                      <a:pPr algn="l"/>
+                      <a:r>
+                        <a:rPr lang="en-US" sz="2000" dirty="0" smtClean="0"/>
+                        <a:t>1</a:t>
+                      </a:r>
+                      <a:endParaRPr lang="en-US" sz="2000" dirty="0"/>
+                    </a:p>
+                  </a:txBody>
+                  <a:tcPr/>
+                </a:tc>
+                <a:tc>
+                  <a:txBody>
+                    <a:bodyPr/>
+                    <a:lstStyle/>
+                    <a:p>
+                      <a:pPr algn="l"/>
+                      <a:r>
+                        <a:rPr lang="en-US" sz="2000" dirty="0" smtClean="0"/>
+                        <a:t>AAPL</a:t>
+                      </a:r>
+                      <a:endParaRPr lang="en-US" sz="2000" dirty="0"/>
+                    </a:p>
+                  </a:txBody>
+                  <a:tcPr/>
+                </a:tc>
+                <a:tc>
+                  <a:txBody>
+                    <a:bodyPr/>
+                    <a:lstStyle/>
+                    <a:p>
+                      <a:pPr algn="r"/>
+                      <a:r>
+                        <a:rPr lang="en-US" sz="2000" dirty="0" smtClean="0"/>
+                        <a:t>2020-08-18</a:t>
+                      </a:r>
+                      <a:endParaRPr lang="en-US" sz="2000" dirty="0"/>
+                    </a:p>
+                  </a:txBody>
+                  <a:tcPr/>
+                </a:tc>
+                <a:tc>
+                  <a:txBody>
+                    <a:bodyPr/>
+                    <a:lstStyle/>
+                    <a:p>
+                      <a:pPr algn="r"/>
+                      <a:r>
+                        <a:rPr lang="en-US" sz="2000" dirty="0" smtClean="0"/>
+                        <a:t>0.0083</a:t>
+                      </a:r>
+                      <a:endParaRPr lang="en-US" sz="2000" dirty="0"/>
+                    </a:p>
+                  </a:txBody>
+                  <a:tcPr/>
+                </a:tc>
+                <a:tc>
+                  <a:txBody>
+                    <a:bodyPr/>
+                    <a:lstStyle/>
+                    <a:p>
+                      <a:pPr algn="r"/>
+                      <a:r>
+                        <a:rPr lang="en-US" sz="2000" dirty="0" smtClean="0"/>
+                        <a:t>462.25</a:t>
+                      </a:r>
+                      <a:endParaRPr lang="en-US" sz="2000" dirty="0"/>
+                    </a:p>
+                  </a:txBody>
+                  <a:tcPr/>
+                </a:tc>
+              </a:tr>
+              <a:tr h="370840">
+                <a:tc>
+                  <a:txBody>
+                    <a:bodyPr/>
+                    <a:lstStyle/>
+                    <a:p>
+                      <a:pPr algn="l"/>
+                      <a:r>
+                        <a:rPr lang="en-US" sz="2000" dirty="0" smtClean="0"/>
+                        <a:t>2</a:t>
+                      </a:r>
+                      <a:endParaRPr lang="en-US" sz="2000" dirty="0"/>
+                    </a:p>
+                  </a:txBody>
+                  <a:tcPr/>
+                </a:tc>
+                <a:tc>
+                  <a:txBody>
+                    <a:bodyPr/>
+                    <a:lstStyle/>
+                    <a:p>
+                      <a:pPr algn="l"/>
+                      <a:r>
+                        <a:rPr lang="en-US" sz="2000" dirty="0" smtClean="0"/>
+                        <a:t>AAPL</a:t>
+                      </a:r>
+                      <a:endParaRPr lang="en-US" sz="2000" dirty="0"/>
+                    </a:p>
+                  </a:txBody>
+                  <a:tcPr/>
+                </a:tc>
+                <a:tc>
+                  <a:txBody>
+                    <a:bodyPr/>
+                    <a:lstStyle/>
+                    <a:p>
+                      <a:pPr algn="r"/>
+                      <a:r>
+                        <a:rPr lang="en-US" sz="2000" dirty="0" smtClean="0"/>
+                        <a:t>2020-08-19</a:t>
+                      </a:r>
+                      <a:endParaRPr lang="en-US" sz="2000" dirty="0"/>
+                    </a:p>
+                  </a:txBody>
+                  <a:tcPr/>
+                </a:tc>
+                <a:tc>
+                  <a:txBody>
+                    <a:bodyPr/>
+                    <a:lstStyle/>
+                    <a:p>
+                      <a:pPr algn="r"/>
+                      <a:r>
+                        <a:rPr lang="en-US" sz="2000" dirty="0" smtClean="0"/>
+                        <a:t>0.0013</a:t>
+                      </a:r>
+                      <a:endParaRPr lang="en-US" sz="2000" dirty="0"/>
+                    </a:p>
+                  </a:txBody>
+                  <a:tcPr/>
+                </a:tc>
+                <a:tc>
+                  <a:txBody>
+                    <a:bodyPr/>
+                    <a:lstStyle/>
+                    <a:p>
+                      <a:pPr algn="r"/>
+                      <a:r>
+                        <a:rPr lang="en-US" sz="2000" dirty="0" smtClean="0"/>
+                        <a:t>462.83</a:t>
+                      </a:r>
+                      <a:endParaRPr lang="en-US" sz="2000" dirty="0"/>
+                    </a:p>
+                  </a:txBody>
+                  <a:tcPr/>
+                </a:tc>
+              </a:tr>
+              <a:tr h="370840">
+                <a:tc>
+                  <a:txBody>
+                    <a:bodyPr/>
+                    <a:lstStyle/>
+                    <a:p>
+                      <a:pPr algn="l"/>
+                      <a:r>
+                        <a:rPr lang="en-US" sz="2000" dirty="0" smtClean="0"/>
+                        <a:t>3</a:t>
+                      </a:r>
+                      <a:endParaRPr lang="en-US" sz="2000" dirty="0"/>
+                    </a:p>
+                  </a:txBody>
+                  <a:tcPr/>
+                </a:tc>
+                <a:tc>
+                  <a:txBody>
+                    <a:bodyPr/>
+                    <a:lstStyle/>
+                    <a:p>
+                      <a:pPr algn="l"/>
+                      <a:r>
+                        <a:rPr lang="en-US" sz="2000" dirty="0" smtClean="0"/>
+                        <a:t>MSFT</a:t>
+                      </a:r>
+                      <a:endParaRPr lang="en-US" sz="2000" dirty="0"/>
+                    </a:p>
+                  </a:txBody>
+                  <a:tcPr/>
+                </a:tc>
+                <a:tc>
+                  <a:txBody>
+                    <a:bodyPr/>
+                    <a:lstStyle/>
+                    <a:p>
+                      <a:pPr algn="r"/>
+                      <a:r>
+                        <a:rPr lang="en-US" sz="2000" dirty="0" smtClean="0"/>
+                        <a:t>2020-08-18</a:t>
+                      </a:r>
+                      <a:endParaRPr lang="en-US" sz="2000" dirty="0"/>
+                    </a:p>
+                  </a:txBody>
+                  <a:tcPr/>
+                </a:tc>
+                <a:tc>
+                  <a:txBody>
+                    <a:bodyPr/>
+                    <a:lstStyle/>
+                    <a:p>
+                      <a:pPr algn="r"/>
+                      <a:r>
+                        <a:rPr lang="en-US" sz="2000" dirty="0" smtClean="0"/>
+                        <a:t>0.0058</a:t>
+                      </a:r>
+                      <a:endParaRPr lang="en-US" sz="2000" dirty="0"/>
+                    </a:p>
+                  </a:txBody>
+                  <a:tcPr/>
+                </a:tc>
+                <a:tc>
+                  <a:txBody>
+                    <a:bodyPr/>
+                    <a:lstStyle/>
+                    <a:p>
+                      <a:pPr algn="r"/>
+                      <a:r>
+                        <a:rPr lang="en-US" sz="2000" dirty="0" smtClean="0"/>
+                        <a:t>211.49</a:t>
+                      </a:r>
+                      <a:endParaRPr lang="en-US" sz="2000" dirty="0"/>
+                    </a:p>
+                  </a:txBody>
+                  <a:tcPr/>
+                </a:tc>
+              </a:tr>
+              <a:tr h="370840">
+                <a:tc>
+                  <a:txBody>
+                    <a:bodyPr/>
+                    <a:lstStyle/>
+                    <a:p>
+                      <a:pPr algn="l"/>
+                      <a:r>
+                        <a:rPr lang="en-US" sz="2000" dirty="0" smtClean="0"/>
+                        <a:t>4</a:t>
+                      </a:r>
+                      <a:endParaRPr lang="en-US" sz="2000" dirty="0"/>
+                    </a:p>
+                  </a:txBody>
+                  <a:tcPr/>
+                </a:tc>
+                <a:tc>
+                  <a:txBody>
+                    <a:bodyPr/>
+                    <a:lstStyle/>
+                    <a:p>
+                      <a:pPr algn="l"/>
+                      <a:r>
+                        <a:rPr lang="en-US" sz="2000" dirty="0" smtClean="0"/>
+                        <a:t>MSFT</a:t>
+                      </a:r>
+                      <a:endParaRPr lang="en-US" sz="2000" dirty="0"/>
+                    </a:p>
+                  </a:txBody>
+                  <a:tcPr/>
+                </a:tc>
+                <a:tc>
+                  <a:txBody>
+                    <a:bodyPr/>
+                    <a:lstStyle/>
+                    <a:p>
+                      <a:pPr algn="r"/>
+                      <a:r>
+                        <a:rPr lang="en-US" sz="2000" dirty="0" smtClean="0"/>
+                        <a:t>2020-08-19</a:t>
+                      </a:r>
+                      <a:endParaRPr lang="en-US" sz="2000" dirty="0"/>
+                    </a:p>
+                  </a:txBody>
+                  <a:tcPr/>
+                </a:tc>
+                <a:tc>
+                  <a:txBody>
+                    <a:bodyPr/>
+                    <a:lstStyle/>
+                    <a:p>
+                      <a:pPr algn="r"/>
+                      <a:r>
+                        <a:rPr lang="en-US" sz="2000" dirty="0" smtClean="0"/>
+                        <a:t>-0.0085</a:t>
+                      </a:r>
+                      <a:endParaRPr lang="en-US" sz="2000" dirty="0"/>
+                    </a:p>
+                  </a:txBody>
+                  <a:tcPr/>
+                </a:tc>
+                <a:tc>
+                  <a:txBody>
+                    <a:bodyPr/>
+                    <a:lstStyle/>
+                    <a:p>
+                      <a:pPr algn="r"/>
+                      <a:r>
+                        <a:rPr lang="en-US" sz="2000" dirty="0" smtClean="0"/>
+                        <a:t>209.70</a:t>
+                      </a:r>
+                      <a:endParaRPr lang="en-US" sz="2000" dirty="0"/>
+                    </a:p>
+                  </a:txBody>
+                  <a:tcPr/>
+                </a:tc>
+              </a:tr>
+              <a:tr h="370840">
+                <a:tc>
+                  <a:txBody>
+                    <a:bodyPr/>
+                    <a:lstStyle/>
+                    <a:p>
+                      <a:pPr algn="l"/>
+                      <a:r>
+                        <a:rPr lang="en-US" sz="2000" dirty="0" smtClean="0"/>
+                        <a:t>5</a:t>
+                      </a:r>
+                      <a:endParaRPr lang="en-US" sz="2000" dirty="0"/>
+                    </a:p>
+                  </a:txBody>
+                  <a:tcPr/>
+                </a:tc>
+                <a:tc>
+                  <a:txBody>
+                    <a:bodyPr/>
+                    <a:lstStyle/>
+                    <a:p>
+                      <a:pPr algn="l"/>
+                      <a:r>
+                        <a:rPr lang="en-US" sz="2000" dirty="0" smtClean="0"/>
+                        <a:t>XOM</a:t>
+                      </a:r>
+                      <a:endParaRPr lang="en-US" sz="2000" dirty="0"/>
+                    </a:p>
+                  </a:txBody>
+                  <a:tcPr/>
+                </a:tc>
+                <a:tc>
+                  <a:txBody>
+                    <a:bodyPr/>
+                    <a:lstStyle/>
+                    <a:p>
+                      <a:pPr algn="r"/>
+                      <a:r>
+                        <a:rPr lang="en-US" sz="2000" dirty="0" smtClean="0"/>
+                        <a:t>2020-08-18</a:t>
+                      </a:r>
+                      <a:endParaRPr lang="en-US" sz="2000" dirty="0"/>
+                    </a:p>
+                  </a:txBody>
+                  <a:tcPr/>
+                </a:tc>
+                <a:tc>
+                  <a:txBody>
+                    <a:bodyPr/>
+                    <a:lstStyle/>
+                    <a:p>
+                      <a:pPr algn="r"/>
+                      <a:r>
+                        <a:rPr lang="en-US" sz="2000" dirty="0" smtClean="0"/>
+                        <a:t>-0.0049</a:t>
+                      </a:r>
+                      <a:endParaRPr lang="en-US" sz="2000" dirty="0"/>
+                    </a:p>
+                  </a:txBody>
+                  <a:tcPr/>
+                </a:tc>
+                <a:tc>
+                  <a:txBody>
+                    <a:bodyPr/>
+                    <a:lstStyle/>
+                    <a:p>
+                      <a:pPr algn="r"/>
+                      <a:r>
+                        <a:rPr lang="en-US" sz="2000" dirty="0" smtClean="0"/>
+                        <a:t>42.43</a:t>
+                      </a:r>
+                      <a:endParaRPr lang="en-US" sz="2000" dirty="0"/>
+                    </a:p>
+                  </a:txBody>
+                  <a:tcPr/>
+                </a:tc>
+              </a:tr>
+              <a:tr h="370840">
+                <a:tc>
+                  <a:txBody>
+                    <a:bodyPr/>
+                    <a:lstStyle/>
+                    <a:p>
+                      <a:pPr algn="l"/>
+                      <a:r>
+                        <a:rPr lang="en-US" sz="2000" dirty="0" smtClean="0"/>
+                        <a:t>6</a:t>
+                      </a:r>
+                      <a:endParaRPr lang="en-US" sz="2000" dirty="0"/>
+                    </a:p>
+                  </a:txBody>
+                  <a:tcPr>
+                    <a:solidFill>
+                      <a:schemeClr val="accent2">
+                        <a:lumMod val="40000"/>
+                        <a:lumOff val="60000"/>
+                      </a:schemeClr>
+                    </a:solidFill>
+                  </a:tcPr>
+                </a:tc>
+                <a:tc>
+                  <a:txBody>
+                    <a:bodyPr/>
+                    <a:lstStyle/>
+                    <a:p>
+                      <a:pPr algn="l"/>
+                      <a:r>
+                        <a:rPr lang="en-US" sz="2000" dirty="0" smtClean="0"/>
+                        <a:t>XOM</a:t>
+                      </a:r>
+                      <a:endParaRPr lang="en-US" sz="2000" dirty="0"/>
+                    </a:p>
+                  </a:txBody>
+                  <a:tcPr>
+                    <a:solidFill>
+                      <a:schemeClr val="accent2">
+                        <a:lumMod val="40000"/>
+                        <a:lumOff val="60000"/>
+                      </a:schemeClr>
+                    </a:solidFill>
+                  </a:tcPr>
+                </a:tc>
+                <a:tc>
+                  <a:txBody>
+                    <a:bodyPr/>
+                    <a:lstStyle/>
+                    <a:p>
+                      <a:pPr algn="r"/>
+                      <a:r>
+                        <a:rPr lang="en-US" sz="2000" dirty="0" smtClean="0"/>
+                        <a:t>2020-08-18</a:t>
+                      </a:r>
+                      <a:endParaRPr lang="en-US" sz="2000" dirty="0"/>
+                    </a:p>
+                  </a:txBody>
+                  <a:tcPr>
+                    <a:solidFill>
+                      <a:schemeClr val="accent2">
+                        <a:lumMod val="40000"/>
+                        <a:lumOff val="60000"/>
+                      </a:schemeClr>
+                    </a:solidFill>
+                  </a:tcPr>
+                </a:tc>
+                <a:tc>
+                  <a:txBody>
+                    <a:bodyPr/>
+                    <a:lstStyle/>
+                    <a:p>
+                      <a:pPr algn="r"/>
+                      <a:r>
+                        <a:rPr lang="en-US" sz="2000" dirty="0" smtClean="0"/>
+                        <a:t>-0.0049</a:t>
+                      </a:r>
+                      <a:endParaRPr lang="en-US" sz="2000" dirty="0"/>
+                    </a:p>
+                  </a:txBody>
+                  <a:tcPr>
+                    <a:solidFill>
+                      <a:schemeClr val="accent2">
+                        <a:lumMod val="40000"/>
+                        <a:lumOff val="60000"/>
+                      </a:schemeClr>
+                    </a:solidFill>
+                  </a:tcPr>
+                </a:tc>
+                <a:tc>
+                  <a:txBody>
+                    <a:bodyPr/>
+                    <a:lstStyle/>
+                    <a:p>
+                      <a:pPr algn="r"/>
+                      <a:r>
+                        <a:rPr lang="en-US" sz="2000" dirty="0" smtClean="0"/>
+                        <a:t>42.43</a:t>
+                      </a:r>
+                      <a:endParaRPr lang="en-US" sz="2000" dirty="0"/>
+                    </a:p>
+                  </a:txBody>
+                  <a:tcPr>
+                    <a:solidFill>
+                      <a:schemeClr val="accent2">
+                        <a:lumMod val="40000"/>
+                        <a:lumOff val="60000"/>
+                      </a:schemeClr>
+                    </a:solidFill>
+                  </a:tcPr>
+                </a:tc>
+              </a:tr>
+            </a:tbl>
+          </a:graphicData>
+        </a:graphic>
+      </p:graphicFrame>
+      <p:graphicFrame>
+        <p:nvGraphicFramePr>
+          <p:cNvPr id="7" name="Table 6"/>
+          <p:cNvGraphicFramePr>
+            <a:graphicFrameLocks noGrp="1"/>
+          </p:cNvGraphicFramePr>
+          <p:nvPr>
+            <p:extLst>
+              <p:ext uri="{D42A27DB-BD31-4B8C-83A1-F6EECF244321}">
+                <p14:modId xmlns:p14="http://schemas.microsoft.com/office/powerpoint/2010/main" val="2778073021"/>
+              </p:ext>
+            </p:extLst>
+          </p:nvPr>
+        </p:nvGraphicFramePr>
+        <p:xfrm>
+          <a:off x="6800273" y="2004060"/>
+          <a:ext cx="4216398" cy="1584960"/>
+        </p:xfrm>
+        <a:graphic>
+          <a:graphicData uri="http://schemas.openxmlformats.org/drawingml/2006/table">
+            <a:tbl>
+              <a:tblPr firstRow="1" bandRow="1">
+                <a:tableStyleId>{5C22544A-7EE6-4342-B048-85BDC9FD1C3A}</a:tableStyleId>
+              </a:tblPr>
+              <a:tblGrid>
+                <a:gridCol w="913761"/>
+                <a:gridCol w="1799617"/>
+                <a:gridCol w="1503020"/>
+              </a:tblGrid>
+              <a:tr h="292523">
+                <a:tc>
+                  <a:txBody>
+                    <a:bodyPr/>
+                    <a:lstStyle/>
+                    <a:p>
+                      <a:r>
+                        <a:rPr lang="en-US" sz="2000" dirty="0" smtClean="0"/>
+                        <a:t>ticker</a:t>
+                      </a:r>
+                      <a:endParaRPr lang="en-US" sz="2000" dirty="0"/>
+                    </a:p>
+                  </a:txBody>
+                  <a:tcPr/>
+                </a:tc>
+                <a:tc>
+                  <a:txBody>
+                    <a:bodyPr/>
+                    <a:lstStyle/>
+                    <a:p>
+                      <a:r>
+                        <a:rPr lang="en-US" sz="2000" dirty="0" smtClean="0"/>
+                        <a:t>name</a:t>
+                      </a:r>
+                      <a:endParaRPr lang="en-US" sz="2000" dirty="0"/>
+                    </a:p>
+                  </a:txBody>
+                  <a:tcPr/>
+                </a:tc>
+                <a:tc>
+                  <a:txBody>
+                    <a:bodyPr/>
+                    <a:lstStyle/>
+                    <a:p>
+                      <a:r>
+                        <a:rPr lang="en-US" sz="2000" dirty="0" smtClean="0"/>
+                        <a:t>sector</a:t>
+                      </a:r>
+                      <a:endParaRPr lang="en-US" sz="2000" dirty="0"/>
+                    </a:p>
+                  </a:txBody>
+                  <a:tcPr/>
+                </a:tc>
+              </a:tr>
+              <a:tr h="292523">
+                <a:tc>
+                  <a:txBody>
+                    <a:bodyPr/>
+                    <a:lstStyle/>
+                    <a:p>
+                      <a:r>
+                        <a:rPr lang="en-US" sz="2000" dirty="0" smtClean="0"/>
+                        <a:t>AAPL</a:t>
+                      </a:r>
+                      <a:endParaRPr lang="en-US" sz="2000" dirty="0"/>
+                    </a:p>
+                  </a:txBody>
+                  <a:tcPr/>
+                </a:tc>
+                <a:tc>
+                  <a:txBody>
+                    <a:bodyPr/>
+                    <a:lstStyle/>
+                    <a:p>
+                      <a:r>
+                        <a:rPr lang="en-US" sz="2000" dirty="0" smtClean="0"/>
+                        <a:t>Apple Inc.</a:t>
+                      </a:r>
+                      <a:endParaRPr lang="en-US" sz="2000" dirty="0"/>
+                    </a:p>
+                  </a:txBody>
+                  <a:tcPr/>
+                </a:tc>
+                <a:tc>
+                  <a:txBody>
+                    <a:bodyPr/>
+                    <a:lstStyle/>
+                    <a:p>
+                      <a:r>
+                        <a:rPr lang="en-US" sz="2000" dirty="0" smtClean="0"/>
+                        <a:t>Technology</a:t>
+                      </a:r>
+                      <a:endParaRPr lang="en-US" sz="2000" dirty="0"/>
+                    </a:p>
+                  </a:txBody>
+                  <a:tcPr/>
+                </a:tc>
+              </a:tr>
+              <a:tr h="292523">
+                <a:tc>
+                  <a:txBody>
+                    <a:bodyPr/>
+                    <a:lstStyle/>
+                    <a:p>
+                      <a:r>
+                        <a:rPr lang="en-US" sz="2000" dirty="0" smtClean="0"/>
+                        <a:t>MSFT</a:t>
+                      </a:r>
+                      <a:endParaRPr lang="en-US" sz="2000" dirty="0"/>
+                    </a:p>
+                  </a:txBody>
+                  <a:tcPr/>
+                </a:tc>
+                <a:tc>
+                  <a:txBody>
+                    <a:bodyPr/>
+                    <a:lstStyle/>
+                    <a:p>
+                      <a:r>
+                        <a:rPr lang="en-US" sz="2000" dirty="0" smtClean="0"/>
+                        <a:t>Microsoft Corp.</a:t>
+                      </a:r>
+                      <a:endParaRPr lang="en-US" sz="2000" dirty="0"/>
+                    </a:p>
+                  </a:txBody>
+                  <a:tcPr/>
+                </a:tc>
+                <a:tc>
+                  <a:txBody>
+                    <a:bodyPr/>
+                    <a:lstStyle/>
+                    <a:p>
+                      <a:r>
+                        <a:rPr lang="en-US" sz="2000" dirty="0" smtClean="0"/>
+                        <a:t>Technology</a:t>
+                      </a:r>
+                      <a:endParaRPr lang="en-US" sz="2000" dirty="0"/>
+                    </a:p>
+                  </a:txBody>
+                  <a:tcPr/>
+                </a:tc>
+              </a:tr>
+              <a:tr h="292523">
+                <a:tc>
+                  <a:txBody>
+                    <a:bodyPr/>
+                    <a:lstStyle/>
+                    <a:p>
+                      <a:r>
+                        <a:rPr lang="en-US" sz="2000" dirty="0" smtClean="0"/>
+                        <a:t>XOM</a:t>
+                      </a:r>
+                      <a:endParaRPr lang="en-US" sz="2000" dirty="0"/>
+                    </a:p>
+                  </a:txBody>
+                  <a:tcPr/>
+                </a:tc>
+                <a:tc>
+                  <a:txBody>
+                    <a:bodyPr/>
+                    <a:lstStyle/>
+                    <a:p>
+                      <a:r>
+                        <a:rPr lang="en-US" sz="2000" dirty="0" smtClean="0"/>
+                        <a:t>ExxonMobil</a:t>
+                      </a:r>
+                      <a:endParaRPr lang="en-US" sz="2000" dirty="0"/>
+                    </a:p>
+                  </a:txBody>
+                  <a:tcPr/>
+                </a:tc>
+                <a:tc>
+                  <a:txBody>
+                    <a:bodyPr/>
+                    <a:lstStyle/>
+                    <a:p>
+                      <a:r>
+                        <a:rPr lang="en-US" sz="2000" dirty="0" smtClean="0"/>
+                        <a:t>Oil &amp; Gas</a:t>
+                      </a:r>
+                      <a:endParaRPr lang="en-US" sz="2000" dirty="0"/>
+                    </a:p>
+                  </a:txBody>
+                  <a:tcPr/>
+                </a:tc>
+              </a:tr>
+            </a:tbl>
+          </a:graphicData>
+        </a:graphic>
+      </p:graphicFrame>
     </p:spTree>
     <p:extLst>
       <p:ext uri="{BB962C8B-B14F-4D97-AF65-F5344CB8AC3E}">
-        <p14:creationId xmlns:p14="http://schemas.microsoft.com/office/powerpoint/2010/main" val="2019232606"/>
+        <p14:creationId xmlns:p14="http://schemas.microsoft.com/office/powerpoint/2010/main" val="2871118362"/>
       </p:ext>
     </p:extLst>
   </p:cSld>
@@ -12067,7 +12476,7 @@
           <a:p>
             <a:r>
               <a:rPr lang="en-US" sz="3800" dirty="0" smtClean="0"/>
-              <a:t>SQL: Primary Keys</a:t>
+              <a:t>SQL: Foreign Keys</a:t>
             </a:r>
             <a:endParaRPr lang="en-US" sz="3800" dirty="0"/>
           </a:p>
@@ -12091,7 +12500,7 @@
         </p:spPr>
         <p:txBody>
           <a:bodyPr>
-            <a:normAutofit fontScale="92500" lnSpcReduction="10000"/>
+            <a:normAutofit/>
           </a:bodyPr>
           <a:lstStyle/>
           <a:p>
@@ -12108,15 +12517,7 @@
             </a:pPr>
             <a:r>
               <a:rPr lang="en-US" sz="2400" dirty="0" smtClean="0"/>
-              <a:t>A primary key </a:t>
-            </a:r>
-            <a:r>
-              <a:rPr lang="en-US" sz="2400" b="1" dirty="0" smtClean="0"/>
-              <a:t>uniquely</a:t>
-            </a:r>
-            <a:r>
-              <a:rPr lang="en-US" sz="2400" dirty="0" smtClean="0"/>
-              <a:t> identifies each row in a table</a:t>
+              <a:t>A foreign key is a column in a table that links this table to another one</a:t>
             </a:r>
           </a:p>
           <a:p>
@@ -12162,6 +12563,21 @@
             <a:endParaRPr lang="en-US" sz="2400" dirty="0"/>
           </a:p>
           <a:p>
+            <a:pPr marL="0" indent="0">
+              <a:lnSpc>
+                <a:spcPct val="100000"/>
+              </a:lnSpc>
+              <a:spcBef>
+                <a:spcPts val="1200"/>
+              </a:spcBef>
+              <a:spcAft>
+                <a:spcPts val="1200"/>
+              </a:spcAft>
+              <a:buNone/>
+            </a:pPr>
+            <a:endParaRPr lang="en-US" sz="2400" dirty="0" smtClean="0"/>
+          </a:p>
+          <a:p>
             <a:pPr>
               <a:lnSpc>
                 <a:spcPct val="100000"/>
@@ -12173,6 +12589,65 @@
                 <a:spcPts val="1200"/>
               </a:spcAft>
             </a:pPr>
+            <a:r>
+              <a:rPr lang="en-US" sz="2400" dirty="0" smtClean="0"/>
+              <a:t>In the example above the </a:t>
+            </a:r>
+            <a:r>
+              <a:rPr lang="en-US" sz="2400" b="1" dirty="0" smtClean="0"/>
+              <a:t>`</a:t>
+            </a:r>
+            <a:r>
+              <a:rPr lang="en-US" sz="2400" b="1" dirty="0" err="1" smtClean="0"/>
+              <a:t>stock_data</a:t>
+            </a:r>
+            <a:r>
+              <a:rPr lang="en-US" sz="2400" b="1" dirty="0" smtClean="0"/>
+              <a:t>`</a:t>
+            </a:r>
+            <a:r>
+              <a:rPr lang="en-US" sz="2400" dirty="0" smtClean="0"/>
+              <a:t> table  </a:t>
+            </a:r>
+            <a:r>
+              <a:rPr lang="en-US" sz="2400" b="1" dirty="0" smtClean="0"/>
+              <a:t>`ticker`</a:t>
+            </a:r>
+            <a:r>
+              <a:rPr lang="en-US" sz="2400" dirty="0" smtClean="0"/>
+              <a:t> is a foreign key, because it is a primary key in the </a:t>
+            </a:r>
+            <a:r>
+              <a:rPr lang="en-US" sz="2400" b="1" dirty="0" smtClean="0"/>
+              <a:t>`</a:t>
+            </a:r>
+            <a:r>
+              <a:rPr lang="en-US" sz="2400" b="1" dirty="0" err="1" smtClean="0"/>
+              <a:t>stock_info</a:t>
+            </a:r>
+            <a:r>
+              <a:rPr lang="en-US" sz="2400" b="1" dirty="0" smtClean="0"/>
+              <a:t>`</a:t>
+            </a:r>
+            <a:r>
+              <a:rPr lang="en-US" sz="2400" dirty="0" smtClean="0"/>
+              <a:t> table</a:t>
+            </a:r>
+            <a:endParaRPr lang="en-US" sz="2400" dirty="0"/>
+          </a:p>
+          <a:p>
+            <a:pPr marL="0" indent="0">
+              <a:lnSpc>
+                <a:spcPct val="100000"/>
+              </a:lnSpc>
+              <a:spcBef>
+                <a:spcPts val="1200"/>
+              </a:spcBef>
+              <a:spcAft>
+                <a:spcPts val="1200"/>
+              </a:spcAft>
+              <a:buNone/>
+            </a:pPr>
             <a:endParaRPr lang="en-US" sz="2400" dirty="0" smtClean="0"/>
           </a:p>
           <a:p>
@@ -12201,26 +12676,7 @@
                 <a:spcPts val="1200"/>
               </a:spcAft>
             </a:pPr>
-            <a:r>
-              <a:rPr lang="en-US" sz="2400" dirty="0" smtClean="0"/>
-              <a:t>In the </a:t>
-            </a:r>
-            <a:r>
-              <a:rPr lang="en-US" sz="2400" b="1" dirty="0" smtClean="0"/>
-              <a:t>`</a:t>
-            </a:r>
-            <a:r>
-              <a:rPr lang="en-US" sz="2400" b="1" dirty="0" err="1" smtClean="0"/>
-              <a:t>stock_data</a:t>
-            </a:r>
-            <a:r>
-              <a:rPr lang="en-US" sz="2400" b="1" dirty="0" smtClean="0"/>
-              <a:t>` </a:t>
-            </a:r>
-            <a:r>
-              <a:rPr lang="en-US" sz="2400" dirty="0" smtClean="0"/>
-              <a:t>table to the left the primary key is `id` allowing for duplicate rows</a:t>
-            </a:r>
+            <a:endParaRPr lang="en-US" sz="2400" dirty="0" smtClean="0"/>
           </a:p>
           <a:p>
             <a:pPr>
@@ -12234,26 +12690,22 @@
                 <a:spcPts val="1200"/>
               </a:spcAft>
             </a:pPr>
-            <a:r>
-              <a:rPr lang="en-US" sz="2400" dirty="0" smtClean="0"/>
-              <a:t>In the </a:t>
-            </a:r>
-            <a:r>
-              <a:rPr lang="en-US" sz="2400" b="1" dirty="0" smtClean="0"/>
-              <a:t>`</a:t>
-            </a:r>
-            <a:r>
-              <a:rPr lang="en-US" sz="2400" b="1" dirty="0" err="1" smtClean="0"/>
-              <a:t>stock_info</a:t>
-            </a:r>
-            <a:r>
-              <a:rPr lang="en-US" sz="2400" b="1" dirty="0" smtClean="0"/>
-              <a:t>` </a:t>
-            </a:r>
-            <a:r>
-              <a:rPr lang="en-US" sz="2400" dirty="0" smtClean="0"/>
-              <a:t>table to the right the primary key is ticker – we only can have one row for each unique ticker</a:t>
-            </a:r>
+            <a:endParaRPr lang="en-US" sz="2400" dirty="0" smtClean="0"/>
+          </a:p>
+          <a:p>
+            <a:pPr marL="0" indent="0">
+              <a:lnSpc>
+                <a:spcPct val="100000"/>
+              </a:lnSpc>
+              <a:spcBef>
+                <a:spcPts val="1200"/>
+              </a:spcBef>
+              <a:spcAft>
+                <a:spcPts val="1200"/>
+              </a:spcAft>
+              <a:buNone/>
+            </a:pPr>
+            <a:endParaRPr lang="en-US" sz="2400" dirty="0"/>
           </a:p>
           <a:p>
             <a:pPr>
@@ -12267,7 +12719,7 @@
                 <a:spcPts val="1200"/>
               </a:spcAft>
             </a:pPr>
-            <a:endParaRPr lang="en-US" sz="2400" dirty="0"/>
+            <a:endParaRPr lang="en-US" sz="2400" dirty="0" smtClean="0"/>
           </a:p>
           <a:p>
             <a:pPr marL="0" indent="0">
@@ -12285,48 +12737,6 @@
             <a:endParaRPr lang="en-US" sz="2400" dirty="0" smtClean="0"/>
           </a:p>
           <a:p>
-            <a:pPr>
-              <a:lnSpc>
-                <a:spcPct val="100000"/>
-              </a:lnSpc>
-              <a:spcBef>
-                <a:spcPts val="1200"/>
-              </a:spcBef>
-              <a:spcAft>
-                <a:spcPts val="1200"/>
-              </a:spcAft>
-            </a:pPr>
-            <a:endParaRPr lang="en-US" sz="2400" dirty="0"/>
-          </a:p>
-          <a:p>
-            <a:pPr>
-              <a:lnSpc>
-                <a:spcPct val="100000"/>
-              </a:lnSpc>
-              <a:spcBef>
-                <a:spcPts val="1200"/>
-              </a:spcBef>
-              <a:spcAft>
-                <a:spcPts val="1200"/>
-              </a:spcAft>
-            </a:pPr>
-            <a:endParaRPr lang="en-US" sz="2400" dirty="0" smtClean="0"/>
-          </a:p>
-          <a:p>
-            <a:pPr>
-              <a:lnSpc>
-                <a:spcPct val="100000"/>
-              </a:lnSpc>
-              <a:spcBef>
-                <a:spcPts val="1200"/>
-              </a:spcBef>
-              <a:spcAft>
-                <a:spcPts val="1200"/>
-              </a:spcAft>
-            </a:pPr>
-            <a:endParaRPr lang="en-US" sz="2400" dirty="0" smtClean="0"/>
-          </a:p>
-          <a:p>
             <a:pPr marL="0" indent="0">
               <a:lnSpc>
                 <a:spcPct val="100000"/>
@@ -12339,71 +12749,27 @@
               </a:spcAft>
               <a:buNone/>
             </a:pPr>
-            <a:endParaRPr lang="en-US" sz="2400" dirty="0"/>
-          </a:p>
-          <a:p>
-            <a:pPr>
-              <a:lnSpc>
-                <a:spcPct val="100000"/>
-              </a:lnSpc>
-              <a:spcBef>
-                <a:spcPts val="1200"/>
-              </a:spcBef>
-              <a:spcAft>
-                <a:spcPts val="1200"/>
-              </a:spcAft>
-            </a:pPr>
-            <a:endParaRPr lang="en-US" sz="2400" dirty="0" smtClean="0"/>
-          </a:p>
-          <a:p>
-            <a:pPr marL="0" indent="0">
-              <a:lnSpc>
-                <a:spcPct val="100000"/>
-              </a:lnSpc>
-              <a:spcBef>
-                <a:spcPts val="1200"/>
-              </a:spcBef>
-              <a:spcAft>
-                <a:spcPts val="1200"/>
-              </a:spcAft>
-              <a:buNone/>
-            </a:pPr>
-            <a:endParaRPr lang="en-US" sz="2400" dirty="0" smtClean="0"/>
-          </a:p>
-          <a:p>
-            <a:pPr marL="0" indent="0">
-              <a:lnSpc>
-                <a:spcPct val="100000"/>
-              </a:lnSpc>
-              <a:spcBef>
-                <a:spcPts val="1200"/>
-              </a:spcBef>
-              <a:spcAft>
-                <a:spcPts val="1200"/>
-              </a:spcAft>
-              <a:buNone/>
-            </a:pPr>
             <a:endParaRPr lang="en-US" sz="2400" dirty="0" smtClean="0"/>
           </a:p>
         </p:txBody>
       </p:sp>
       <p:graphicFrame>
         <p:nvGraphicFramePr>
-          <p:cNvPr id="6" name="Table 5"/>
+          <p:cNvPr id="8" name="Table 7"/>
           <p:cNvGraphicFramePr>
             <a:graphicFrameLocks noGrp="1"/>
           </p:cNvGraphicFramePr>
           <p:nvPr>
             <p:extLst>
               <p:ext uri="{D42A27DB-BD31-4B8C-83A1-F6EECF244321}">
-                <p14:modId xmlns:p14="http://schemas.microsoft.com/office/powerpoint/2010/main" val="2428687625"/>
+                <p14:modId xmlns:p14="http://schemas.microsoft.com/office/powerpoint/2010/main" val="500175436"/>
               </p:ext>
             </p:extLst>
           </p:nvPr>
         </p:nvGraphicFramePr>
         <p:xfrm>
-          <a:off x="1224064" y="2004060"/>
-          <a:ext cx="4871936" cy="2773680"/>
+          <a:off x="1233791" y="1955422"/>
+          <a:ext cx="4871936" cy="2377440"/>
         </p:xfrm>
         <a:graphic>
           <a:graphicData uri="http://schemas.openxmlformats.org/drawingml/2006/table">
@@ -12441,457 +12807,22 @@
                     <a:p>
                       <a:pPr algn="l"/>
                       <a:r>
-                        <a:rPr lang="en-US" sz="2000" dirty="0" smtClean="0"/>
+                        <a:rPr lang="en-US" sz="2000" dirty="0" smtClean="0">
+                          <a:solidFill>
+                            <a:schemeClr val="bg2">
+                              <a:lumMod val="25000"/>
+                            </a:schemeClr>
+                          </a:solidFill>
+                        </a:rPr>
                         <a:t>ticker</a:t>
                       </a:r>
-                      <a:endParaRPr lang="en-US" sz="2000" dirty="0"/>
-                    </a:p>
-                  </a:txBody>
-                  <a:tcPr/>
-                </a:tc>
-                <a:tc>
-                  <a:txBody>
-                    <a:bodyPr/>
-                    <a:lstStyle/>
-                    <a:p>
-                      <a:pPr algn="ctr"/>
-                      <a:r>
-                        <a:rPr lang="en-US" sz="2000" dirty="0" smtClean="0"/>
-                        <a:t>date</a:t>
-                      </a:r>
-                      <a:endParaRPr lang="en-US" sz="2000" dirty="0"/>
-                    </a:p>
-                  </a:txBody>
-                  <a:tcPr/>
-                </a:tc>
-                <a:tc>
-                  <a:txBody>
-                    <a:bodyPr/>
-                    <a:lstStyle/>
-                    <a:p>
-                      <a:pPr algn="ctr"/>
-                      <a:r>
-                        <a:rPr lang="en-US" sz="2000" dirty="0" smtClean="0"/>
-                        <a:t>return</a:t>
-                      </a:r>
-                      <a:endParaRPr lang="en-US" sz="2000" dirty="0"/>
-                    </a:p>
-                  </a:txBody>
-                  <a:tcPr/>
-                </a:tc>
-                <a:tc>
-                  <a:txBody>
-                    <a:bodyPr/>
-                    <a:lstStyle/>
-                    <a:p>
-                      <a:pPr algn="ctr"/>
-                      <a:r>
-                        <a:rPr lang="en-US" sz="2000" dirty="0" smtClean="0"/>
-                        <a:t>price</a:t>
-                      </a:r>
-                      <a:endParaRPr lang="en-US" sz="2000" dirty="0"/>
-                    </a:p>
-                  </a:txBody>
-                  <a:tcPr/>
-                </a:tc>
-              </a:tr>
-              <a:tr h="370840">
-                <a:tc>
-                  <a:txBody>
-                    <a:bodyPr/>
-                    <a:lstStyle/>
-                    <a:p>
-                      <a:pPr algn="l"/>
-                      <a:r>
-                        <a:rPr lang="en-US" sz="2000" dirty="0" smtClean="0"/>
-                        <a:t>1</a:t>
-                      </a:r>
-                      <a:endParaRPr lang="en-US" sz="2000" dirty="0"/>
-                    </a:p>
-                  </a:txBody>
-                  <a:tcPr/>
-                </a:tc>
-                <a:tc>
-                  <a:txBody>
-                    <a:bodyPr/>
-                    <a:lstStyle/>
-                    <a:p>
-                      <a:pPr algn="l"/>
-                      <a:r>
-                        <a:rPr lang="en-US" sz="2000" dirty="0" smtClean="0"/>
-                        <a:t>AAPL</a:t>
-                      </a:r>
-                      <a:endParaRPr lang="en-US" sz="2000" dirty="0"/>
-                    </a:p>
-                  </a:txBody>
-                  <a:tcPr/>
-                </a:tc>
-                <a:tc>
-                  <a:txBody>
-                    <a:bodyPr/>
-                    <a:lstStyle/>
-                    <a:p>
-                      <a:pPr algn="r"/>
-                      <a:r>
-                        <a:rPr lang="en-US" sz="2000" dirty="0" smtClean="0"/>
-                        <a:t>2020-08-18</a:t>
-                      </a:r>
-                      <a:endParaRPr lang="en-US" sz="2000" dirty="0"/>
-                    </a:p>
-                  </a:txBody>
-                  <a:tcPr/>
-                </a:tc>
-                <a:tc>
-                  <a:txBody>
-                    <a:bodyPr/>
-                    <a:lstStyle/>
-                    <a:p>
-                      <a:pPr algn="r"/>
-                      <a:r>
-                        <a:rPr lang="en-US" sz="2000" dirty="0" smtClean="0"/>
-                        <a:t>0.0083</a:t>
-                      </a:r>
-                      <a:endParaRPr lang="en-US" sz="2000" dirty="0"/>
-                    </a:p>
-                  </a:txBody>
-                  <a:tcPr/>
-                </a:tc>
-                <a:tc>
-                  <a:txBody>
-                    <a:bodyPr/>
-                    <a:lstStyle/>
-                    <a:p>
-                      <a:pPr algn="r"/>
-                      <a:r>
-                        <a:rPr lang="en-US" sz="2000" dirty="0" smtClean="0"/>
-                        <a:t>462.25</a:t>
-                      </a:r>
-                      <a:endParaRPr lang="en-US" sz="2000" dirty="0"/>
-                    </a:p>
-                  </a:txBody>
-                  <a:tcPr/>
-                </a:tc>
-              </a:tr>
-              <a:tr h="370840">
-                <a:tc>
-                  <a:txBody>
-                    <a:bodyPr/>
-                    <a:lstStyle/>
-                    <a:p>
-                      <a:pPr algn="l"/>
-                      <a:r>
-                        <a:rPr lang="en-US" sz="2000" dirty="0" smtClean="0"/>
-                        <a:t>2</a:t>
-                      </a:r>
-                      <a:endParaRPr lang="en-US" sz="2000" dirty="0"/>
-                    </a:p>
-                  </a:txBody>
-                  <a:tcPr/>
-                </a:tc>
-                <a:tc>
-                  <a:txBody>
-                    <a:bodyPr/>
-                    <a:lstStyle/>
-                    <a:p>
-                      <a:pPr algn="l"/>
-                      <a:r>
-                        <a:rPr lang="en-US" sz="2000" dirty="0" smtClean="0"/>
-                        <a:t>AAPL</a:t>
-                      </a:r>
-                      <a:endParaRPr lang="en-US" sz="2000" dirty="0"/>
-                    </a:p>
-                  </a:txBody>
-                  <a:tcPr/>
-                </a:tc>
-                <a:tc>
-                  <a:txBody>
-                    <a:bodyPr/>
-                    <a:lstStyle/>
-                    <a:p>
-                      <a:pPr algn="r"/>
-                      <a:r>
-                        <a:rPr lang="en-US" sz="2000" dirty="0" smtClean="0"/>
-                        <a:t>2020-08-19</a:t>
-                      </a:r>
-                      <a:endParaRPr lang="en-US" sz="2000" dirty="0"/>
-                    </a:p>
-                  </a:txBody>
-                  <a:tcPr/>
-                </a:tc>
-                <a:tc>
-                  <a:txBody>
-                    <a:bodyPr/>
-                    <a:lstStyle/>
-                    <a:p>
-                      <a:pPr algn="r"/>
-                      <a:r>
-                        <a:rPr lang="en-US" sz="2000" dirty="0" smtClean="0"/>
-                        <a:t>0.0013</a:t>
-                      </a:r>
-                      <a:endParaRPr lang="en-US" sz="2000" dirty="0"/>
-                    </a:p>
-                  </a:txBody>
-                  <a:tcPr/>
-                </a:tc>
-                <a:tc>
-                  <a:txBody>
-                    <a:bodyPr/>
-                    <a:lstStyle/>
-                    <a:p>
-                      <a:pPr algn="r"/>
-                      <a:r>
-                        <a:rPr lang="en-US" sz="2000" dirty="0" smtClean="0"/>
-                        <a:t>462.83</a:t>
-                      </a:r>
-                      <a:endParaRPr lang="en-US" sz="2000" dirty="0"/>
-                    </a:p>
-                  </a:txBody>
-                  <a:tcPr/>
-                </a:tc>
-              </a:tr>
-              <a:tr h="370840">
-                <a:tc>
-                  <a:txBody>
-                    <a:bodyPr/>
-                    <a:lstStyle/>
-                    <a:p>
-                      <a:pPr algn="l"/>
-                      <a:r>
-                        <a:rPr lang="en-US" sz="2000" dirty="0" smtClean="0"/>
-                        <a:t>3</a:t>
-                      </a:r>
-                      <a:endParaRPr lang="en-US" sz="2000" dirty="0"/>
-                    </a:p>
-                  </a:txBody>
-                  <a:tcPr/>
-                </a:tc>
-                <a:tc>
-                  <a:txBody>
-                    <a:bodyPr/>
-                    <a:lstStyle/>
-                    <a:p>
-                      <a:pPr algn="l"/>
-                      <a:r>
-                        <a:rPr lang="en-US" sz="2000" dirty="0" smtClean="0"/>
-                        <a:t>MSFT</a:t>
-                      </a:r>
-                      <a:endParaRPr lang="en-US" sz="2000" dirty="0"/>
-                    </a:p>
-                  </a:txBody>
-                  <a:tcPr/>
-                </a:tc>
-                <a:tc>
-                  <a:txBody>
-                    <a:bodyPr/>
-                    <a:lstStyle/>
-                    <a:p>
-                      <a:pPr algn="r"/>
-                      <a:r>
-                        <a:rPr lang="en-US" sz="2000" dirty="0" smtClean="0"/>
-                        <a:t>2020-08-18</a:t>
-                      </a:r>
-                      <a:endParaRPr lang="en-US" sz="2000" dirty="0"/>
-                    </a:p>
-                  </a:txBody>
-                  <a:tcPr/>
-                </a:tc>
-                <a:tc>
-                  <a:txBody>
-                    <a:bodyPr/>
-                    <a:lstStyle/>
-                    <a:p>
-                      <a:pPr algn="r"/>
-                      <a:r>
-                        <a:rPr lang="en-US" sz="2000" dirty="0" smtClean="0"/>
-                        <a:t>0.0058</a:t>
-                      </a:r>
-                      <a:endParaRPr lang="en-US" sz="2000" dirty="0"/>
-                    </a:p>
-                  </a:txBody>
-                  <a:tcPr/>
-                </a:tc>
-                <a:tc>
-                  <a:txBody>
-                    <a:bodyPr/>
-                    <a:lstStyle/>
-                    <a:p>
-                      <a:pPr algn="r"/>
-                      <a:r>
-                        <a:rPr lang="en-US" sz="2000" dirty="0" smtClean="0"/>
-                        <a:t>211.49</a:t>
-                      </a:r>
-                      <a:endParaRPr lang="en-US" sz="2000" dirty="0"/>
-                    </a:p>
-                  </a:txBody>
-                  <a:tcPr/>
-                </a:tc>
-              </a:tr>
-              <a:tr h="370840">
-                <a:tc>
-                  <a:txBody>
-                    <a:bodyPr/>
-                    <a:lstStyle/>
-                    <a:p>
-                      <a:pPr algn="l"/>
-                      <a:r>
-                        <a:rPr lang="en-US" sz="2000" dirty="0" smtClean="0"/>
-                        <a:t>4</a:t>
-                      </a:r>
-                      <a:endParaRPr lang="en-US" sz="2000" dirty="0"/>
-                    </a:p>
-                  </a:txBody>
-                  <a:tcPr/>
-                </a:tc>
-                <a:tc>
-                  <a:txBody>
-                    <a:bodyPr/>
-                    <a:lstStyle/>
-                    <a:p>
-                      <a:pPr algn="l"/>
-                      <a:r>
-                        <a:rPr lang="en-US" sz="2000" dirty="0" smtClean="0"/>
-                        <a:t>MSFT</a:t>
-                      </a:r>
-                      <a:endParaRPr lang="en-US" sz="2000" dirty="0"/>
-                    </a:p>
-                  </a:txBody>
-                  <a:tcPr/>
-                </a:tc>
-                <a:tc>
-                  <a:txBody>
-                    <a:bodyPr/>
-                    <a:lstStyle/>
-                    <a:p>
-                      <a:pPr algn="r"/>
-                      <a:r>
-                        <a:rPr lang="en-US" sz="2000" dirty="0" smtClean="0"/>
-                        <a:t>2020-08-19</a:t>
-                      </a:r>
-                      <a:endParaRPr lang="en-US" sz="2000" dirty="0"/>
-                    </a:p>
-                  </a:txBody>
-                  <a:tcPr/>
-                </a:tc>
-                <a:tc>
-                  <a:txBody>
-                    <a:bodyPr/>
-                    <a:lstStyle/>
-                    <a:p>
-                      <a:pPr algn="r"/>
-                      <a:r>
-                        <a:rPr lang="en-US" sz="2000" dirty="0" smtClean="0"/>
-                        <a:t>-0.0085</a:t>
-                      </a:r>
-                      <a:endParaRPr lang="en-US" sz="2000" dirty="0"/>
-                    </a:p>
-                  </a:txBody>
-                  <a:tcPr/>
-                </a:tc>
-                <a:tc>
-                  <a:txBody>
-                    <a:bodyPr/>
-                    <a:lstStyle/>
-                    <a:p>
-                      <a:pPr algn="r"/>
-                      <a:r>
-                        <a:rPr lang="en-US" sz="2000" dirty="0" smtClean="0"/>
-                        <a:t>209.70</a:t>
-                      </a:r>
-                      <a:endParaRPr lang="en-US" sz="2000" dirty="0"/>
-                    </a:p>
-                  </a:txBody>
-                  <a:tcPr/>
-                </a:tc>
-              </a:tr>
-              <a:tr h="370840">
-                <a:tc>
-                  <a:txBody>
-                    <a:bodyPr/>
-                    <a:lstStyle/>
-                    <a:p>
-                      <a:pPr algn="l"/>
-                      <a:r>
-                        <a:rPr lang="en-US" sz="2000" dirty="0" smtClean="0"/>
-                        <a:t>5</a:t>
-                      </a:r>
-                      <a:endParaRPr lang="en-US" sz="2000" dirty="0"/>
-                    </a:p>
-                  </a:txBody>
-                  <a:tcPr/>
-                </a:tc>
-                <a:tc>
-                  <a:txBody>
-                    <a:bodyPr/>
-                    <a:lstStyle/>
-                    <a:p>
-                      <a:pPr algn="l"/>
-                      <a:r>
-                        <a:rPr lang="en-US" sz="2000" dirty="0" smtClean="0"/>
-                        <a:t>XOM</a:t>
-                      </a:r>
-                      <a:endParaRPr lang="en-US" sz="2000" dirty="0"/>
-                    </a:p>
-                  </a:txBody>
-                  <a:tcPr/>
-                </a:tc>
-                <a:tc>
-                  <a:txBody>
-                    <a:bodyPr/>
-                    <a:lstStyle/>
-                    <a:p>
-                      <a:pPr algn="r"/>
-                      <a:r>
-                        <a:rPr lang="en-US" sz="2000" dirty="0" smtClean="0"/>
-                        <a:t>2020-08-18</a:t>
-                      </a:r>
-                      <a:endParaRPr lang="en-US" sz="2000" dirty="0"/>
-                    </a:p>
-                  </a:txBody>
-                  <a:tcPr/>
-                </a:tc>
-                <a:tc>
-                  <a:txBody>
-                    <a:bodyPr/>
-                    <a:lstStyle/>
-                    <a:p>
-                      <a:pPr algn="r"/>
-                      <a:r>
-                        <a:rPr lang="en-US" sz="2000" dirty="0" smtClean="0"/>
-                        <a:t>-0.0049</a:t>
-                      </a:r>
-                      <a:endParaRPr lang="en-US" sz="2000" dirty="0"/>
-                    </a:p>
-                  </a:txBody>
-                  <a:tcPr/>
-                </a:tc>
-                <a:tc>
-                  <a:txBody>
-                    <a:bodyPr/>
-                    <a:lstStyle/>
-                    <a:p>
-                      <a:pPr algn="r"/>
-                      <a:r>
-                        <a:rPr lang="en-US" sz="2000" dirty="0" smtClean="0"/>
-                        <a:t>42.43</a:t>
-                      </a:r>
-                      <a:endParaRPr lang="en-US" sz="2000" dirty="0"/>
-                    </a:p>
-                  </a:txBody>
-                  <a:tcPr/>
-                </a:tc>
-              </a:tr>
-              <a:tr h="370840">
-                <a:tc>
-                  <a:txBody>
-                    <a:bodyPr/>
-                    <a:lstStyle/>
-                    <a:p>
-                      <a:pPr algn="l"/>
-                      <a:r>
-                        <a:rPr lang="en-US" sz="2000" dirty="0" smtClean="0"/>
-                        <a:t>6</a:t>
-                      </a:r>
-                      <a:endParaRPr lang="en-US" sz="2000" dirty="0"/>
+                      <a:endParaRPr lang="en-US" sz="2000" dirty="0">
+                        <a:solidFill>
+                          <a:schemeClr val="bg2">
+                            <a:lumMod val="25000"/>
+                          </a:schemeClr>
+                        </a:solidFill>
+                      </a:endParaRPr>
                     </a:p>
                   </a:txBody>
                   <a:tcPr>
@@ -12908,10 +12839,72 @@
                     <a:bodyPr/>
                     <a:lstStyle/>
                     <a:p>
+                      <a:pPr algn="ctr"/>
+                      <a:r>
+                        <a:rPr lang="en-US" sz="2000" dirty="0" smtClean="0"/>
+                        <a:t>date</a:t>
+                      </a:r>
+                      <a:endParaRPr lang="en-US" sz="2000" dirty="0"/>
+                    </a:p>
+                  </a:txBody>
+                  <a:tcPr/>
+                </a:tc>
+                <a:tc>
+                  <a:txBody>
+                    <a:bodyPr/>
+                    <a:lstStyle/>
+                    <a:p>
+                      <a:pPr algn="ctr"/>
+                      <a:r>
+                        <a:rPr lang="en-US" sz="2000" dirty="0" smtClean="0"/>
+                        <a:t>return</a:t>
+                      </a:r>
+                      <a:endParaRPr lang="en-US" sz="2000" dirty="0"/>
+                    </a:p>
+                  </a:txBody>
+                  <a:tcPr/>
+                </a:tc>
+                <a:tc>
+                  <a:txBody>
+                    <a:bodyPr/>
+                    <a:lstStyle/>
+                    <a:p>
+                      <a:pPr algn="ctr"/>
+                      <a:r>
+                        <a:rPr lang="en-US" sz="2000" dirty="0" smtClean="0"/>
+                        <a:t>price</a:t>
+                      </a:r>
+                      <a:endParaRPr lang="en-US" sz="2000" dirty="0"/>
+                    </a:p>
+                  </a:txBody>
+                  <a:tcPr/>
+                </a:tc>
+              </a:tr>
+              <a:tr h="370840">
+                <a:tc>
+                  <a:txBody>
+                    <a:bodyPr/>
+                    <a:lstStyle/>
+                    <a:p>
                       <a:pPr algn="l"/>
                       <a:r>
                         <a:rPr lang="en-US" sz="2000" dirty="0" smtClean="0"/>
-                        <a:t>XOM</a:t>
+                        <a:t>1</a:t>
+                      </a:r>
+                      <a:endParaRPr lang="en-US" sz="2000" dirty="0"/>
+                    </a:p>
+                  </a:txBody>
+                  <a:tcPr/>
+                </a:tc>
+                <a:tc>
+                  <a:txBody>
+                    <a:bodyPr/>
+                    <a:lstStyle/>
+                    <a:p>
+                      <a:pPr algn="l"/>
+                      <a:r>
+                        <a:rPr lang="en-US" sz="2000" dirty="0" smtClean="0"/>
+                        <a:t>AAPL</a:t>
                       </a:r>
                       <a:endParaRPr lang="en-US" sz="2000" dirty="0"/>
                     </a:p>
@@ -12938,6 +12931,68 @@
                       <a:endParaRPr lang="en-US" sz="2000" dirty="0"/>
                     </a:p>
                   </a:txBody>
+                  <a:tcPr/>
+                </a:tc>
+                <a:tc>
+                  <a:txBody>
+                    <a:bodyPr/>
+                    <a:lstStyle/>
+                    <a:p>
+                      <a:pPr algn="r"/>
+                      <a:r>
+                        <a:rPr lang="en-US" sz="2000" dirty="0" smtClean="0"/>
+                        <a:t>0.0083</a:t>
+                      </a:r>
+                      <a:endParaRPr lang="en-US" sz="2000" dirty="0"/>
+                    </a:p>
+                  </a:txBody>
+                  <a:tcPr/>
+                </a:tc>
+                <a:tc>
+                  <a:txBody>
+                    <a:bodyPr/>
+                    <a:lstStyle/>
+                    <a:p>
+                      <a:pPr algn="r"/>
+                      <a:r>
+                        <a:rPr lang="en-US" sz="2000" dirty="0" smtClean="0"/>
+                        <a:t>462.25</a:t>
+                      </a:r>
+                      <a:endParaRPr lang="en-US" sz="2000" dirty="0"/>
+                    </a:p>
+                  </a:txBody>
+                  <a:tcPr/>
+                </a:tc>
+              </a:tr>
+              <a:tr h="370840">
+                <a:tc>
+                  <a:txBody>
+                    <a:bodyPr/>
+                    <a:lstStyle/>
+                    <a:p>
+                      <a:pPr algn="l"/>
+                      <a:r>
+                        <a:rPr lang="en-US" sz="2000" dirty="0" smtClean="0"/>
+                        <a:t>2</a:t>
+                      </a:r>
+                      <a:endParaRPr lang="en-US" sz="2000" dirty="0"/>
+                    </a:p>
+                  </a:txBody>
+                  <a:tcPr/>
+                </a:tc>
+                <a:tc>
+                  <a:txBody>
+                    <a:bodyPr/>
+                    <a:lstStyle/>
+                    <a:p>
+                      <a:pPr algn="l"/>
+                      <a:r>
+                        <a:rPr lang="en-US" sz="2000" dirty="0" smtClean="0"/>
+                        <a:t>AAPL</a:t>
+                      </a:r>
+                      <a:endParaRPr lang="en-US" sz="2000" dirty="0"/>
+                    </a:p>
+                  </a:txBody>
                   <a:tcPr>
                     <a:solidFill>
                       <a:schemeClr val="accent2">
@@ -12955,7 +13010,69 @@
                       <a:pPr algn="r"/>
                       <a:r>
                         <a:rPr lang="en-US" sz="2000" dirty="0" smtClean="0"/>
-                        <a:t>-0.0049</a:t>
+                        <a:t>2020-08-19</a:t>
+                      </a:r>
+                      <a:endParaRPr lang="en-US" sz="2000" dirty="0"/>
+                    </a:p>
+                  </a:txBody>
+                  <a:tcPr/>
+                </a:tc>
+                <a:tc>
+                  <a:txBody>
+                    <a:bodyPr/>
+                    <a:lstStyle/>
+                    <a:p>
+                      <a:pPr algn="r"/>
+                      <a:r>
+                        <a:rPr lang="en-US" sz="2000" dirty="0" smtClean="0"/>
+                        <a:t>0.0013</a:t>
+                      </a:r>
+                      <a:endParaRPr lang="en-US" sz="2000" dirty="0"/>
+                    </a:p>
+                  </a:txBody>
+                  <a:tcPr/>
+                </a:tc>
+                <a:tc>
+                  <a:txBody>
+                    <a:bodyPr/>
+                    <a:lstStyle/>
+                    <a:p>
+                      <a:pPr algn="r"/>
+                      <a:r>
+                        <a:rPr lang="en-US" sz="2000" dirty="0" smtClean="0"/>
+                        <a:t>462.83</a:t>
+                      </a:r>
+                      <a:endParaRPr lang="en-US" sz="2000" dirty="0"/>
+                    </a:p>
+                  </a:txBody>
+                  <a:tcPr/>
+                </a:tc>
+              </a:tr>
+              <a:tr h="370840">
+                <a:tc>
+                  <a:txBody>
+                    <a:bodyPr/>
+                    <a:lstStyle/>
+                    <a:p>
+                      <a:pPr algn="l"/>
+                      <a:r>
+                        <a:rPr lang="en-US" sz="2000" dirty="0" smtClean="0"/>
+                        <a:t>3</a:t>
+                      </a:r>
+                      <a:endParaRPr lang="en-US" sz="2000" dirty="0"/>
+                    </a:p>
+                  </a:txBody>
+                  <a:tcPr/>
+                </a:tc>
+                <a:tc>
+                  <a:txBody>
+                    <a:bodyPr/>
+                    <a:lstStyle/>
+                    <a:p>
+                      <a:pPr algn="l"/>
+                      <a:r>
+                        <a:rPr lang="en-US" sz="2000" dirty="0" smtClean="0"/>
+                        <a:t>MSFT</a:t>
                       </a:r>
                       <a:endParaRPr lang="en-US" sz="2000" dirty="0"/>
                     </a:p>
@@ -12977,7 +13094,69 @@
                       <a:pPr algn="r"/>
                       <a:r>
                         <a:rPr lang="en-US" sz="2000" dirty="0" smtClean="0"/>
-                        <a:t>42.43</a:t>
+                        <a:t>2020-08-18</a:t>
+                      </a:r>
+                      <a:endParaRPr lang="en-US" sz="2000" dirty="0"/>
+                    </a:p>
+                  </a:txBody>
+                  <a:tcPr/>
+                </a:tc>
+                <a:tc>
+                  <a:txBody>
+                    <a:bodyPr/>
+                    <a:lstStyle/>
+                    <a:p>
+                      <a:pPr algn="r"/>
+                      <a:r>
+                        <a:rPr lang="en-US" sz="2000" dirty="0" smtClean="0"/>
+                        <a:t>0.0058</a:t>
+                      </a:r>
+                      <a:endParaRPr lang="en-US" sz="2000" dirty="0"/>
+                    </a:p>
+                  </a:txBody>
+                  <a:tcPr/>
+                </a:tc>
+                <a:tc>
+                  <a:txBody>
+                    <a:bodyPr/>
+                    <a:lstStyle/>
+                    <a:p>
+                      <a:pPr algn="r"/>
+                      <a:r>
+                        <a:rPr lang="en-US" sz="2000" dirty="0" smtClean="0"/>
+                        <a:t>211.49</a:t>
+                      </a:r>
+                      <a:endParaRPr lang="en-US" sz="2000" dirty="0"/>
+                    </a:p>
+                  </a:txBody>
+                  <a:tcPr/>
+                </a:tc>
+              </a:tr>
+              <a:tr h="370840">
+                <a:tc>
+                  <a:txBody>
+                    <a:bodyPr/>
+                    <a:lstStyle/>
+                    <a:p>
+                      <a:pPr algn="l"/>
+                      <a:r>
+                        <a:rPr lang="en-US" sz="2000" dirty="0" smtClean="0"/>
+                        <a:t>4</a:t>
+                      </a:r>
+                      <a:endParaRPr lang="en-US" sz="2000" dirty="0"/>
+                    </a:p>
+                  </a:txBody>
+                  <a:tcPr/>
+                </a:tc>
+                <a:tc>
+                  <a:txBody>
+                    <a:bodyPr/>
+                    <a:lstStyle/>
+                    <a:p>
+                      <a:pPr algn="l"/>
+                      <a:r>
+                        <a:rPr lang="en-US" sz="2000" dirty="0" smtClean="0"/>
+                        <a:t>MSFT</a:t>
                       </a:r>
                       <a:endParaRPr lang="en-US" sz="2000" dirty="0"/>
                     </a:p>
@@ -12991,6 +13170,135 @@
                     </a:solidFill>
                   </a:tcPr>
                 </a:tc>
+                <a:tc>
+                  <a:txBody>
+                    <a:bodyPr/>
+                    <a:lstStyle/>
+                    <a:p>
+                      <a:pPr algn="r"/>
+                      <a:r>
+                        <a:rPr lang="en-US" sz="2000" dirty="0" smtClean="0"/>
+                        <a:t>2020-08-19</a:t>
+                      </a:r>
+                      <a:endParaRPr lang="en-US" sz="2000" dirty="0"/>
+                    </a:p>
+                  </a:txBody>
+                  <a:tcPr/>
+                </a:tc>
+                <a:tc>
+                  <a:txBody>
+                    <a:bodyPr/>
+                    <a:lstStyle/>
+                    <a:p>
+                      <a:pPr algn="r"/>
+                      <a:r>
+                        <a:rPr lang="en-US" sz="2000" dirty="0" smtClean="0"/>
+                        <a:t>-0.0085</a:t>
+                      </a:r>
+                      <a:endParaRPr lang="en-US" sz="2000" dirty="0"/>
+                    </a:p>
+                  </a:txBody>
+                  <a:tcPr/>
+                </a:tc>
+                <a:tc>
+                  <a:txBody>
+                    <a:bodyPr/>
+                    <a:lstStyle/>
+                    <a:p>
+                      <a:pPr algn="r"/>
+                      <a:r>
+                        <a:rPr lang="en-US" sz="2000" dirty="0" smtClean="0"/>
+                        <a:t>209.70</a:t>
+                      </a:r>
+                      <a:endParaRPr lang="en-US" sz="2000" dirty="0"/>
+                    </a:p>
+                  </a:txBody>
+                  <a:tcPr/>
+                </a:tc>
+              </a:tr>
+              <a:tr h="370840">
+                <a:tc>
+                  <a:txBody>
+                    <a:bodyPr/>
+                    <a:lstStyle/>
+                    <a:p>
+                      <a:pPr algn="l"/>
+                      <a:r>
+                        <a:rPr lang="en-US" sz="2000" dirty="0" smtClean="0"/>
+                        <a:t>5</a:t>
+                      </a:r>
+                      <a:endParaRPr lang="en-US" sz="2000" dirty="0"/>
+                    </a:p>
+                  </a:txBody>
+                  <a:tcPr/>
+                </a:tc>
+                <a:tc>
+                  <a:txBody>
+                    <a:bodyPr/>
+                    <a:lstStyle/>
+                    <a:p>
+                      <a:pPr algn="l"/>
+                      <a:r>
+                        <a:rPr lang="en-US" sz="2000" dirty="0" smtClean="0"/>
+                        <a:t>XOM</a:t>
+                      </a:r>
+                      <a:endParaRPr lang="en-US" sz="2000" dirty="0"/>
+                    </a:p>
+                  </a:txBody>
+                  <a:tcPr>
+                    <a:solidFill>
+                      <a:schemeClr val="accent2">
+                        <a:lumMod val="40000"/>
+                        <a:lumOff val="60000"/>
+                      </a:schemeClr>
+                    </a:solidFill>
+                  </a:tcPr>
+                </a:tc>
+                <a:tc>
+                  <a:txBody>
+                    <a:bodyPr/>
+                    <a:lstStyle/>
+                    <a:p>
+                      <a:pPr algn="r"/>
+                      <a:r>
+                        <a:rPr lang="en-US" sz="2000" dirty="0" smtClean="0"/>
+                        <a:t>2020-08-18</a:t>
+                      </a:r>
+                      <a:endParaRPr lang="en-US" sz="2000" dirty="0"/>
+                    </a:p>
+                  </a:txBody>
+                  <a:tcPr/>
+                </a:tc>
+                <a:tc>
+                  <a:txBody>
+                    <a:bodyPr/>
+                    <a:lstStyle/>
+                    <a:p>
+                      <a:pPr algn="r"/>
+                      <a:r>
+                        <a:rPr lang="en-US" sz="2000" dirty="0" smtClean="0"/>
+                        <a:t>-0.0049</a:t>
+                      </a:r>
+                      <a:endParaRPr lang="en-US" sz="2000" dirty="0"/>
+                    </a:p>
+                  </a:txBody>
+                  <a:tcPr/>
+                </a:tc>
+                <a:tc>
+                  <a:txBody>
+                    <a:bodyPr/>
+                    <a:lstStyle/>
+                    <a:p>
+                      <a:pPr algn="r"/>
+                      <a:r>
+                        <a:rPr lang="en-US" sz="2000" dirty="0" smtClean="0"/>
+                        <a:t>42.43</a:t>
+                      </a:r>
+                      <a:endParaRPr lang="en-US" sz="2000" dirty="0"/>
+                    </a:p>
+                  </a:txBody>
+                  <a:tcPr/>
+                </a:tc>
               </a:tr>
             </a:tbl>
           </a:graphicData>
@@ -12998,20 +13306,20 @@
       </p:graphicFrame>
       <p:graphicFrame>
         <p:nvGraphicFramePr>
-          <p:cNvPr id="7" name="Table 6"/>
+          <p:cNvPr id="9" name="Table 8"/>
           <p:cNvGraphicFramePr>
             <a:graphicFrameLocks noGrp="1"/>
           </p:cNvGraphicFramePr>
           <p:nvPr>
             <p:extLst>
               <p:ext uri="{D42A27DB-BD31-4B8C-83A1-F6EECF244321}">
-                <p14:modId xmlns:p14="http://schemas.microsoft.com/office/powerpoint/2010/main" val="2778073021"/>
+                <p14:modId xmlns:p14="http://schemas.microsoft.com/office/powerpoint/2010/main" val="1372022422"/>
               </p:ext>
             </p:extLst>
           </p:nvPr>
         </p:nvGraphicFramePr>
         <p:xfrm>
-          <a:off x="6800273" y="2004060"/>
+          <a:off x="6805137" y="1945857"/>
           <a:ext cx="4216398" cy="1584960"/>
         </p:xfrm>
         <a:graphic>
@@ -13032,13 +13340,32 @@
                     <a:lstStyle/>
                     <a:p>
                       <a:r>
-                        <a:rPr lang="en-US" sz="2000" dirty="0" smtClean="0"/>
+                        <a:rPr lang="en-US" sz="2000" dirty="0" smtClean="0">
+                          <a:solidFill>
+                            <a:schemeClr val="bg2">
+                              <a:lumMod val="25000"/>
+                            </a:schemeClr>
+                          </a:solidFill>
+                        </a:rPr>
                         <a:t>ticker</a:t>
                       </a:r>
-                      <a:endParaRPr lang="en-US" sz="2000" dirty="0"/>
-                    </a:p>
-                  </a:txBody>
-                  <a:tcPr/>
+                      <a:endParaRPr lang="en-US" sz="2000" dirty="0">
+                        <a:solidFill>
+                          <a:schemeClr val="bg2">
+                            <a:lumMod val="25000"/>
+                          </a:schemeClr>
+                        </a:solidFill>
+                      </a:endParaRPr>
+                    </a:p>
+                  </a:txBody>
+                  <a:tcPr>
+                    <a:solidFill>
+                      <a:schemeClr val="accent2">
+                        <a:lumMod val="40000"/>
+                        <a:lumOff val="60000"/>
+                      </a:schemeClr>
+                    </a:solidFill>
+                  </a:tcPr>
                 </a:tc>
                 <a:tc>
                   <a:txBody>
@@ -13082,7 +13409,14 @@
                       <a:endParaRPr lang="en-US" sz="2000" dirty="0"/>
                     </a:p>
                   </a:txBody>
-                  <a:tcPr/>
+                  <a:tcPr>
+                    <a:solidFill>
+                      <a:schemeClr val="accent2">
+                        <a:lumMod val="40000"/>
+                        <a:lumOff val="60000"/>
+                      </a:schemeClr>
+                    </a:solidFill>
+                  </a:tcPr>
                 </a:tc>
                 <a:tc>
                   <a:txBody>
@@ -13126,7 +13460,14 @@
                       <a:endParaRPr lang="en-US" sz="2000" dirty="0"/>
                     </a:p>
                   </a:txBody>
-                  <a:tcPr/>
+                  <a:tcPr>
+                    <a:solidFill>
+                      <a:schemeClr val="accent2">
+                        <a:lumMod val="40000"/>
+                        <a:lumOff val="60000"/>
+                      </a:schemeClr>
+                    </a:solidFill>
+                  </a:tcPr>
                 </a:tc>
                 <a:tc>
                   <a:txBody>
@@ -13170,7 +13511,14 @@
                       <a:endParaRPr lang="en-US" sz="2000" dirty="0"/>
                     </a:p>
                   </a:txBody>
-                  <a:tcPr/>
+                  <a:tcPr>
+                    <a:solidFill>
+                      <a:schemeClr val="accent2">
+                        <a:lumMod val="40000"/>
+                        <a:lumOff val="60000"/>
+                      </a:schemeClr>
+                    </a:solidFill>
+                  </a:tcPr>
                 </a:tc>
                 <a:tc>
                   <a:txBody>
@@ -13208,7 +13556,7 @@
     </p:spTree>
     <p:extLst>
       <p:ext uri="{BB962C8B-B14F-4D97-AF65-F5344CB8AC3E}">
-        <p14:creationId xmlns:p14="http://schemas.microsoft.com/office/powerpoint/2010/main" val="2871118362"/>
+        <p14:creationId xmlns:p14="http://schemas.microsoft.com/office/powerpoint/2010/main" val="2240526998"/>
       </p:ext>
     </p:extLst>
   </p:cSld>
@@ -13266,7 +13614,7 @@
           <a:p>
             <a:r>
               <a:rPr lang="en-US" sz="3800" dirty="0" smtClean="0"/>
-              <a:t>SQL: Foreign Keys</a:t>
+              <a:t>SQL: Composite Keys</a:t>
             </a:r>
             <a:endParaRPr lang="en-US" sz="3800" dirty="0"/>
           </a:p>
@@ -13307,7 +13655,23 @@
             </a:pPr>
             <a:r>
               <a:rPr lang="en-US" sz="2400" dirty="0" smtClean="0"/>
-              <a:t>A foreign key is a column in a table that links this table to another one</a:t>
+              <a:t>This one is easy, we can uniquely identify a row with two columns, which totally makes sense in the case of the </a:t>
+            </a:r>
+            <a:r>
+              <a:rPr lang="en-US" sz="2400" b="1" dirty="0" smtClean="0"/>
+              <a:t>`</a:t>
+            </a:r>
+            <a:r>
+              <a:rPr lang="en-US" sz="2400" b="1" dirty="0" err="1" smtClean="0"/>
+              <a:t>stock_info</a:t>
+            </a:r>
+            <a:r>
+              <a:rPr lang="en-US" sz="2400" b="1" dirty="0" smtClean="0"/>
+              <a:t>`</a:t>
+            </a:r>
+            <a:r>
+              <a:rPr lang="en-US" sz="2400" dirty="0" smtClean="0"/>
+              <a:t> table:</a:t>
             </a:r>
           </a:p>
           <a:p>
@@ -13322,7 +13686,7 @@
                 <a:spcPts val="1200"/>
               </a:spcAft>
             </a:pPr>
-            <a:endParaRPr lang="en-US" sz="2400" dirty="0"/>
+            <a:endParaRPr lang="en-US" sz="2400" dirty="0" smtClean="0"/>
           </a:p>
           <a:p>
             <a:pPr>
@@ -13350,79 +13714,6 @@
                 <a:spcPts val="1200"/>
               </a:spcAft>
             </a:pPr>
-            <a:endParaRPr lang="en-US" sz="2400" dirty="0"/>
-          </a:p>
-          <a:p>
-            <a:pPr marL="0" indent="0">
-              <a:lnSpc>
-                <a:spcPct val="100000"/>
-              </a:lnSpc>
-              <a:spcBef>
-                <a:spcPts val="1200"/>
-              </a:spcBef>
-              <a:spcAft>
-                <a:spcPts val="1200"/>
-              </a:spcAft>
-              <a:buNone/>
-            </a:pPr>
-            <a:endParaRPr lang="en-US" sz="2400" dirty="0" smtClean="0"/>
-          </a:p>
-          <a:p>
-            <a:pPr>
-              <a:lnSpc>
-                <a:spcPct val="100000"/>
-              </a:lnSpc>
-              <a:spcBef>
-                <a:spcPts val="1200"/>
-              </a:spcBef>
-              <a:spcAft>
-                <a:spcPts val="1200"/>
-              </a:spcAft>
-            </a:pPr>
-            <a:r>
-              <a:rPr lang="en-US" sz="2400" dirty="0" smtClean="0"/>
-              <a:t>In the example above the </a:t>
-            </a:r>
-            <a:r>
-              <a:rPr lang="en-US" sz="2400" b="1" dirty="0" smtClean="0"/>
-              <a:t>`</a:t>
-            </a:r>
-            <a:r>
-              <a:rPr lang="en-US" sz="2400" b="1" dirty="0" err="1" smtClean="0"/>
-              <a:t>stock_data</a:t>
-            </a:r>
-            <a:r>
-              <a:rPr lang="en-US" sz="2400" b="1" dirty="0" smtClean="0"/>
-              <a:t>`</a:t>
-            </a:r>
-            <a:r>
-              <a:rPr lang="en-US" sz="2400" dirty="0" smtClean="0"/>
-              <a:t> table  </a:t>
-            </a:r>
-            <a:r>
-              <a:rPr lang="en-US" sz="2400" b="1" dirty="0" smtClean="0"/>
-              <a:t>`ticker`</a:t>
-            </a:r>
-            <a:r>
-              <a:rPr lang="en-US" sz="2400" dirty="0" smtClean="0"/>
-              <a:t> is a foreign key, because it is a primary key in the </a:t>
-            </a:r>
-            <a:r>
-              <a:rPr lang="en-US" sz="2400" b="1" dirty="0" smtClean="0"/>
-              <a:t>`</a:t>
-            </a:r>
-            <a:r>
-              <a:rPr lang="en-US" sz="2400" b="1" dirty="0" err="1" smtClean="0"/>
-              <a:t>stock_info</a:t>
-            </a:r>
-            <a:r>
-              <a:rPr lang="en-US" sz="2400" b="1" dirty="0" smtClean="0"/>
-              <a:t>`</a:t>
-            </a:r>
-            <a:r>
-              <a:rPr lang="en-US" sz="2400" dirty="0" smtClean="0"/>
-              <a:t> table</a:t>
-            </a:r>
             <a:endParaRPr lang="en-US" sz="2400" dirty="0"/>
           </a:p>
           <a:p>
@@ -13552,14 +13843,14 @@
           <p:nvPr>
             <p:extLst>
               <p:ext uri="{D42A27DB-BD31-4B8C-83A1-F6EECF244321}">
-                <p14:modId xmlns:p14="http://schemas.microsoft.com/office/powerpoint/2010/main" val="500175436"/>
+                <p14:modId xmlns:p14="http://schemas.microsoft.com/office/powerpoint/2010/main" val="763819018"/>
               </p:ext>
             </p:extLst>
           </p:nvPr>
         </p:nvGraphicFramePr>
         <p:xfrm>
-          <a:off x="1233791" y="1955422"/>
-          <a:ext cx="4871936" cy="2377440"/>
+          <a:off x="1760166" y="2497577"/>
+          <a:ext cx="4335834" cy="2377440"/>
         </p:xfrm>
         <a:graphic>
           <a:graphicData uri="http://schemas.openxmlformats.org/drawingml/2006/table">
@@ -13568,28 +13859,12 @@
                 <a:tableStyleId>{5C22544A-7EE6-4342-B048-85BDC9FD1C3A}</a:tableStyleId>
               </a:tblPr>
               <a:tblGrid>
-                <a:gridCol w="536102"/>
                 <a:gridCol w="826851"/>
                 <a:gridCol w="1417536"/>
                 <a:gridCol w="1001949"/>
                 <a:gridCol w="1089498"/>
               </a:tblGrid>
               <a:tr h="370840">
-                <a:tc>
-                  <a:txBody>
-                    <a:bodyPr/>
-                    <a:lstStyle/>
-                    <a:p>
-                      <a:pPr algn="l"/>
-                      <a:r>
-                        <a:rPr lang="en-US" sz="2000" dirty="0" smtClean="0"/>
-                        <a:t>id</a:t>
-                      </a:r>
-                      <a:endParaRPr lang="en-US" sz="2000" dirty="0"/>
-                    </a:p>
-                  </a:txBody>
-                  <a:tcPr/>
-                </a:tc>
                 <a:tc>
                   <a:txBody>
                     <a:bodyPr/>
@@ -13631,72 +13906,22 @@
                     <a:p>
                       <a:pPr algn="ctr"/>
                       <a:r>
-                        <a:rPr lang="en-US" sz="2000" dirty="0" smtClean="0"/>
+                        <a:rPr lang="en-US" sz="2000" dirty="0" smtClean="0">
+                          <a:solidFill>
+                            <a:schemeClr val="bg2">
+                              <a:lumMod val="25000"/>
+                            </a:schemeClr>
+                          </a:solidFill>
+                        </a:rPr>
                         <a:t>date</a:t>
                       </a:r>
-                      <a:endParaRPr lang="en-US" sz="2000" dirty="0"/>
-                    </a:p>
-                  </a:txBody>
-                  <a:tcPr/>
-                </a:tc>
-                <a:tc>
-                  <a:txBody>
-                    <a:bodyPr/>
-                    <a:lstStyle/>
-                    <a:p>
-                      <a:pPr algn="ctr"/>
-                      <a:r>
-                        <a:rPr lang="en-US" sz="2000" dirty="0" smtClean="0"/>
-                        <a:t>return</a:t>
-                      </a:r>
-                      <a:endParaRPr lang="en-US" sz="2000" dirty="0"/>
-                    </a:p>
-                  </a:txBody>
-                  <a:tcPr/>
-                </a:tc>
-                <a:tc>
-                  <a:txBody>
-                    <a:bodyPr/>
-                    <a:lstStyle/>
-                    <a:p>
-                      <a:pPr algn="ctr"/>
-                      <a:r>
-                        <a:rPr lang="en-US" sz="2000" dirty="0" smtClean="0"/>
-                        <a:t>price</a:t>
-                      </a:r>
-                      <a:endParaRPr lang="en-US" sz="2000" dirty="0"/>
-                    </a:p>
-                  </a:txBody>
-                  <a:tcPr/>
-                </a:tc>
-              </a:tr>
-              <a:tr h="370840">
-                <a:tc>
-                  <a:txBody>
-                    <a:bodyPr/>
-                    <a:lstStyle/>
-                    <a:p>
-                      <a:pPr algn="l"/>
-                      <a:r>
-                        <a:rPr lang="en-US" sz="2000" dirty="0" smtClean="0"/>
-                        <a:t>1</a:t>
-                      </a:r>
-                      <a:endParaRPr lang="en-US" sz="2000" dirty="0"/>
-                    </a:p>
-                  </a:txBody>
-                  <a:tcPr/>
-                </a:tc>
-                <a:tc>
-                  <a:txBody>
-                    <a:bodyPr/>
-                    <a:lstStyle/>
-                    <a:p>
-                      <a:pPr algn="l"/>
-                      <a:r>
-                        <a:rPr lang="en-US" sz="2000" dirty="0" smtClean="0"/>
-                        <a:t>AAPL</a:t>
-                      </a:r>
-                      <a:endParaRPr lang="en-US" sz="2000" dirty="0"/>
+                      <a:endParaRPr lang="en-US" sz="2000" dirty="0">
+                        <a:solidFill>
+                          <a:schemeClr val="bg2">
+                            <a:lumMod val="25000"/>
+                          </a:schemeClr>
+                        </a:solidFill>
+                      </a:endParaRPr>
                     </a:p>
                   </a:txBody>
                   <a:tcPr>
@@ -13713,10 +13938,10 @@
                     <a:bodyPr/>
                     <a:lstStyle/>
                     <a:p>
-                      <a:pPr algn="r"/>
-                      <a:r>
-                        <a:rPr lang="en-US" sz="2000" dirty="0" smtClean="0"/>
-                        <a:t>2020-08-18</a:t>
+                      <a:pPr algn="ctr"/>
+                      <a:r>
+                        <a:rPr lang="en-US" sz="2000" dirty="0" smtClean="0"/>
+                        <a:t>return</a:t>
                       </a:r>
                       <a:endParaRPr lang="en-US" sz="2000" dirty="0"/>
                     </a:p>
@@ -13728,25 +13953,10 @@
                     <a:bodyPr/>
                     <a:lstStyle/>
                     <a:p>
-                      <a:pPr algn="r"/>
-                      <a:r>
-                        <a:rPr lang="en-US" sz="2000" dirty="0" smtClean="0"/>
-                        <a:t>0.0083</a:t>
-                      </a:r>
-                      <a:endParaRPr lang="en-US" sz="2000" dirty="0"/>
-                    </a:p>
-                  </a:txBody>
-                  <a:tcPr/>
-                </a:tc>
-                <a:tc>
-                  <a:txBody>
-                    <a:bodyPr/>
-                    <a:lstStyle/>
-                    <a:p>
-                      <a:pPr algn="r"/>
-                      <a:r>
-                        <a:rPr lang="en-US" sz="2000" dirty="0" smtClean="0"/>
-                        <a:t>462.25</a:t>
+                      <a:pPr algn="ctr"/>
+                      <a:r>
+                        <a:rPr lang="en-US" sz="2000" dirty="0" smtClean="0"/>
+                        <a:t>price</a:t>
                       </a:r>
                       <a:endParaRPr lang="en-US" sz="2000" dirty="0"/>
                     </a:p>
@@ -13755,21 +13965,6 @@
                 </a:tc>
               </a:tr>
               <a:tr h="370840">
-                <a:tc>
-                  <a:txBody>
-                    <a:bodyPr/>
-                    <a:lstStyle/>
-                    <a:p>
-                      <a:pPr algn="l"/>
-                      <a:r>
-                        <a:rPr lang="en-US" sz="2000" dirty="0" smtClean="0"/>
-                        <a:t>2</a:t>
-                      </a:r>
-                      <a:endParaRPr lang="en-US" sz="2000" dirty="0"/>
-                    </a:p>
-                  </a:txBody>
-                  <a:tcPr/>
-                </a:tc>
                 <a:tc>
                   <a:txBody>
                     <a:bodyPr/>
@@ -13800,69 +13995,7 @@
                       <a:pPr algn="r"/>
                       <a:r>
                         <a:rPr lang="en-US" sz="2000" dirty="0" smtClean="0"/>
-                        <a:t>2020-08-19</a:t>
-                      </a:r>
-                      <a:endParaRPr lang="en-US" sz="2000" dirty="0"/>
-                    </a:p>
-                  </a:txBody>
-                  <a:tcPr/>
-                </a:tc>
-                <a:tc>
-                  <a:txBody>
-                    <a:bodyPr/>
-                    <a:lstStyle/>
-                    <a:p>
-                      <a:pPr algn="r"/>
-                      <a:r>
-                        <a:rPr lang="en-US" sz="2000" dirty="0" smtClean="0"/>
-                        <a:t>0.0013</a:t>
-                      </a:r>
-                      <a:endParaRPr lang="en-US" sz="2000" dirty="0"/>
-                    </a:p>
-                  </a:txBody>
-                  <a:tcPr/>
-                </a:tc>
-                <a:tc>
-                  <a:txBody>
-                    <a:bodyPr/>
-                    <a:lstStyle/>
-                    <a:p>
-                      <a:pPr algn="r"/>
-                      <a:r>
-                        <a:rPr lang="en-US" sz="2000" dirty="0" smtClean="0"/>
-                        <a:t>462.83</a:t>
-                      </a:r>
-                      <a:endParaRPr lang="en-US" sz="2000" dirty="0"/>
-                    </a:p>
-                  </a:txBody>
-                  <a:tcPr/>
-                </a:tc>
-              </a:tr>
-              <a:tr h="370840">
-                <a:tc>
-                  <a:txBody>
-                    <a:bodyPr/>
-                    <a:lstStyle/>
-                    <a:p>
-                      <a:pPr algn="l"/>
-                      <a:r>
-                        <a:rPr lang="en-US" sz="2000" dirty="0" smtClean="0"/>
-                        <a:t>3</a:t>
-                      </a:r>
-                      <a:endParaRPr lang="en-US" sz="2000" dirty="0"/>
-                    </a:p>
-                  </a:txBody>
-                  <a:tcPr/>
-                </a:tc>
-                <a:tc>
-                  <a:txBody>
-                    <a:bodyPr/>
-                    <a:lstStyle/>
-                    <a:p>
-                      <a:pPr algn="l"/>
-                      <a:r>
-                        <a:rPr lang="en-US" sz="2000" dirty="0" smtClean="0"/>
-                        <a:t>MSFT</a:t>
+                        <a:t>2020-08-18</a:t>
                       </a:r>
                       <a:endParaRPr lang="en-US" sz="2000" dirty="0"/>
                     </a:p>
@@ -13884,7 +14017,7 @@
                       <a:pPr algn="r"/>
                       <a:r>
                         <a:rPr lang="en-US" sz="2000" dirty="0" smtClean="0"/>
-                        <a:t>2020-08-18</a:t>
+                        <a:t>0.0083</a:t>
                       </a:r>
                       <a:endParaRPr lang="en-US" sz="2000" dirty="0"/>
                     </a:p>
@@ -13899,22 +14032,7 @@
                       <a:pPr algn="r"/>
                       <a:r>
                         <a:rPr lang="en-US" sz="2000" dirty="0" smtClean="0"/>
-                        <a:t>0.0058</a:t>
-                      </a:r>
-                      <a:endParaRPr lang="en-US" sz="2000" dirty="0"/>
-                    </a:p>
-                  </a:txBody>
-                  <a:tcPr/>
-                </a:tc>
-                <a:tc>
-                  <a:txBody>
-                    <a:bodyPr/>
-                    <a:lstStyle/>
-                    <a:p>
-                      <a:pPr algn="r"/>
-                      <a:r>
-                        <a:rPr lang="en-US" sz="2000" dirty="0" smtClean="0"/>
-                        <a:t>211.49</a:t>
+                        <a:t>462.25</a:t>
                       </a:r>
                       <a:endParaRPr lang="en-US" sz="2000" dirty="0"/>
                     </a:p>
@@ -13931,22 +14049,7 @@
                       <a:pPr algn="l"/>
                       <a:r>
                         <a:rPr lang="en-US" sz="2000" dirty="0" smtClean="0"/>
-                        <a:t>4</a:t>
-                      </a:r>
-                      <a:endParaRPr lang="en-US" sz="2000" dirty="0"/>
-                    </a:p>
-                  </a:txBody>
-                  <a:tcPr/>
-                </a:tc>
-                <a:tc>
-                  <a:txBody>
-                    <a:bodyPr/>
-                    <a:lstStyle/>
-                    <a:p>
-                      <a:pPr algn="l"/>
-                      <a:r>
-                        <a:rPr lang="en-US" sz="2000" dirty="0" smtClean="0"/>
-                        <a:t>MSFT</a:t>
+                        <a:t>AAPL</a:t>
                       </a:r>
                       <a:endParaRPr lang="en-US" sz="2000" dirty="0"/>
                     </a:p>
@@ -13973,68 +14076,6 @@
                       <a:endParaRPr lang="en-US" sz="2000" dirty="0"/>
                     </a:p>
                   </a:txBody>
-                  <a:tcPr/>
-                </a:tc>
-                <a:tc>
-                  <a:txBody>
-                    <a:bodyPr/>
-                    <a:lstStyle/>
-                    <a:p>
-                      <a:pPr algn="r"/>
-                      <a:r>
-                        <a:rPr lang="en-US" sz="2000" dirty="0" smtClean="0"/>
-                        <a:t>-0.0085</a:t>
-                      </a:r>
-                      <a:endParaRPr lang="en-US" sz="2000" dirty="0"/>
-                    </a:p>
-                  </a:txBody>
-                  <a:tcPr/>
-                </a:tc>
-                <a:tc>
-                  <a:txBody>
-                    <a:bodyPr/>
-                    <a:lstStyle/>
-                    <a:p>
-                      <a:pPr algn="r"/>
-                      <a:r>
-                        <a:rPr lang="en-US" sz="2000" dirty="0" smtClean="0"/>
-                        <a:t>209.70</a:t>
-                      </a:r>
-                      <a:endParaRPr lang="en-US" sz="2000" dirty="0"/>
-                    </a:p>
-                  </a:txBody>
-                  <a:tcPr/>
-                </a:tc>
-              </a:tr>
-              <a:tr h="370840">
-                <a:tc>
-                  <a:txBody>
-                    <a:bodyPr/>
-                    <a:lstStyle/>
-                    <a:p>
-                      <a:pPr algn="l"/>
-                      <a:r>
-                        <a:rPr lang="en-US" sz="2000" dirty="0" smtClean="0"/>
-                        <a:t>5</a:t>
-                      </a:r>
-                      <a:endParaRPr lang="en-US" sz="2000" dirty="0"/>
-                    </a:p>
-                  </a:txBody>
-                  <a:tcPr/>
-                </a:tc>
-                <a:tc>
-                  <a:txBody>
-                    <a:bodyPr/>
-                    <a:lstStyle/>
-                    <a:p>
-                      <a:pPr algn="l"/>
-                      <a:r>
-                        <a:rPr lang="en-US" sz="2000" dirty="0" smtClean="0"/>
-                        <a:t>XOM</a:t>
-                      </a:r>
-                      <a:endParaRPr lang="en-US" sz="2000" dirty="0"/>
-                    </a:p>
-                  </a:txBody>
                   <a:tcPr>
                     <a:solidFill>
                       <a:schemeClr val="accent2">
@@ -14052,12 +14093,225 @@
                       <a:pPr algn="r"/>
                       <a:r>
                         <a:rPr lang="en-US" sz="2000" dirty="0" smtClean="0"/>
+                        <a:t>0.0013</a:t>
+                      </a:r>
+                      <a:endParaRPr lang="en-US" sz="2000" dirty="0"/>
+                    </a:p>
+                  </a:txBody>
+                  <a:tcPr/>
+                </a:tc>
+                <a:tc>
+                  <a:txBody>
+                    <a:bodyPr/>
+                    <a:lstStyle/>
+                    <a:p>
+                      <a:pPr algn="r"/>
+                      <a:r>
+                        <a:rPr lang="en-US" sz="2000" dirty="0" smtClean="0"/>
+                        <a:t>462.83</a:t>
+                      </a:r>
+                      <a:endParaRPr lang="en-US" sz="2000" dirty="0"/>
+                    </a:p>
+                  </a:txBody>
+                  <a:tcPr/>
+                </a:tc>
+              </a:tr>
+              <a:tr h="370840">
+                <a:tc>
+                  <a:txBody>
+                    <a:bodyPr/>
+                    <a:lstStyle/>
+                    <a:p>
+                      <a:pPr algn="l"/>
+                      <a:r>
+                        <a:rPr lang="en-US" sz="2000" dirty="0" smtClean="0"/>
+                        <a:t>MSFT</a:t>
+                      </a:r>
+                      <a:endParaRPr lang="en-US" sz="2000" dirty="0"/>
+                    </a:p>
+                  </a:txBody>
+                  <a:tcPr>
+                    <a:solidFill>
+                      <a:schemeClr val="accent2">
+                        <a:lumMod val="40000"/>
+                        <a:lumOff val="60000"/>
+                      </a:schemeClr>
+                    </a:solidFill>
+                  </a:tcPr>
+                </a:tc>
+                <a:tc>
+                  <a:txBody>
+                    <a:bodyPr/>
+                    <a:lstStyle/>
+                    <a:p>
+                      <a:pPr algn="r"/>
+                      <a:r>
+                        <a:rPr lang="en-US" sz="2000" dirty="0" smtClean="0"/>
                         <a:t>2020-08-18</a:t>
                       </a:r>
                       <a:endParaRPr lang="en-US" sz="2000" dirty="0"/>
                     </a:p>
                   </a:txBody>
+                  <a:tcPr>
+                    <a:solidFill>
+                      <a:schemeClr val="accent2">
+                        <a:lumMod val="40000"/>
+                        <a:lumOff val="60000"/>
+                      </a:schemeClr>
+                    </a:solidFill>
+                  </a:tcPr>
+                </a:tc>
+                <a:tc>
+                  <a:txBody>
+                    <a:bodyPr/>
+                    <a:lstStyle/>
+                    <a:p>
+                      <a:pPr algn="r"/>
+                      <a:r>
+                        <a:rPr lang="en-US" sz="2000" dirty="0" smtClean="0"/>
+                        <a:t>0.0058</a:t>
+                      </a:r>
+                      <a:endParaRPr lang="en-US" sz="2000" dirty="0"/>
+                    </a:p>
+                  </a:txBody>
                   <a:tcPr/>
+                </a:tc>
+                <a:tc>
+                  <a:txBody>
+                    <a:bodyPr/>
+                    <a:lstStyle/>
+                    <a:p>
+                      <a:pPr algn="r"/>
+                      <a:r>
+                        <a:rPr lang="en-US" sz="2000" dirty="0" smtClean="0"/>
+                        <a:t>211.49</a:t>
+                      </a:r>
+                      <a:endParaRPr lang="en-US" sz="2000" dirty="0"/>
+                    </a:p>
+                  </a:txBody>
+                  <a:tcPr/>
+                </a:tc>
+              </a:tr>
+              <a:tr h="370840">
+                <a:tc>
+                  <a:txBody>
+                    <a:bodyPr/>
+                    <a:lstStyle/>
+                    <a:p>
+                      <a:pPr algn="l"/>
+                      <a:r>
+                        <a:rPr lang="en-US" sz="2000" dirty="0" smtClean="0"/>
+                        <a:t>MSFT</a:t>
+                      </a:r>
+                      <a:endParaRPr lang="en-US" sz="2000" dirty="0"/>
+                    </a:p>
+                  </a:txBody>
+                  <a:tcPr>
+                    <a:solidFill>
+                      <a:schemeClr val="accent2">
+                        <a:lumMod val="40000"/>
+                        <a:lumOff val="60000"/>
+                      </a:schemeClr>
+                    </a:solidFill>
+                  </a:tcPr>
+                </a:tc>
+                <a:tc>
+                  <a:txBody>
+                    <a:bodyPr/>
+                    <a:lstStyle/>
+                    <a:p>
+                      <a:pPr algn="r"/>
+                      <a:r>
+                        <a:rPr lang="en-US" sz="2000" dirty="0" smtClean="0"/>
+                        <a:t>2020-08-19</a:t>
+                      </a:r>
+                      <a:endParaRPr lang="en-US" sz="2000" dirty="0"/>
+                    </a:p>
+                  </a:txBody>
+                  <a:tcPr>
+                    <a:solidFill>
+                      <a:schemeClr val="accent2">
+                        <a:lumMod val="40000"/>
+                        <a:lumOff val="60000"/>
+                      </a:schemeClr>
+                    </a:solidFill>
+                  </a:tcPr>
+                </a:tc>
+                <a:tc>
+                  <a:txBody>
+                    <a:bodyPr/>
+                    <a:lstStyle/>
+                    <a:p>
+                      <a:pPr algn="r"/>
+                      <a:r>
+                        <a:rPr lang="en-US" sz="2000" dirty="0" smtClean="0"/>
+                        <a:t>-0.0085</a:t>
+                      </a:r>
+                      <a:endParaRPr lang="en-US" sz="2000" dirty="0"/>
+                    </a:p>
+                  </a:txBody>
+                  <a:tcPr/>
+                </a:tc>
+                <a:tc>
+                  <a:txBody>
+                    <a:bodyPr/>
+                    <a:lstStyle/>
+                    <a:p>
+                      <a:pPr algn="r"/>
+                      <a:r>
+                        <a:rPr lang="en-US" sz="2000" dirty="0" smtClean="0"/>
+                        <a:t>209.70</a:t>
+                      </a:r>
+                      <a:endParaRPr lang="en-US" sz="2000" dirty="0"/>
+                    </a:p>
+                  </a:txBody>
+                  <a:tcPr/>
+                </a:tc>
+              </a:tr>
+              <a:tr h="370840">
+                <a:tc>
+                  <a:txBody>
+                    <a:bodyPr/>
+                    <a:lstStyle/>
+                    <a:p>
+                      <a:pPr algn="l"/>
+                      <a:r>
+                        <a:rPr lang="en-US" sz="2000" dirty="0" smtClean="0"/>
+                        <a:t>XOM</a:t>
+                      </a:r>
+                      <a:endParaRPr lang="en-US" sz="2000" dirty="0"/>
+                    </a:p>
+                  </a:txBody>
+                  <a:tcPr>
+                    <a:solidFill>
+                      <a:schemeClr val="accent2">
+                        <a:lumMod val="40000"/>
+                        <a:lumOff val="60000"/>
+                      </a:schemeClr>
+                    </a:solidFill>
+                  </a:tcPr>
+                </a:tc>
+                <a:tc>
+                  <a:txBody>
+                    <a:bodyPr/>
+                    <a:lstStyle/>
+                    <a:p>
+                      <a:pPr algn="r"/>
+                      <a:r>
+                        <a:rPr lang="en-US" sz="2000" dirty="0" smtClean="0"/>
+                        <a:t>2020-08-18</a:t>
+                      </a:r>
+                      <a:endParaRPr lang="en-US" sz="2000" dirty="0"/>
+                    </a:p>
+                  </a:txBody>
+                  <a:tcPr>
+                    <a:solidFill>
+                      <a:schemeClr val="accent2">
+                        <a:lumMod val="40000"/>
+                        <a:lumOff val="60000"/>
+                      </a:schemeClr>
+                    </a:solidFill>
+                  </a:tcPr>
                 </a:tc>
                 <a:tc>
                   <a:txBody>
@@ -14096,20 +14350,20 @@
       </p:graphicFrame>
       <p:graphicFrame>
         <p:nvGraphicFramePr>
-          <p:cNvPr id="9" name="Table 8"/>
+          <p:cNvPr id="6" name="Table 5"/>
           <p:cNvGraphicFramePr>
             <a:graphicFrameLocks noGrp="1"/>
           </p:cNvGraphicFramePr>
           <p:nvPr>
             <p:extLst>
               <p:ext uri="{D42A27DB-BD31-4B8C-83A1-F6EECF244321}">
-                <p14:modId xmlns:p14="http://schemas.microsoft.com/office/powerpoint/2010/main" val="1372022422"/>
+                <p14:modId xmlns:p14="http://schemas.microsoft.com/office/powerpoint/2010/main" val="4061275170"/>
               </p:ext>
             </p:extLst>
           </p:nvPr>
         </p:nvGraphicFramePr>
         <p:xfrm>
-          <a:off x="6805137" y="1945857"/>
+          <a:off x="6800273" y="2497577"/>
           <a:ext cx="4216398" cy="1584960"/>
         </p:xfrm>
         <a:graphic>
@@ -14130,32 +14384,13 @@
                     <a:lstStyle/>
                     <a:p>
                       <a:r>
-                        <a:rPr lang="en-US" sz="2000" dirty="0" smtClean="0">
-                          <a:solidFill>
-                            <a:schemeClr val="bg2">
-                              <a:lumMod val="25000"/>
-                            </a:schemeClr>
-                          </a:solidFill>
-                        </a:rPr>
+                        <a:rPr lang="en-US" sz="2000" dirty="0" smtClean="0"/>
                         <a:t>ticker</a:t>
                       </a:r>
-                      <a:endParaRPr lang="en-US" sz="2000" dirty="0">
-                        <a:solidFill>
-                          <a:schemeClr val="bg2">
-                            <a:lumMod val="25000"/>
-                          </a:schemeClr>
-                        </a:solidFill>
-                      </a:endParaRPr>
-                    </a:p>
-                  </a:txBody>
-                  <a:tcPr>
-                    <a:solidFill>
-                      <a:schemeClr val="accent2">
-                        <a:lumMod val="40000"/>
-                        <a:lumOff val="60000"/>
-                      </a:schemeClr>
-                    </a:solidFill>
-                  </a:tcPr>
+                      <a:endParaRPr lang="en-US" sz="2000" dirty="0"/>
+                    </a:p>
+                  </a:txBody>
+                  <a:tcPr/>
                 </a:tc>
                 <a:tc>
                   <a:txBody>
@@ -14199,14 +14434,7 @@
                       <a:endParaRPr lang="en-US" sz="2000" dirty="0"/>
                     </a:p>
                   </a:txBody>
-                  <a:tcPr>
-                    <a:solidFill>
-                      <a:schemeClr val="accent2">
-                        <a:lumMod val="40000"/>
-                        <a:lumOff val="60000"/>
-                      </a:schemeClr>
-                    </a:solidFill>
-                  </a:tcPr>
+                  <a:tcPr/>
                 </a:tc>
                 <a:tc>
                   <a:txBody>
@@ -14250,14 +14478,7 @@
                       <a:endParaRPr lang="en-US" sz="2000" dirty="0"/>
                     </a:p>
                   </a:txBody>
-                  <a:tcPr>
-                    <a:solidFill>
-                      <a:schemeClr val="accent2">
-                        <a:lumMod val="40000"/>
-                        <a:lumOff val="60000"/>
-                      </a:schemeClr>
-                    </a:solidFill>
-                  </a:tcPr>
+                  <a:tcPr/>
                 </a:tc>
                 <a:tc>
                   <a:txBody>
@@ -14301,14 +14522,7 @@
                       <a:endParaRPr lang="en-US" sz="2000" dirty="0"/>
                     </a:p>
                   </a:txBody>
-                  <a:tcPr>
-                    <a:solidFill>
-                      <a:schemeClr val="accent2">
-                        <a:lumMod val="40000"/>
-                        <a:lumOff val="60000"/>
-                      </a:schemeClr>
-                    </a:solidFill>
-                  </a:tcPr>
+                  <a:tcPr/>
                 </a:tc>
                 <a:tc>
                   <a:txBody>
@@ -14346,7 +14560,7 @@
     </p:spTree>
     <p:extLst>
       <p:ext uri="{BB962C8B-B14F-4D97-AF65-F5344CB8AC3E}">
-        <p14:creationId xmlns:p14="http://schemas.microsoft.com/office/powerpoint/2010/main" val="2240526998"/>
+        <p14:creationId xmlns:p14="http://schemas.microsoft.com/office/powerpoint/2010/main" val="4066648977"/>
       </p:ext>
     </p:extLst>
   </p:cSld>

</xml_diff>

<commit_message>
database lecture and tutorial -- done
</commit_message>
<xml_diff>
--- a/databases/databases_slides.pptx
+++ b/databases/databases_slides.pptx
@@ -9203,7 +9203,7 @@
           <p:nvPr>
             <p:extLst>
               <p:ext uri="{D42A27DB-BD31-4B8C-83A1-F6EECF244321}">
-                <p14:modId xmlns:p14="http://schemas.microsoft.com/office/powerpoint/2010/main" val="13408021"/>
+                <p14:modId xmlns:p14="http://schemas.microsoft.com/office/powerpoint/2010/main" val="2615802202"/>
               </p:ext>
             </p:extLst>
           </p:nvPr>
@@ -9264,7 +9264,7 @@
                       <a:pPr algn="ctr"/>
                       <a:r>
                         <a:rPr lang="en-US" sz="2000" dirty="0" smtClean="0"/>
-                        <a:t>date</a:t>
+                        <a:t>_date</a:t>
                       </a:r>
                       <a:endParaRPr lang="en-US" sz="2000" dirty="0"/>
                     </a:p>
@@ -9279,7 +9279,7 @@
                       <a:pPr algn="ctr"/>
                       <a:r>
                         <a:rPr lang="en-US" sz="2000" dirty="0" smtClean="0"/>
-                        <a:t>return</a:t>
+                        <a:t>ret</a:t>
                       </a:r>
                       <a:endParaRPr lang="en-US" sz="2000" dirty="0"/>
                     </a:p>
@@ -9700,7 +9700,7 @@
           <p:nvPr>
             <p:extLst>
               <p:ext uri="{D42A27DB-BD31-4B8C-83A1-F6EECF244321}">
-                <p14:modId xmlns:p14="http://schemas.microsoft.com/office/powerpoint/2010/main" val="2026394717"/>
+                <p14:modId xmlns:p14="http://schemas.microsoft.com/office/powerpoint/2010/main" val="2855999006"/>
               </p:ext>
             </p:extLst>
           </p:nvPr>
@@ -9742,7 +9742,7 @@
                     <a:p>
                       <a:r>
                         <a:rPr lang="en-US" sz="2000" dirty="0" smtClean="0"/>
-                        <a:t>name</a:t>
+                        <a:t>_name</a:t>
                       </a:r>
                       <a:endParaRPr lang="en-US" sz="2000" dirty="0"/>
                     </a:p>
@@ -11606,7 +11606,7 @@
           <p:nvPr>
             <p:extLst>
               <p:ext uri="{D42A27DB-BD31-4B8C-83A1-F6EECF244321}">
-                <p14:modId xmlns:p14="http://schemas.microsoft.com/office/powerpoint/2010/main" val="2428687625"/>
+                <p14:modId xmlns:p14="http://schemas.microsoft.com/office/powerpoint/2010/main" val="3739710786"/>
               </p:ext>
             </p:extLst>
           </p:nvPr>
@@ -11667,7 +11667,7 @@
                       <a:pPr algn="ctr"/>
                       <a:r>
                         <a:rPr lang="en-US" sz="2000" dirty="0" smtClean="0"/>
-                        <a:t>date</a:t>
+                        <a:t>_date</a:t>
                       </a:r>
                       <a:endParaRPr lang="en-US" sz="2000" dirty="0"/>
                     </a:p>
@@ -11682,7 +11682,7 @@
                       <a:pPr algn="ctr"/>
                       <a:r>
                         <a:rPr lang="en-US" sz="2000" dirty="0" smtClean="0"/>
-                        <a:t>return</a:t>
+                        <a:t>ret</a:t>
                       </a:r>
                       <a:endParaRPr lang="en-US" sz="2000" dirty="0"/>
                     </a:p>
@@ -12215,7 +12215,7 @@
           <p:nvPr>
             <p:extLst>
               <p:ext uri="{D42A27DB-BD31-4B8C-83A1-F6EECF244321}">
-                <p14:modId xmlns:p14="http://schemas.microsoft.com/office/powerpoint/2010/main" val="2778073021"/>
+                <p14:modId xmlns:p14="http://schemas.microsoft.com/office/powerpoint/2010/main" val="2866819878"/>
               </p:ext>
             </p:extLst>
           </p:nvPr>
@@ -12257,7 +12257,7 @@
                     <a:p>
                       <a:r>
                         <a:rPr lang="en-US" sz="2000" dirty="0" smtClean="0"/>
-                        <a:t>name</a:t>
+                        <a:t>_name</a:t>
                       </a:r>
                       <a:endParaRPr lang="en-US" sz="2000" dirty="0"/>
                     </a:p>
@@ -12762,7 +12762,7 @@
           <p:nvPr>
             <p:extLst>
               <p:ext uri="{D42A27DB-BD31-4B8C-83A1-F6EECF244321}">
-                <p14:modId xmlns:p14="http://schemas.microsoft.com/office/powerpoint/2010/main" val="500175436"/>
+                <p14:modId xmlns:p14="http://schemas.microsoft.com/office/powerpoint/2010/main" val="753645852"/>
               </p:ext>
             </p:extLst>
           </p:nvPr>
@@ -12842,7 +12842,7 @@
                       <a:pPr algn="ctr"/>
                       <a:r>
                         <a:rPr lang="en-US" sz="2000" dirty="0" smtClean="0"/>
-                        <a:t>date</a:t>
+                        <a:t>_date</a:t>
                       </a:r>
                       <a:endParaRPr lang="en-US" sz="2000" dirty="0"/>
                     </a:p>
@@ -12857,7 +12857,7 @@
                       <a:pPr algn="ctr"/>
                       <a:r>
                         <a:rPr lang="en-US" sz="2000" dirty="0" smtClean="0"/>
-                        <a:t>return</a:t>
+                        <a:t>ret</a:t>
                       </a:r>
                       <a:endParaRPr lang="en-US" sz="2000" dirty="0"/>
                     </a:p>
@@ -13313,7 +13313,7 @@
           <p:nvPr>
             <p:extLst>
               <p:ext uri="{D42A27DB-BD31-4B8C-83A1-F6EECF244321}">
-                <p14:modId xmlns:p14="http://schemas.microsoft.com/office/powerpoint/2010/main" val="1372022422"/>
+                <p14:modId xmlns:p14="http://schemas.microsoft.com/office/powerpoint/2010/main" val="1952846452"/>
               </p:ext>
             </p:extLst>
           </p:nvPr>
@@ -13374,7 +13374,7 @@
                     <a:p>
                       <a:r>
                         <a:rPr lang="en-US" sz="2000" dirty="0" smtClean="0"/>
-                        <a:t>name</a:t>
+                        <a:t>_name</a:t>
                       </a:r>
                       <a:endParaRPr lang="en-US" sz="2000" dirty="0"/>
                     </a:p>
@@ -13843,7 +13843,7 @@
           <p:nvPr>
             <p:extLst>
               <p:ext uri="{D42A27DB-BD31-4B8C-83A1-F6EECF244321}">
-                <p14:modId xmlns:p14="http://schemas.microsoft.com/office/powerpoint/2010/main" val="763819018"/>
+                <p14:modId xmlns:p14="http://schemas.microsoft.com/office/powerpoint/2010/main" val="2423432526"/>
               </p:ext>
             </p:extLst>
           </p:nvPr>
@@ -13913,7 +13913,7 @@
                             </a:schemeClr>
                           </a:solidFill>
                         </a:rPr>
-                        <a:t>date</a:t>
+                        <a:t>_date</a:t>
                       </a:r>
                       <a:endParaRPr lang="en-US" sz="2000" dirty="0">
                         <a:solidFill>
@@ -13941,7 +13941,7 @@
                       <a:pPr algn="ctr"/>
                       <a:r>
                         <a:rPr lang="en-US" sz="2000" dirty="0" smtClean="0"/>
-                        <a:t>return</a:t>
+                        <a:t>ret</a:t>
                       </a:r>
                       <a:endParaRPr lang="en-US" sz="2000" dirty="0"/>
                     </a:p>
@@ -14357,7 +14357,7 @@
           <p:nvPr>
             <p:extLst>
               <p:ext uri="{D42A27DB-BD31-4B8C-83A1-F6EECF244321}">
-                <p14:modId xmlns:p14="http://schemas.microsoft.com/office/powerpoint/2010/main" val="4061275170"/>
+                <p14:modId xmlns:p14="http://schemas.microsoft.com/office/powerpoint/2010/main" val="675656683"/>
               </p:ext>
             </p:extLst>
           </p:nvPr>
@@ -14399,7 +14399,7 @@
                     <a:p>
                       <a:r>
                         <a:rPr lang="en-US" sz="2000" dirty="0" smtClean="0"/>
-                        <a:t>name</a:t>
+                        <a:t>_name</a:t>
                       </a:r>
                       <a:endParaRPr lang="en-US" sz="2000" dirty="0"/>
                     </a:p>

</xml_diff>

<commit_message>
typos in sql lecture
</commit_message>
<xml_diff>
--- a/databases/databases_slides.pptx
+++ b/databases/databases_slides.pptx
@@ -5,7 +5,7 @@
     <p:sldMasterId id="2147483834" r:id="rId1"/>
   </p:sldMasterIdLst>
   <p:notesMasterIdLst>
-    <p:notesMasterId r:id="rId13"/>
+    <p:notesMasterId r:id="rId14"/>
   </p:notesMasterIdLst>
   <p:sldIdLst>
     <p:sldId id="256" r:id="rId2"/>
@@ -14,11 +14,12 @@
     <p:sldId id="284" r:id="rId5"/>
     <p:sldId id="285" r:id="rId6"/>
     <p:sldId id="287" r:id="rId7"/>
-    <p:sldId id="289" r:id="rId8"/>
-    <p:sldId id="290" r:id="rId9"/>
-    <p:sldId id="291" r:id="rId10"/>
-    <p:sldId id="288" r:id="rId11"/>
-    <p:sldId id="292" r:id="rId12"/>
+    <p:sldId id="293" r:id="rId8"/>
+    <p:sldId id="289" r:id="rId9"/>
+    <p:sldId id="290" r:id="rId10"/>
+    <p:sldId id="291" r:id="rId11"/>
+    <p:sldId id="288" r:id="rId12"/>
+    <p:sldId id="292" r:id="rId13"/>
   </p:sldIdLst>
   <p:sldSz cx="12192000" cy="6858000"/>
   <p:notesSz cx="6858000" cy="9144000"/>
@@ -228,7 +229,7 @@
           <a:p>
             <a:fld id="{FB4ABF83-DE1D-439A-9038-821E6E7BE630}" type="datetimeFigureOut">
               <a:rPr lang="en-US" smtClean="0"/>
-              <a:t>8/20/2020</a:t>
+              <a:t>11/1/2020</a:t>
             </a:fld>
             <a:endParaRPr lang="en-US"/>
           </a:p>
@@ -540,68 +541,192 @@
           <a:bodyPr/>
           <a:lstStyle/>
           <a:p>
-            <a:r>
-              <a:rPr lang="en-US" sz="1200" b="0" i="0" kern="1200" dirty="0" smtClean="0">
-                <a:solidFill>
-                  <a:schemeClr val="tx1"/>
-                </a:solidFill>
+            <a:pPr marL="342900" marR="0" lvl="0" indent="-342900">
+              <a:lnSpc>
+                <a:spcPct val="150000"/>
+              </a:lnSpc>
+              <a:spcBef>
+                <a:spcPts val="1200"/>
+              </a:spcBef>
+              <a:spcAft>
+                <a:spcPts val="940"/>
+              </a:spcAft>
+              <a:buFont typeface="Arial" panose="020B0604020202020204" pitchFamily="34" charset="0"/>
+              <a:buChar char="•"/>
+              <a:tabLst>
+                <a:tab pos="457200" algn="l"/>
+              </a:tabLst>
+            </a:pPr>
+            <a:r>
+              <a:rPr lang="en-US" sz="1200" dirty="0" smtClean="0">
                 <a:effectLst/>
-                <a:latin typeface="+mn-lt"/>
-                <a:ea typeface="+mn-ea"/>
-                <a:cs typeface="+mn-cs"/>
+                <a:latin typeface="Calibri" panose="020F0502020204030204" pitchFamily="34" charset="0"/>
+                <a:ea typeface="Times New Roman" panose="02020603050405020304" pitchFamily="18" charset="0"/>
+                <a:cs typeface="Times New Roman" panose="02020603050405020304" pitchFamily="18" charset="0"/>
               </a:rPr>
-              <a:t>Although the field of vision of a single human eye is about 120 degrees, the peripheral vision takes up 115 degrees and the 5 degrees is the central vision</a:t>
-            </a:r>
-          </a:p>
-          <a:p>
-            <a:endParaRPr lang="en-US" sz="1200" b="0" i="0" kern="1200" dirty="0" smtClean="0">
-              <a:solidFill>
-                <a:schemeClr val="tx1"/>
-              </a:solidFill>
+              <a:t>First we will have a brief overview of databases and DBMS</a:t>
+            </a:r>
+          </a:p>
+          <a:p>
+            <a:pPr marL="342900" marR="0" lvl="0" indent="-342900">
+              <a:lnSpc>
+                <a:spcPct val="150000"/>
+              </a:lnSpc>
+              <a:spcBef>
+                <a:spcPts val="1200"/>
+              </a:spcBef>
+              <a:spcAft>
+                <a:spcPts val="940"/>
+              </a:spcAft>
+              <a:buFont typeface="Arial" panose="020B0604020202020204" pitchFamily="34" charset="0"/>
+              <a:buChar char="•"/>
+              <a:tabLst>
+                <a:tab pos="457200" algn="l"/>
+              </a:tabLst>
+            </a:pPr>
+            <a:endParaRPr lang="en-US" sz="1200" dirty="0" smtClean="0">
               <a:effectLst/>
-              <a:latin typeface="+mn-lt"/>
-              <a:ea typeface="+mn-ea"/>
-              <a:cs typeface="+mn-cs"/>
+              <a:latin typeface="Times New Roman" panose="02020603050405020304" pitchFamily="18" charset="0"/>
+              <a:ea typeface="Times New Roman" panose="02020603050405020304" pitchFamily="18" charset="0"/>
+              <a:cs typeface="Times New Roman" panose="02020603050405020304" pitchFamily="18" charset="0"/>
             </a:endParaRPr>
           </a:p>
           <a:p>
-            <a:r>
-              <a:rPr lang="en-US" sz="1200" b="0" i="0" kern="1200" dirty="0" smtClean="0">
-                <a:solidFill>
-                  <a:schemeClr val="tx1"/>
-                </a:solidFill>
+            <a:pPr marL="342900" marR="0" lvl="0" indent="-342900">
+              <a:lnSpc>
+                <a:spcPct val="150000"/>
+              </a:lnSpc>
+              <a:spcBef>
+                <a:spcPts val="1200"/>
+              </a:spcBef>
+              <a:spcAft>
+                <a:spcPts val="940"/>
+              </a:spcAft>
+              <a:buFont typeface="Arial" panose="020B0604020202020204" pitchFamily="34" charset="0"/>
+              <a:buChar char="•"/>
+              <a:tabLst>
+                <a:tab pos="457200" algn="l"/>
+              </a:tabLst>
+            </a:pPr>
+            <a:r>
+              <a:rPr lang="en-US" sz="1200" dirty="0" smtClean="0">
                 <a:effectLst/>
-                <a:latin typeface="+mn-lt"/>
-                <a:ea typeface="+mn-ea"/>
-                <a:cs typeface="+mn-cs"/>
+                <a:latin typeface="Calibri" panose="020F0502020204030204" pitchFamily="34" charset="0"/>
+                <a:ea typeface="Times New Roman" panose="02020603050405020304" pitchFamily="18" charset="0"/>
+                <a:cs typeface="Times New Roman" panose="02020603050405020304" pitchFamily="18" charset="0"/>
               </a:rPr>
-              <a:t>Try to focus on a single word in a text and check how quickly the resolution degrades with distance: only a couple words to the left and right on the current line and one-two lines above and below are clearly discernable</a:t>
-            </a:r>
-          </a:p>
-          <a:p>
-            <a:endParaRPr lang="en-US" sz="1200" b="0" i="0" kern="1200" dirty="0" smtClean="0">
-              <a:solidFill>
-                <a:schemeClr val="tx1"/>
-              </a:solidFill>
+              <a:t>Then we will discuss the key concepts of relational databases – one of the DBMS types</a:t>
+            </a:r>
+          </a:p>
+          <a:p>
+            <a:pPr marL="342900" marR="0" lvl="0" indent="-342900">
+              <a:lnSpc>
+                <a:spcPct val="150000"/>
+              </a:lnSpc>
+              <a:spcBef>
+                <a:spcPts val="1200"/>
+              </a:spcBef>
+              <a:spcAft>
+                <a:spcPts val="940"/>
+              </a:spcAft>
+              <a:buFont typeface="Arial" panose="020B0604020202020204" pitchFamily="34" charset="0"/>
+              <a:buChar char="•"/>
+              <a:tabLst>
+                <a:tab pos="457200" algn="l"/>
+              </a:tabLst>
+            </a:pPr>
+            <a:endParaRPr lang="en-US" sz="1200" dirty="0" smtClean="0">
               <a:effectLst/>
-              <a:latin typeface="+mn-lt"/>
-              <a:ea typeface="+mn-ea"/>
-              <a:cs typeface="+mn-cs"/>
+              <a:latin typeface="Times New Roman" panose="02020603050405020304" pitchFamily="18" charset="0"/>
+              <a:ea typeface="Times New Roman" panose="02020603050405020304" pitchFamily="18" charset="0"/>
+              <a:cs typeface="Times New Roman" panose="02020603050405020304" pitchFamily="18" charset="0"/>
             </a:endParaRPr>
           </a:p>
           <a:p>
-            <a:r>
-              <a:rPr lang="en-US" sz="1200" b="0" i="0" kern="1200" dirty="0" smtClean="0">
-                <a:solidFill>
-                  <a:schemeClr val="tx1"/>
-                </a:solidFill>
+            <a:pPr marL="342900" marR="0" lvl="0" indent="-342900">
+              <a:lnSpc>
+                <a:spcPct val="150000"/>
+              </a:lnSpc>
+              <a:spcBef>
+                <a:spcPts val="1200"/>
+              </a:spcBef>
+              <a:spcAft>
+                <a:spcPts val="940"/>
+              </a:spcAft>
+              <a:buFont typeface="Arial" panose="020B0604020202020204" pitchFamily="34" charset="0"/>
+              <a:buChar char="•"/>
+              <a:tabLst>
+                <a:tab pos="457200" algn="l"/>
+              </a:tabLst>
+            </a:pPr>
+            <a:r>
+              <a:rPr lang="en-US" sz="1200" dirty="0" smtClean="0">
                 <a:effectLst/>
-                <a:latin typeface="+mn-lt"/>
-                <a:ea typeface="+mn-ea"/>
-                <a:cs typeface="+mn-cs"/>
+                <a:latin typeface="Calibri" panose="020F0502020204030204" pitchFamily="34" charset="0"/>
+                <a:ea typeface="Times New Roman" panose="02020603050405020304" pitchFamily="18" charset="0"/>
+                <a:cs typeface="Times New Roman" panose="02020603050405020304" pitchFamily="18" charset="0"/>
               </a:rPr>
-              <a:t>Our eyes rapidly jump from one part of a sizable object to another -- something known as saccade -- and the brain creates an illusion of a broader visual field from the parsed patches</a:t>
-            </a:r>
+              <a:t>After that we will proceed to the MySQL tutorial for setting up a database and using core commands</a:t>
+            </a:r>
+          </a:p>
+          <a:p>
+            <a:pPr marL="342900" marR="0" lvl="0" indent="-342900">
+              <a:lnSpc>
+                <a:spcPct val="150000"/>
+              </a:lnSpc>
+              <a:spcBef>
+                <a:spcPts val="1200"/>
+              </a:spcBef>
+              <a:spcAft>
+                <a:spcPts val="940"/>
+              </a:spcAft>
+              <a:buFont typeface="Arial" panose="020B0604020202020204" pitchFamily="34" charset="0"/>
+              <a:buChar char="•"/>
+              <a:tabLst>
+                <a:tab pos="457200" algn="l"/>
+              </a:tabLst>
+            </a:pPr>
+            <a:endParaRPr lang="en-US" sz="1200" dirty="0" smtClean="0">
+              <a:effectLst/>
+              <a:latin typeface="Times New Roman" panose="02020603050405020304" pitchFamily="18" charset="0"/>
+              <a:ea typeface="Times New Roman" panose="02020603050405020304" pitchFamily="18" charset="0"/>
+              <a:cs typeface="Times New Roman" panose="02020603050405020304" pitchFamily="18" charset="0"/>
+            </a:endParaRPr>
+          </a:p>
+          <a:p>
+            <a:pPr marL="342900" marR="0" lvl="0" indent="-342900">
+              <a:lnSpc>
+                <a:spcPct val="150000"/>
+              </a:lnSpc>
+              <a:spcBef>
+                <a:spcPts val="1200"/>
+              </a:spcBef>
+              <a:spcAft>
+                <a:spcPts val="940"/>
+              </a:spcAft>
+              <a:buFont typeface="Arial" panose="020B0604020202020204" pitchFamily="34" charset="0"/>
+              <a:buChar char="•"/>
+              <a:tabLst>
+                <a:tab pos="457200" algn="l"/>
+              </a:tabLst>
+            </a:pPr>
+            <a:r>
+              <a:rPr lang="en-US" sz="1200" dirty="0" smtClean="0">
+                <a:effectLst/>
+                <a:latin typeface="Calibri" panose="020F0502020204030204" pitchFamily="34" charset="0"/>
+                <a:ea typeface="Times New Roman" panose="02020603050405020304" pitchFamily="18" charset="0"/>
+                <a:cs typeface="Times New Roman" panose="02020603050405020304" pitchFamily="18" charset="0"/>
+              </a:rPr>
+              <a:t>If there will be time we will show you how to connect SQL to Python </a:t>
+            </a:r>
+            <a:endParaRPr lang="en-US" sz="1200" dirty="0" smtClean="0">
+              <a:effectLst/>
+              <a:latin typeface="Times New Roman" panose="02020603050405020304" pitchFamily="18" charset="0"/>
+              <a:ea typeface="Times New Roman" panose="02020603050405020304" pitchFamily="18" charset="0"/>
+              <a:cs typeface="Times New Roman" panose="02020603050405020304" pitchFamily="18" charset="0"/>
+            </a:endParaRPr>
+          </a:p>
+          <a:p>
             <a:endParaRPr lang="en-US" sz="1200" b="0" i="0" kern="1200" dirty="0">
               <a:solidFill>
                 <a:schemeClr val="tx1"/>
@@ -728,6 +853,94 @@
     </p:spTree>
     <p:extLst>
       <p:ext uri="{BB962C8B-B14F-4D97-AF65-F5344CB8AC3E}">
+        <p14:creationId xmlns:p14="http://schemas.microsoft.com/office/powerpoint/2010/main" val="1004342444"/>
+      </p:ext>
+    </p:extLst>
+  </p:cSld>
+  <p:clrMapOvr>
+    <a:masterClrMapping/>
+  </p:clrMapOvr>
+</p:notes>
+</file>
+
+<file path=ppt/notesSlides/notesSlide11.xml><?xml version="1.0" encoding="utf-8"?>
+<p:notes xmlns:a="http://schemas.openxmlformats.org/drawingml/2006/main" xmlns:r="http://schemas.openxmlformats.org/officeDocument/2006/relationships" xmlns:p="http://schemas.openxmlformats.org/presentationml/2006/main">
+  <p:cSld>
+    <p:spTree>
+      <p:nvGrpSpPr>
+        <p:cNvPr id="1" name=""/>
+        <p:cNvGrpSpPr/>
+        <p:nvPr/>
+      </p:nvGrpSpPr>
+      <p:grpSpPr>
+        <a:xfrm>
+          <a:off x="0" y="0"/>
+          <a:ext cx="0" cy="0"/>
+          <a:chOff x="0" y="0"/>
+          <a:chExt cx="0" cy="0"/>
+        </a:xfrm>
+      </p:grpSpPr>
+      <p:sp>
+        <p:nvSpPr>
+          <p:cNvPr id="2" name="Slide Image Placeholder 1"/>
+          <p:cNvSpPr>
+            <a:spLocks noGrp="1" noRot="1" noChangeAspect="1"/>
+          </p:cNvSpPr>
+          <p:nvPr>
+            <p:ph type="sldImg"/>
+          </p:nvPr>
+        </p:nvSpPr>
+        <p:spPr/>
+      </p:sp>
+      <p:sp>
+        <p:nvSpPr>
+          <p:cNvPr id="3" name="Notes Placeholder 2"/>
+          <p:cNvSpPr>
+            <a:spLocks noGrp="1"/>
+          </p:cNvSpPr>
+          <p:nvPr>
+            <p:ph type="body" idx="1"/>
+          </p:nvPr>
+        </p:nvSpPr>
+        <p:spPr/>
+        <p:txBody>
+          <a:bodyPr/>
+          <a:lstStyle/>
+          <a:p>
+            <a:pPr marL="171450" indent="-171450">
+              <a:buFont typeface="Wingdings" panose="05000000000000000000" pitchFamily="2" charset="2"/>
+              <a:buChar char="Ø"/>
+            </a:pPr>
+            <a:endParaRPr lang="en-US" baseline="0" dirty="0" smtClean="0"/>
+          </a:p>
+        </p:txBody>
+      </p:sp>
+      <p:sp>
+        <p:nvSpPr>
+          <p:cNvPr id="4" name="Slide Number Placeholder 3"/>
+          <p:cNvSpPr>
+            <a:spLocks noGrp="1"/>
+          </p:cNvSpPr>
+          <p:nvPr>
+            <p:ph type="sldNum" sz="quarter" idx="10"/>
+          </p:nvPr>
+        </p:nvSpPr>
+        <p:spPr/>
+        <p:txBody>
+          <a:bodyPr/>
+          <a:lstStyle/>
+          <a:p>
+            <a:fld id="{AE1DE67C-C920-44E4-BE40-876EA236BA1A}" type="slidenum">
+              <a:rPr lang="en-US" smtClean="0"/>
+              <a:t>12</a:t>
+            </a:fld>
+            <a:endParaRPr lang="en-US"/>
+          </a:p>
+        </p:txBody>
+      </p:sp>
+    </p:spTree>
+    <p:extLst>
+      <p:ext uri="{BB962C8B-B14F-4D97-AF65-F5344CB8AC3E}">
         <p14:creationId xmlns:p14="http://schemas.microsoft.com/office/powerpoint/2010/main" val="1570150243"/>
       </p:ext>
     </p:extLst>
@@ -781,6 +994,50 @@
         <p:txBody>
           <a:bodyPr/>
           <a:lstStyle/>
+          <a:p>
+            <a:pPr marL="0" marR="0">
+              <a:lnSpc>
+                <a:spcPct val="150000"/>
+              </a:lnSpc>
+            </a:pPr>
+            <a:r>
+              <a:rPr lang="en-US" sz="1200" dirty="0" smtClean="0">
+                <a:effectLst/>
+                <a:latin typeface="Calibri" panose="020F0502020204030204" pitchFamily="34" charset="0"/>
+                <a:ea typeface="Times New Roman" panose="02020603050405020304" pitchFamily="18" charset="0"/>
+              </a:rPr>
+              <a:t>A database is an organized storage of information which can be literally anything from a shopping list to human brain.</a:t>
+            </a:r>
+            <a:r>
+              <a:rPr lang="en-US" sz="1200" baseline="0" dirty="0" smtClean="0">
+                <a:effectLst/>
+                <a:latin typeface="Calibri" panose="020F0502020204030204" pitchFamily="34" charset="0"/>
+                <a:ea typeface="Times New Roman" panose="02020603050405020304" pitchFamily="18" charset="0"/>
+              </a:rPr>
+              <a:t> For us, economics and finance folks a straightforward example would be some series retrieved from </a:t>
+            </a:r>
+            <a:r>
+              <a:rPr lang="en-US" sz="1200" baseline="0" dirty="0" err="1" smtClean="0">
+                <a:effectLst/>
+                <a:latin typeface="Calibri" panose="020F0502020204030204" pitchFamily="34" charset="0"/>
+                <a:ea typeface="Times New Roman" panose="02020603050405020304" pitchFamily="18" charset="0"/>
+              </a:rPr>
+              <a:t>Datastream</a:t>
+            </a:r>
+            <a:r>
+              <a:rPr lang="en-US" sz="1200" baseline="0" dirty="0" smtClean="0">
+                <a:effectLst/>
+                <a:latin typeface="Calibri" panose="020F0502020204030204" pitchFamily="34" charset="0"/>
+                <a:ea typeface="Times New Roman" panose="02020603050405020304" pitchFamily="18" charset="0"/>
+              </a:rPr>
+              <a:t> or Bloomberg stored in a csv file somewhere on the disk.</a:t>
+            </a:r>
+            <a:endParaRPr lang="en-US" sz="1200" dirty="0" smtClean="0">
+              <a:effectLst/>
+              <a:latin typeface="Times New Roman" panose="02020603050405020304" pitchFamily="18" charset="0"/>
+              <a:ea typeface="Times New Roman" panose="02020603050405020304" pitchFamily="18" charset="0"/>
+            </a:endParaRPr>
+          </a:p>
           <a:p>
             <a:endParaRPr lang="en-US" dirty="0"/>
           </a:p>
@@ -872,8 +1129,23 @@
             </a:r>
             <a:r>
               <a:rPr lang="en-US" baseline="0" dirty="0" smtClean="0"/>
-              <a:t> an give it instructions to query or modify the data.</a:t>
-            </a:r>
+              <a:t> </a:t>
+            </a:r>
+            <a:r>
+              <a:rPr lang="en-US" baseline="0" dirty="0" smtClean="0"/>
+              <a:t>and </a:t>
+            </a:r>
+            <a:r>
+              <a:rPr lang="en-US" baseline="0" dirty="0" smtClean="0"/>
+              <a:t>give it instructions to query or modify the data</a:t>
+            </a:r>
+            <a:r>
+              <a:rPr lang="en-US" baseline="0" dirty="0" smtClean="0"/>
+              <a:t>.</a:t>
+            </a:r>
+          </a:p>
+          <a:p>
+            <a:endParaRPr lang="en-US" baseline="0" dirty="0" smtClean="0"/>
           </a:p>
           <a:p>
             <a:r>
@@ -909,7 +1181,7 @@
             </a:r>
             <a:r>
               <a:rPr lang="en-US" baseline="0" dirty="0" smtClean="0"/>
-              <a:t> data</a:t>
+              <a:t> data: CRUD</a:t>
             </a:r>
           </a:p>
           <a:p>
@@ -917,11 +1189,7 @@
               <a:buFont typeface="Wingdings" panose="05000000000000000000" pitchFamily="2" charset="2"/>
               <a:buChar char="Ø"/>
             </a:pPr>
-            <a:r>
-              <a:rPr lang="en-US" baseline="0" dirty="0" smtClean="0"/>
-              <a:t>Handling concurrent requests</a:t>
-            </a:r>
-            <a:endParaRPr lang="en-US" dirty="0" smtClean="0"/>
+            <a:endParaRPr lang="en-US" baseline="0" dirty="0" smtClean="0"/>
           </a:p>
           <a:p>
             <a:pPr marL="628650" lvl="1" indent="-171450">
@@ -929,12 +1197,8 @@
               <a:buChar char="Ø"/>
             </a:pPr>
             <a:r>
-              <a:rPr lang="en-US" dirty="0" smtClean="0"/>
-              <a:t>Disk space</a:t>
-            </a:r>
-            <a:r>
               <a:rPr lang="en-US" baseline="0" dirty="0" smtClean="0"/>
-              <a:t> management</a:t>
+              <a:t>Interaction with programming languages: for instance maintaining a database of user names and passwords for a web page</a:t>
             </a:r>
           </a:p>
           <a:p>
@@ -942,10 +1206,7 @@
               <a:buFont typeface="Wingdings" panose="05000000000000000000" pitchFamily="2" charset="2"/>
               <a:buChar char="Ø"/>
             </a:pPr>
-            <a:r>
-              <a:rPr lang="en-US" baseline="0" dirty="0" smtClean="0"/>
-              <a:t>Security (Admins, Users)</a:t>
-            </a:r>
+            <a:endParaRPr lang="en-US" dirty="0" smtClean="0"/>
           </a:p>
           <a:p>
             <a:pPr marL="628650" lvl="1" indent="-171450">
@@ -954,7 +1215,24 @@
             </a:pPr>
             <a:r>
               <a:rPr lang="en-US" baseline="0" dirty="0" smtClean="0"/>
-              <a:t>Backups</a:t>
+              <a:t>Security: Admins and users with different rights: backup functionality</a:t>
+            </a:r>
+          </a:p>
+          <a:p>
+            <a:pPr marL="628650" lvl="1" indent="-171450">
+              <a:buFont typeface="Wingdings" panose="05000000000000000000" pitchFamily="2" charset="2"/>
+              <a:buChar char="Ø"/>
+            </a:pPr>
+            <a:endParaRPr lang="en-US" baseline="0" dirty="0" smtClean="0"/>
+          </a:p>
+          <a:p>
+            <a:pPr marL="628650" lvl="1" indent="-171450">
+              <a:buFont typeface="Wingdings" panose="05000000000000000000" pitchFamily="2" charset="2"/>
+              <a:buChar char="Ø"/>
+            </a:pPr>
+            <a:r>
+              <a:rPr lang="en-US" baseline="0" dirty="0" smtClean="0"/>
+              <a:t>Handling concurrent requests from several users: i.e. avoiding conflicts if multiple users try to simultaneously append the DB</a:t>
             </a:r>
             <a:endParaRPr lang="en-US" dirty="0" smtClean="0"/>
           </a:p>
@@ -1049,7 +1327,28 @@
             </a:pPr>
             <a:r>
               <a:rPr lang="en-US" baseline="0" dirty="0" smtClean="0"/>
-              <a:t>SQL is a standardized language for managing RDBMS</a:t>
+              <a:t>C</a:t>
+            </a:r>
+          </a:p>
+          <a:p>
+            <a:pPr marL="171450" indent="-171450">
+              <a:buFont typeface="Wingdings" panose="05000000000000000000" pitchFamily="2" charset="2"/>
+              <a:buChar char="Ø"/>
+            </a:pPr>
+            <a:endParaRPr lang="en-US" baseline="0" dirty="0" smtClean="0"/>
+          </a:p>
+          <a:p>
+            <a:pPr marL="171450" indent="-171450">
+              <a:buFont typeface="Wingdings" panose="05000000000000000000" pitchFamily="2" charset="2"/>
+              <a:buChar char="Ø"/>
+            </a:pPr>
+            <a:r>
+              <a:rPr lang="en-US" baseline="0" dirty="0" smtClean="0"/>
+              <a:t>SQL </a:t>
+            </a:r>
+            <a:r>
+              <a:rPr lang="en-US" baseline="0" dirty="0" smtClean="0"/>
+              <a:t>is a standardized language for managing RDBMS</a:t>
             </a:r>
           </a:p>
           <a:p>
@@ -1290,7 +1589,7 @@
     </p:spTree>
     <p:extLst>
       <p:ext uri="{BB962C8B-B14F-4D97-AF65-F5344CB8AC3E}">
-        <p14:creationId xmlns:p14="http://schemas.microsoft.com/office/powerpoint/2010/main" val="646505092"/>
+        <p14:creationId xmlns:p14="http://schemas.microsoft.com/office/powerpoint/2010/main" val="3504013284"/>
       </p:ext>
     </p:extLst>
   </p:cSld>
@@ -1378,7 +1677,7 @@
     </p:spTree>
     <p:extLst>
       <p:ext uri="{BB962C8B-B14F-4D97-AF65-F5344CB8AC3E}">
-        <p14:creationId xmlns:p14="http://schemas.microsoft.com/office/powerpoint/2010/main" val="3184359657"/>
+        <p14:creationId xmlns:p14="http://schemas.microsoft.com/office/powerpoint/2010/main" val="646505092"/>
       </p:ext>
     </p:extLst>
   </p:cSld>
@@ -1466,7 +1765,7 @@
     </p:spTree>
     <p:extLst>
       <p:ext uri="{BB962C8B-B14F-4D97-AF65-F5344CB8AC3E}">
-        <p14:creationId xmlns:p14="http://schemas.microsoft.com/office/powerpoint/2010/main" val="1733271830"/>
+        <p14:creationId xmlns:p14="http://schemas.microsoft.com/office/powerpoint/2010/main" val="3184359657"/>
       </p:ext>
     </p:extLst>
   </p:cSld>
@@ -1554,7 +1853,7 @@
     </p:spTree>
     <p:extLst>
       <p:ext uri="{BB962C8B-B14F-4D97-AF65-F5344CB8AC3E}">
-        <p14:creationId xmlns:p14="http://schemas.microsoft.com/office/powerpoint/2010/main" val="1004342444"/>
+        <p14:creationId xmlns:p14="http://schemas.microsoft.com/office/powerpoint/2010/main" val="1733271830"/>
       </p:ext>
     </p:extLst>
   </p:cSld>
@@ -1695,7 +1994,7 @@
           <a:p>
             <a:fld id="{BAEB4113-CC9A-4791-AE56-CF423D86ED9A}" type="datetimeFigureOut">
               <a:rPr lang="en-US" smtClean="0"/>
-              <a:t>8/20/2020</a:t>
+              <a:t>11/1/2020</a:t>
             </a:fld>
             <a:endParaRPr lang="en-US"/>
           </a:p>
@@ -1865,7 +2164,7 @@
           <a:p>
             <a:fld id="{BAEB4113-CC9A-4791-AE56-CF423D86ED9A}" type="datetimeFigureOut">
               <a:rPr lang="en-US" smtClean="0"/>
-              <a:t>8/20/2020</a:t>
+              <a:t>11/1/2020</a:t>
             </a:fld>
             <a:endParaRPr lang="en-US"/>
           </a:p>
@@ -2045,7 +2344,7 @@
           <a:p>
             <a:fld id="{BAEB4113-CC9A-4791-AE56-CF423D86ED9A}" type="datetimeFigureOut">
               <a:rPr lang="en-US" smtClean="0"/>
-              <a:t>8/20/2020</a:t>
+              <a:t>11/1/2020</a:t>
             </a:fld>
             <a:endParaRPr lang="en-US"/>
           </a:p>
@@ -2215,7 +2514,7 @@
           <a:p>
             <a:fld id="{BAEB4113-CC9A-4791-AE56-CF423D86ED9A}" type="datetimeFigureOut">
               <a:rPr lang="en-US" smtClean="0"/>
-              <a:t>8/20/2020</a:t>
+              <a:t>11/1/2020</a:t>
             </a:fld>
             <a:endParaRPr lang="en-US"/>
           </a:p>
@@ -2461,7 +2760,7 @@
           <a:p>
             <a:fld id="{BAEB4113-CC9A-4791-AE56-CF423D86ED9A}" type="datetimeFigureOut">
               <a:rPr lang="en-US" smtClean="0"/>
-              <a:t>8/20/2020</a:t>
+              <a:t>11/1/2020</a:t>
             </a:fld>
             <a:endParaRPr lang="en-US"/>
           </a:p>
@@ -2693,7 +2992,7 @@
           <a:p>
             <a:fld id="{BAEB4113-CC9A-4791-AE56-CF423D86ED9A}" type="datetimeFigureOut">
               <a:rPr lang="en-US" smtClean="0"/>
-              <a:t>8/20/2020</a:t>
+              <a:t>11/1/2020</a:t>
             </a:fld>
             <a:endParaRPr lang="en-US"/>
           </a:p>
@@ -3060,7 +3359,7 @@
           <a:p>
             <a:fld id="{BAEB4113-CC9A-4791-AE56-CF423D86ED9A}" type="datetimeFigureOut">
               <a:rPr lang="en-US" smtClean="0"/>
-              <a:t>8/20/2020</a:t>
+              <a:t>11/1/2020</a:t>
             </a:fld>
             <a:endParaRPr lang="en-US"/>
           </a:p>
@@ -3178,7 +3477,7 @@
           <a:p>
             <a:fld id="{BAEB4113-CC9A-4791-AE56-CF423D86ED9A}" type="datetimeFigureOut">
               <a:rPr lang="en-US" smtClean="0"/>
-              <a:t>8/20/2020</a:t>
+              <a:t>11/1/2020</a:t>
             </a:fld>
             <a:endParaRPr lang="en-US"/>
           </a:p>
@@ -3273,7 +3572,7 @@
           <a:p>
             <a:fld id="{BAEB4113-CC9A-4791-AE56-CF423D86ED9A}" type="datetimeFigureOut">
               <a:rPr lang="en-US" smtClean="0"/>
-              <a:t>8/20/2020</a:t>
+              <a:t>11/1/2020</a:t>
             </a:fld>
             <a:endParaRPr lang="en-US"/>
           </a:p>
@@ -3550,7 +3849,7 @@
           <a:p>
             <a:fld id="{BAEB4113-CC9A-4791-AE56-CF423D86ED9A}" type="datetimeFigureOut">
               <a:rPr lang="en-US" smtClean="0"/>
-              <a:t>8/20/2020</a:t>
+              <a:t>11/1/2020</a:t>
             </a:fld>
             <a:endParaRPr lang="en-US"/>
           </a:p>
@@ -3803,7 +4102,7 @@
           <a:p>
             <a:fld id="{BAEB4113-CC9A-4791-AE56-CF423D86ED9A}" type="datetimeFigureOut">
               <a:rPr lang="en-US" smtClean="0"/>
-              <a:t>8/20/2020</a:t>
+              <a:t>11/1/2020</a:t>
             </a:fld>
             <a:endParaRPr lang="en-US"/>
           </a:p>
@@ -4016,7 +4315,7 @@
           <a:p>
             <a:fld id="{BAEB4113-CC9A-4791-AE56-CF423D86ED9A}" type="datetimeFigureOut">
               <a:rPr lang="en-US" smtClean="0"/>
-              <a:t>8/20/2020</a:t>
+              <a:t>11/1/2020</a:t>
             </a:fld>
             <a:endParaRPr lang="en-US"/>
           </a:p>
@@ -4459,7 +4758,11 @@
           <a:bodyPr/>
           <a:lstStyle/>
           <a:p>
-            <a:endParaRPr lang="en-US"/>
+            <a:r>
+              <a:rPr lang="en-US" dirty="0" smtClean="0"/>
+              <a:t>November 2, 2020</a:t>
+            </a:r>
+            <a:endParaRPr lang="en-US" dirty="0"/>
           </a:p>
         </p:txBody>
       </p:sp>
@@ -4524,7 +4827,7 @@
           <a:p>
             <a:r>
               <a:rPr lang="en-US" sz="3800" dirty="0" smtClean="0"/>
-              <a:t>Summary</a:t>
+              <a:t>SQL: Composite Keys</a:t>
             </a:r>
             <a:endParaRPr lang="en-US" sz="3800" dirty="0"/>
           </a:p>
@@ -4565,7 +4868,27 @@
             </a:pPr>
             <a:r>
               <a:rPr lang="en-US" sz="2400" dirty="0" smtClean="0"/>
-              <a:t>DBMS provide an interface between the user and database</a:t>
+              <a:t>This one is easy, we can uniquely identify a row with two columns, which totally makes sense in the case of the </a:t>
+            </a:r>
+            <a:r>
+              <a:rPr lang="en-US" sz="2400" b="1" dirty="0" smtClean="0"/>
+              <a:t>`</a:t>
+            </a:r>
+            <a:r>
+              <a:rPr lang="en-US" sz="2400" b="1" dirty="0" err="1" smtClean="0"/>
+              <a:t>stock_data</a:t>
+            </a:r>
+            <a:r>
+              <a:rPr lang="en-US" sz="2400" b="1" dirty="0" smtClean="0"/>
+              <a:t>`</a:t>
+            </a:r>
+            <a:r>
+              <a:rPr lang="en-US" sz="2400" dirty="0" smtClean="0"/>
+              <a:t> </a:t>
+            </a:r>
+            <a:r>
+              <a:rPr lang="en-US" sz="2400" dirty="0" smtClean="0"/>
+              <a:t>table:</a:t>
             </a:r>
           </a:p>
           <a:p>
@@ -4580,10 +4903,7 @@
                 <a:spcPts val="1200"/>
               </a:spcAft>
             </a:pPr>
-            <a:r>
-              <a:rPr lang="en-US" sz="2400" dirty="0" smtClean="0"/>
-              <a:t>Key functions of DBMS is CRUD operations + maintenance, administration, security</a:t>
-            </a:r>
+            <a:endParaRPr lang="en-US" sz="2400" dirty="0" smtClean="0"/>
           </a:p>
           <a:p>
             <a:pPr>
@@ -4597,9 +4917,1008 @@
                 <a:spcPts val="1200"/>
               </a:spcAft>
             </a:pPr>
+            <a:endParaRPr lang="en-US" sz="2400" dirty="0" smtClean="0"/>
+          </a:p>
+          <a:p>
+            <a:pPr>
+              <a:lnSpc>
+                <a:spcPct val="100000"/>
+              </a:lnSpc>
+              <a:spcBef>
+                <a:spcPts val="1200"/>
+              </a:spcBef>
+              <a:spcAft>
+                <a:spcPts val="1200"/>
+              </a:spcAft>
+            </a:pPr>
+            <a:endParaRPr lang="en-US" sz="2400" dirty="0"/>
+          </a:p>
+          <a:p>
+            <a:pPr marL="0" indent="0">
+              <a:lnSpc>
+                <a:spcPct val="100000"/>
+              </a:lnSpc>
+              <a:spcBef>
+                <a:spcPts val="1200"/>
+              </a:spcBef>
+              <a:spcAft>
+                <a:spcPts val="1200"/>
+              </a:spcAft>
+              <a:buNone/>
+            </a:pPr>
+            <a:endParaRPr lang="en-US" sz="2400" dirty="0" smtClean="0"/>
+          </a:p>
+          <a:p>
+            <a:pPr>
+              <a:lnSpc>
+                <a:spcPct val="100000"/>
+              </a:lnSpc>
+              <a:spcBef>
+                <a:spcPts val="1200"/>
+              </a:spcBef>
+              <a:spcAft>
+                <a:spcPts val="1200"/>
+              </a:spcAft>
+            </a:pPr>
+            <a:endParaRPr lang="en-US" sz="2400" dirty="0"/>
+          </a:p>
+          <a:p>
+            <a:pPr>
+              <a:lnSpc>
+                <a:spcPct val="100000"/>
+              </a:lnSpc>
+              <a:spcBef>
+                <a:spcPts val="1200"/>
+              </a:spcBef>
+              <a:spcAft>
+                <a:spcPts val="1200"/>
+              </a:spcAft>
+            </a:pPr>
+            <a:endParaRPr lang="en-US" sz="2400" dirty="0" smtClean="0"/>
+          </a:p>
+          <a:p>
+            <a:pPr>
+              <a:lnSpc>
+                <a:spcPct val="100000"/>
+              </a:lnSpc>
+              <a:spcBef>
+                <a:spcPts val="1200"/>
+              </a:spcBef>
+              <a:spcAft>
+                <a:spcPts val="1200"/>
+              </a:spcAft>
+            </a:pPr>
+            <a:endParaRPr lang="en-US" sz="2400" dirty="0" smtClean="0"/>
+          </a:p>
+          <a:p>
+            <a:pPr marL="0" indent="0">
+              <a:lnSpc>
+                <a:spcPct val="100000"/>
+              </a:lnSpc>
+              <a:spcBef>
+                <a:spcPts val="1200"/>
+              </a:spcBef>
+              <a:spcAft>
+                <a:spcPts val="1200"/>
+              </a:spcAft>
+              <a:buNone/>
+            </a:pPr>
+            <a:endParaRPr lang="en-US" sz="2400" dirty="0"/>
+          </a:p>
+          <a:p>
+            <a:pPr>
+              <a:lnSpc>
+                <a:spcPct val="100000"/>
+              </a:lnSpc>
+              <a:spcBef>
+                <a:spcPts val="1200"/>
+              </a:spcBef>
+              <a:spcAft>
+                <a:spcPts val="1200"/>
+              </a:spcAft>
+            </a:pPr>
+            <a:endParaRPr lang="en-US" sz="2400" dirty="0" smtClean="0"/>
+          </a:p>
+          <a:p>
+            <a:pPr marL="0" indent="0">
+              <a:lnSpc>
+                <a:spcPct val="100000"/>
+              </a:lnSpc>
+              <a:spcBef>
+                <a:spcPts val="1200"/>
+              </a:spcBef>
+              <a:spcAft>
+                <a:spcPts val="1200"/>
+              </a:spcAft>
+              <a:buNone/>
+            </a:pPr>
+            <a:endParaRPr lang="en-US" sz="2400" dirty="0" smtClean="0"/>
+          </a:p>
+          <a:p>
+            <a:pPr marL="0" indent="0">
+              <a:lnSpc>
+                <a:spcPct val="100000"/>
+              </a:lnSpc>
+              <a:spcBef>
+                <a:spcPts val="1200"/>
+              </a:spcBef>
+              <a:spcAft>
+                <a:spcPts val="1200"/>
+              </a:spcAft>
+              <a:buNone/>
+            </a:pPr>
+            <a:endParaRPr lang="en-US" sz="2400" dirty="0" smtClean="0"/>
+          </a:p>
+        </p:txBody>
+      </p:sp>
+      <p:graphicFrame>
+        <p:nvGraphicFramePr>
+          <p:cNvPr id="8" name="Table 7"/>
+          <p:cNvGraphicFramePr>
+            <a:graphicFrameLocks noGrp="1"/>
+          </p:cNvGraphicFramePr>
+          <p:nvPr>
+            <p:extLst>
+              <p:ext uri="{D42A27DB-BD31-4B8C-83A1-F6EECF244321}">
+                <p14:modId xmlns:p14="http://schemas.microsoft.com/office/powerpoint/2010/main" val="2423432526"/>
+              </p:ext>
+            </p:extLst>
+          </p:nvPr>
+        </p:nvGraphicFramePr>
+        <p:xfrm>
+          <a:off x="1760166" y="2497577"/>
+          <a:ext cx="4335834" cy="2377440"/>
+        </p:xfrm>
+        <a:graphic>
+          <a:graphicData uri="http://schemas.openxmlformats.org/drawingml/2006/table">
+            <a:tbl>
+              <a:tblPr firstRow="1" bandRow="1">
+                <a:tableStyleId>{5C22544A-7EE6-4342-B048-85BDC9FD1C3A}</a:tableStyleId>
+              </a:tblPr>
+              <a:tblGrid>
+                <a:gridCol w="826851"/>
+                <a:gridCol w="1417536"/>
+                <a:gridCol w="1001949"/>
+                <a:gridCol w="1089498"/>
+              </a:tblGrid>
+              <a:tr h="370840">
+                <a:tc>
+                  <a:txBody>
+                    <a:bodyPr/>
+                    <a:lstStyle/>
+                    <a:p>
+                      <a:pPr algn="l"/>
+                      <a:r>
+                        <a:rPr lang="en-US" sz="2000" dirty="0" smtClean="0">
+                          <a:solidFill>
+                            <a:schemeClr val="bg2">
+                              <a:lumMod val="25000"/>
+                            </a:schemeClr>
+                          </a:solidFill>
+                        </a:rPr>
+                        <a:t>ticker</a:t>
+                      </a:r>
+                      <a:endParaRPr lang="en-US" sz="2000" dirty="0">
+                        <a:solidFill>
+                          <a:schemeClr val="bg2">
+                            <a:lumMod val="25000"/>
+                          </a:schemeClr>
+                        </a:solidFill>
+                      </a:endParaRPr>
+                    </a:p>
+                  </a:txBody>
+                  <a:tcPr>
+                    <a:solidFill>
+                      <a:schemeClr val="accent2">
+                        <a:lumMod val="40000"/>
+                        <a:lumOff val="60000"/>
+                      </a:schemeClr>
+                    </a:solidFill>
+                  </a:tcPr>
+                </a:tc>
+                <a:tc>
+                  <a:txBody>
+                    <a:bodyPr/>
+                    <a:lstStyle/>
+                    <a:p>
+                      <a:pPr algn="ctr"/>
+                      <a:r>
+                        <a:rPr lang="en-US" sz="2000" dirty="0" smtClean="0">
+                          <a:solidFill>
+                            <a:schemeClr val="bg2">
+                              <a:lumMod val="25000"/>
+                            </a:schemeClr>
+                          </a:solidFill>
+                        </a:rPr>
+                        <a:t>_date</a:t>
+                      </a:r>
+                      <a:endParaRPr lang="en-US" sz="2000" dirty="0">
+                        <a:solidFill>
+                          <a:schemeClr val="bg2">
+                            <a:lumMod val="25000"/>
+                          </a:schemeClr>
+                        </a:solidFill>
+                      </a:endParaRPr>
+                    </a:p>
+                  </a:txBody>
+                  <a:tcPr>
+                    <a:solidFill>
+                      <a:schemeClr val="accent2">
+                        <a:lumMod val="40000"/>
+                        <a:lumOff val="60000"/>
+                      </a:schemeClr>
+                    </a:solidFill>
+                  </a:tcPr>
+                </a:tc>
+                <a:tc>
+                  <a:txBody>
+                    <a:bodyPr/>
+                    <a:lstStyle/>
+                    <a:p>
+                      <a:pPr algn="ctr"/>
+                      <a:r>
+                        <a:rPr lang="en-US" sz="2000" dirty="0" smtClean="0"/>
+                        <a:t>ret</a:t>
+                      </a:r>
+                      <a:endParaRPr lang="en-US" sz="2000" dirty="0"/>
+                    </a:p>
+                  </a:txBody>
+                  <a:tcPr/>
+                </a:tc>
+                <a:tc>
+                  <a:txBody>
+                    <a:bodyPr/>
+                    <a:lstStyle/>
+                    <a:p>
+                      <a:pPr algn="ctr"/>
+                      <a:r>
+                        <a:rPr lang="en-US" sz="2000" dirty="0" smtClean="0"/>
+                        <a:t>price</a:t>
+                      </a:r>
+                      <a:endParaRPr lang="en-US" sz="2000" dirty="0"/>
+                    </a:p>
+                  </a:txBody>
+                  <a:tcPr/>
+                </a:tc>
+              </a:tr>
+              <a:tr h="370840">
+                <a:tc>
+                  <a:txBody>
+                    <a:bodyPr/>
+                    <a:lstStyle/>
+                    <a:p>
+                      <a:pPr algn="l"/>
+                      <a:r>
+                        <a:rPr lang="en-US" sz="2000" dirty="0" smtClean="0"/>
+                        <a:t>AAPL</a:t>
+                      </a:r>
+                      <a:endParaRPr lang="en-US" sz="2000" dirty="0"/>
+                    </a:p>
+                  </a:txBody>
+                  <a:tcPr>
+                    <a:solidFill>
+                      <a:schemeClr val="accent2">
+                        <a:lumMod val="40000"/>
+                        <a:lumOff val="60000"/>
+                      </a:schemeClr>
+                    </a:solidFill>
+                  </a:tcPr>
+                </a:tc>
+                <a:tc>
+                  <a:txBody>
+                    <a:bodyPr/>
+                    <a:lstStyle/>
+                    <a:p>
+                      <a:pPr algn="r"/>
+                      <a:r>
+                        <a:rPr lang="en-US" sz="2000" dirty="0" smtClean="0"/>
+                        <a:t>2020-08-18</a:t>
+                      </a:r>
+                      <a:endParaRPr lang="en-US" sz="2000" dirty="0"/>
+                    </a:p>
+                  </a:txBody>
+                  <a:tcPr>
+                    <a:solidFill>
+                      <a:schemeClr val="accent2">
+                        <a:lumMod val="40000"/>
+                        <a:lumOff val="60000"/>
+                      </a:schemeClr>
+                    </a:solidFill>
+                  </a:tcPr>
+                </a:tc>
+                <a:tc>
+                  <a:txBody>
+                    <a:bodyPr/>
+                    <a:lstStyle/>
+                    <a:p>
+                      <a:pPr algn="r"/>
+                      <a:r>
+                        <a:rPr lang="en-US" sz="2000" dirty="0" smtClean="0"/>
+                        <a:t>0.0083</a:t>
+                      </a:r>
+                      <a:endParaRPr lang="en-US" sz="2000" dirty="0"/>
+                    </a:p>
+                  </a:txBody>
+                  <a:tcPr/>
+                </a:tc>
+                <a:tc>
+                  <a:txBody>
+                    <a:bodyPr/>
+                    <a:lstStyle/>
+                    <a:p>
+                      <a:pPr algn="r"/>
+                      <a:r>
+                        <a:rPr lang="en-US" sz="2000" dirty="0" smtClean="0"/>
+                        <a:t>462.25</a:t>
+                      </a:r>
+                      <a:endParaRPr lang="en-US" sz="2000" dirty="0"/>
+                    </a:p>
+                  </a:txBody>
+                  <a:tcPr/>
+                </a:tc>
+              </a:tr>
+              <a:tr h="370840">
+                <a:tc>
+                  <a:txBody>
+                    <a:bodyPr/>
+                    <a:lstStyle/>
+                    <a:p>
+                      <a:pPr algn="l"/>
+                      <a:r>
+                        <a:rPr lang="en-US" sz="2000" dirty="0" smtClean="0"/>
+                        <a:t>AAPL</a:t>
+                      </a:r>
+                      <a:endParaRPr lang="en-US" sz="2000" dirty="0"/>
+                    </a:p>
+                  </a:txBody>
+                  <a:tcPr>
+                    <a:solidFill>
+                      <a:schemeClr val="accent2">
+                        <a:lumMod val="40000"/>
+                        <a:lumOff val="60000"/>
+                      </a:schemeClr>
+                    </a:solidFill>
+                  </a:tcPr>
+                </a:tc>
+                <a:tc>
+                  <a:txBody>
+                    <a:bodyPr/>
+                    <a:lstStyle/>
+                    <a:p>
+                      <a:pPr algn="r"/>
+                      <a:r>
+                        <a:rPr lang="en-US" sz="2000" dirty="0" smtClean="0"/>
+                        <a:t>2020-08-19</a:t>
+                      </a:r>
+                      <a:endParaRPr lang="en-US" sz="2000" dirty="0"/>
+                    </a:p>
+                  </a:txBody>
+                  <a:tcPr>
+                    <a:solidFill>
+                      <a:schemeClr val="accent2">
+                        <a:lumMod val="40000"/>
+                        <a:lumOff val="60000"/>
+                      </a:schemeClr>
+                    </a:solidFill>
+                  </a:tcPr>
+                </a:tc>
+                <a:tc>
+                  <a:txBody>
+                    <a:bodyPr/>
+                    <a:lstStyle/>
+                    <a:p>
+                      <a:pPr algn="r"/>
+                      <a:r>
+                        <a:rPr lang="en-US" sz="2000" dirty="0" smtClean="0"/>
+                        <a:t>0.0013</a:t>
+                      </a:r>
+                      <a:endParaRPr lang="en-US" sz="2000" dirty="0"/>
+                    </a:p>
+                  </a:txBody>
+                  <a:tcPr/>
+                </a:tc>
+                <a:tc>
+                  <a:txBody>
+                    <a:bodyPr/>
+                    <a:lstStyle/>
+                    <a:p>
+                      <a:pPr algn="r"/>
+                      <a:r>
+                        <a:rPr lang="en-US" sz="2000" dirty="0" smtClean="0"/>
+                        <a:t>462.83</a:t>
+                      </a:r>
+                      <a:endParaRPr lang="en-US" sz="2000" dirty="0"/>
+                    </a:p>
+                  </a:txBody>
+                  <a:tcPr/>
+                </a:tc>
+              </a:tr>
+              <a:tr h="370840">
+                <a:tc>
+                  <a:txBody>
+                    <a:bodyPr/>
+                    <a:lstStyle/>
+                    <a:p>
+                      <a:pPr algn="l"/>
+                      <a:r>
+                        <a:rPr lang="en-US" sz="2000" dirty="0" smtClean="0"/>
+                        <a:t>MSFT</a:t>
+                      </a:r>
+                      <a:endParaRPr lang="en-US" sz="2000" dirty="0"/>
+                    </a:p>
+                  </a:txBody>
+                  <a:tcPr>
+                    <a:solidFill>
+                      <a:schemeClr val="accent2">
+                        <a:lumMod val="40000"/>
+                        <a:lumOff val="60000"/>
+                      </a:schemeClr>
+                    </a:solidFill>
+                  </a:tcPr>
+                </a:tc>
+                <a:tc>
+                  <a:txBody>
+                    <a:bodyPr/>
+                    <a:lstStyle/>
+                    <a:p>
+                      <a:pPr algn="r"/>
+                      <a:r>
+                        <a:rPr lang="en-US" sz="2000" dirty="0" smtClean="0"/>
+                        <a:t>2020-08-18</a:t>
+                      </a:r>
+                      <a:endParaRPr lang="en-US" sz="2000" dirty="0"/>
+                    </a:p>
+                  </a:txBody>
+                  <a:tcPr>
+                    <a:solidFill>
+                      <a:schemeClr val="accent2">
+                        <a:lumMod val="40000"/>
+                        <a:lumOff val="60000"/>
+                      </a:schemeClr>
+                    </a:solidFill>
+                  </a:tcPr>
+                </a:tc>
+                <a:tc>
+                  <a:txBody>
+                    <a:bodyPr/>
+                    <a:lstStyle/>
+                    <a:p>
+                      <a:pPr algn="r"/>
+                      <a:r>
+                        <a:rPr lang="en-US" sz="2000" dirty="0" smtClean="0"/>
+                        <a:t>0.0058</a:t>
+                      </a:r>
+                      <a:endParaRPr lang="en-US" sz="2000" dirty="0"/>
+                    </a:p>
+                  </a:txBody>
+                  <a:tcPr/>
+                </a:tc>
+                <a:tc>
+                  <a:txBody>
+                    <a:bodyPr/>
+                    <a:lstStyle/>
+                    <a:p>
+                      <a:pPr algn="r"/>
+                      <a:r>
+                        <a:rPr lang="en-US" sz="2000" dirty="0" smtClean="0"/>
+                        <a:t>211.49</a:t>
+                      </a:r>
+                      <a:endParaRPr lang="en-US" sz="2000" dirty="0"/>
+                    </a:p>
+                  </a:txBody>
+                  <a:tcPr/>
+                </a:tc>
+              </a:tr>
+              <a:tr h="370840">
+                <a:tc>
+                  <a:txBody>
+                    <a:bodyPr/>
+                    <a:lstStyle/>
+                    <a:p>
+                      <a:pPr algn="l"/>
+                      <a:r>
+                        <a:rPr lang="en-US" sz="2000" dirty="0" smtClean="0"/>
+                        <a:t>MSFT</a:t>
+                      </a:r>
+                      <a:endParaRPr lang="en-US" sz="2000" dirty="0"/>
+                    </a:p>
+                  </a:txBody>
+                  <a:tcPr>
+                    <a:solidFill>
+                      <a:schemeClr val="accent2">
+                        <a:lumMod val="40000"/>
+                        <a:lumOff val="60000"/>
+                      </a:schemeClr>
+                    </a:solidFill>
+                  </a:tcPr>
+                </a:tc>
+                <a:tc>
+                  <a:txBody>
+                    <a:bodyPr/>
+                    <a:lstStyle/>
+                    <a:p>
+                      <a:pPr algn="r"/>
+                      <a:r>
+                        <a:rPr lang="en-US" sz="2000" dirty="0" smtClean="0"/>
+                        <a:t>2020-08-19</a:t>
+                      </a:r>
+                      <a:endParaRPr lang="en-US" sz="2000" dirty="0"/>
+                    </a:p>
+                  </a:txBody>
+                  <a:tcPr>
+                    <a:solidFill>
+                      <a:schemeClr val="accent2">
+                        <a:lumMod val="40000"/>
+                        <a:lumOff val="60000"/>
+                      </a:schemeClr>
+                    </a:solidFill>
+                  </a:tcPr>
+                </a:tc>
+                <a:tc>
+                  <a:txBody>
+                    <a:bodyPr/>
+                    <a:lstStyle/>
+                    <a:p>
+                      <a:pPr algn="r"/>
+                      <a:r>
+                        <a:rPr lang="en-US" sz="2000" dirty="0" smtClean="0"/>
+                        <a:t>-0.0085</a:t>
+                      </a:r>
+                      <a:endParaRPr lang="en-US" sz="2000" dirty="0"/>
+                    </a:p>
+                  </a:txBody>
+                  <a:tcPr/>
+                </a:tc>
+                <a:tc>
+                  <a:txBody>
+                    <a:bodyPr/>
+                    <a:lstStyle/>
+                    <a:p>
+                      <a:pPr algn="r"/>
+                      <a:r>
+                        <a:rPr lang="en-US" sz="2000" dirty="0" smtClean="0"/>
+                        <a:t>209.70</a:t>
+                      </a:r>
+                      <a:endParaRPr lang="en-US" sz="2000" dirty="0"/>
+                    </a:p>
+                  </a:txBody>
+                  <a:tcPr/>
+                </a:tc>
+              </a:tr>
+              <a:tr h="370840">
+                <a:tc>
+                  <a:txBody>
+                    <a:bodyPr/>
+                    <a:lstStyle/>
+                    <a:p>
+                      <a:pPr algn="l"/>
+                      <a:r>
+                        <a:rPr lang="en-US" sz="2000" dirty="0" smtClean="0"/>
+                        <a:t>XOM</a:t>
+                      </a:r>
+                      <a:endParaRPr lang="en-US" sz="2000" dirty="0"/>
+                    </a:p>
+                  </a:txBody>
+                  <a:tcPr>
+                    <a:solidFill>
+                      <a:schemeClr val="accent2">
+                        <a:lumMod val="40000"/>
+                        <a:lumOff val="60000"/>
+                      </a:schemeClr>
+                    </a:solidFill>
+                  </a:tcPr>
+                </a:tc>
+                <a:tc>
+                  <a:txBody>
+                    <a:bodyPr/>
+                    <a:lstStyle/>
+                    <a:p>
+                      <a:pPr algn="r"/>
+                      <a:r>
+                        <a:rPr lang="en-US" sz="2000" dirty="0" smtClean="0"/>
+                        <a:t>2020-08-18</a:t>
+                      </a:r>
+                      <a:endParaRPr lang="en-US" sz="2000" dirty="0"/>
+                    </a:p>
+                  </a:txBody>
+                  <a:tcPr>
+                    <a:solidFill>
+                      <a:schemeClr val="accent2">
+                        <a:lumMod val="40000"/>
+                        <a:lumOff val="60000"/>
+                      </a:schemeClr>
+                    </a:solidFill>
+                  </a:tcPr>
+                </a:tc>
+                <a:tc>
+                  <a:txBody>
+                    <a:bodyPr/>
+                    <a:lstStyle/>
+                    <a:p>
+                      <a:pPr algn="r"/>
+                      <a:r>
+                        <a:rPr lang="en-US" sz="2000" dirty="0" smtClean="0"/>
+                        <a:t>-0.0049</a:t>
+                      </a:r>
+                      <a:endParaRPr lang="en-US" sz="2000" dirty="0"/>
+                    </a:p>
+                  </a:txBody>
+                  <a:tcPr/>
+                </a:tc>
+                <a:tc>
+                  <a:txBody>
+                    <a:bodyPr/>
+                    <a:lstStyle/>
+                    <a:p>
+                      <a:pPr algn="r"/>
+                      <a:r>
+                        <a:rPr lang="en-US" sz="2000" dirty="0" smtClean="0"/>
+                        <a:t>42.43</a:t>
+                      </a:r>
+                      <a:endParaRPr lang="en-US" sz="2000" dirty="0"/>
+                    </a:p>
+                  </a:txBody>
+                  <a:tcPr/>
+                </a:tc>
+              </a:tr>
+            </a:tbl>
+          </a:graphicData>
+        </a:graphic>
+      </p:graphicFrame>
+      <p:graphicFrame>
+        <p:nvGraphicFramePr>
+          <p:cNvPr id="6" name="Table 5"/>
+          <p:cNvGraphicFramePr>
+            <a:graphicFrameLocks noGrp="1"/>
+          </p:cNvGraphicFramePr>
+          <p:nvPr>
+            <p:extLst>
+              <p:ext uri="{D42A27DB-BD31-4B8C-83A1-F6EECF244321}">
+                <p14:modId xmlns:p14="http://schemas.microsoft.com/office/powerpoint/2010/main" val="675656683"/>
+              </p:ext>
+            </p:extLst>
+          </p:nvPr>
+        </p:nvGraphicFramePr>
+        <p:xfrm>
+          <a:off x="6800273" y="2497577"/>
+          <a:ext cx="4216398" cy="1584960"/>
+        </p:xfrm>
+        <a:graphic>
+          <a:graphicData uri="http://schemas.openxmlformats.org/drawingml/2006/table">
+            <a:tbl>
+              <a:tblPr firstRow="1" bandRow="1">
+                <a:tableStyleId>{5C22544A-7EE6-4342-B048-85BDC9FD1C3A}</a:tableStyleId>
+              </a:tblPr>
+              <a:tblGrid>
+                <a:gridCol w="913761"/>
+                <a:gridCol w="1799617"/>
+                <a:gridCol w="1503020"/>
+              </a:tblGrid>
+              <a:tr h="292523">
+                <a:tc>
+                  <a:txBody>
+                    <a:bodyPr/>
+                    <a:lstStyle/>
+                    <a:p>
+                      <a:r>
+                        <a:rPr lang="en-US" sz="2000" dirty="0" smtClean="0"/>
+                        <a:t>ticker</a:t>
+                      </a:r>
+                      <a:endParaRPr lang="en-US" sz="2000" dirty="0"/>
+                    </a:p>
+                  </a:txBody>
+                  <a:tcPr/>
+                </a:tc>
+                <a:tc>
+                  <a:txBody>
+                    <a:bodyPr/>
+                    <a:lstStyle/>
+                    <a:p>
+                      <a:r>
+                        <a:rPr lang="en-US" sz="2000" dirty="0" smtClean="0"/>
+                        <a:t>_name</a:t>
+                      </a:r>
+                      <a:endParaRPr lang="en-US" sz="2000" dirty="0"/>
+                    </a:p>
+                  </a:txBody>
+                  <a:tcPr/>
+                </a:tc>
+                <a:tc>
+                  <a:txBody>
+                    <a:bodyPr/>
+                    <a:lstStyle/>
+                    <a:p>
+                      <a:r>
+                        <a:rPr lang="en-US" sz="2000" dirty="0" smtClean="0"/>
+                        <a:t>sector</a:t>
+                      </a:r>
+                      <a:endParaRPr lang="en-US" sz="2000" dirty="0"/>
+                    </a:p>
+                  </a:txBody>
+                  <a:tcPr/>
+                </a:tc>
+              </a:tr>
+              <a:tr h="292523">
+                <a:tc>
+                  <a:txBody>
+                    <a:bodyPr/>
+                    <a:lstStyle/>
+                    <a:p>
+                      <a:r>
+                        <a:rPr lang="en-US" sz="2000" dirty="0" smtClean="0"/>
+                        <a:t>AAPL</a:t>
+                      </a:r>
+                      <a:endParaRPr lang="en-US" sz="2000" dirty="0"/>
+                    </a:p>
+                  </a:txBody>
+                  <a:tcPr/>
+                </a:tc>
+                <a:tc>
+                  <a:txBody>
+                    <a:bodyPr/>
+                    <a:lstStyle/>
+                    <a:p>
+                      <a:r>
+                        <a:rPr lang="en-US" sz="2000" dirty="0" smtClean="0"/>
+                        <a:t>Apple Inc.</a:t>
+                      </a:r>
+                      <a:endParaRPr lang="en-US" sz="2000" dirty="0"/>
+                    </a:p>
+                  </a:txBody>
+                  <a:tcPr/>
+                </a:tc>
+                <a:tc>
+                  <a:txBody>
+                    <a:bodyPr/>
+                    <a:lstStyle/>
+                    <a:p>
+                      <a:r>
+                        <a:rPr lang="en-US" sz="2000" dirty="0" smtClean="0"/>
+                        <a:t>Technology</a:t>
+                      </a:r>
+                      <a:endParaRPr lang="en-US" sz="2000" dirty="0"/>
+                    </a:p>
+                  </a:txBody>
+                  <a:tcPr/>
+                </a:tc>
+              </a:tr>
+              <a:tr h="292523">
+                <a:tc>
+                  <a:txBody>
+                    <a:bodyPr/>
+                    <a:lstStyle/>
+                    <a:p>
+                      <a:r>
+                        <a:rPr lang="en-US" sz="2000" dirty="0" smtClean="0"/>
+                        <a:t>MSFT</a:t>
+                      </a:r>
+                      <a:endParaRPr lang="en-US" sz="2000" dirty="0"/>
+                    </a:p>
+                  </a:txBody>
+                  <a:tcPr/>
+                </a:tc>
+                <a:tc>
+                  <a:txBody>
+                    <a:bodyPr/>
+                    <a:lstStyle/>
+                    <a:p>
+                      <a:r>
+                        <a:rPr lang="en-US" sz="2000" dirty="0" smtClean="0"/>
+                        <a:t>Microsoft Corp.</a:t>
+                      </a:r>
+                      <a:endParaRPr lang="en-US" sz="2000" dirty="0"/>
+                    </a:p>
+                  </a:txBody>
+                  <a:tcPr/>
+                </a:tc>
+                <a:tc>
+                  <a:txBody>
+                    <a:bodyPr/>
+                    <a:lstStyle/>
+                    <a:p>
+                      <a:r>
+                        <a:rPr lang="en-US" sz="2000" dirty="0" smtClean="0"/>
+                        <a:t>Technology</a:t>
+                      </a:r>
+                      <a:endParaRPr lang="en-US" sz="2000" dirty="0"/>
+                    </a:p>
+                  </a:txBody>
+                  <a:tcPr/>
+                </a:tc>
+              </a:tr>
+              <a:tr h="292523">
+                <a:tc>
+                  <a:txBody>
+                    <a:bodyPr/>
+                    <a:lstStyle/>
+                    <a:p>
+                      <a:r>
+                        <a:rPr lang="en-US" sz="2000" dirty="0" smtClean="0"/>
+                        <a:t>XOM</a:t>
+                      </a:r>
+                      <a:endParaRPr lang="en-US" sz="2000" dirty="0"/>
+                    </a:p>
+                  </a:txBody>
+                  <a:tcPr/>
+                </a:tc>
+                <a:tc>
+                  <a:txBody>
+                    <a:bodyPr/>
+                    <a:lstStyle/>
+                    <a:p>
+                      <a:r>
+                        <a:rPr lang="en-US" sz="2000" dirty="0" smtClean="0"/>
+                        <a:t>ExxonMobil</a:t>
+                      </a:r>
+                      <a:endParaRPr lang="en-US" sz="2000" dirty="0"/>
+                    </a:p>
+                  </a:txBody>
+                  <a:tcPr/>
+                </a:tc>
+                <a:tc>
+                  <a:txBody>
+                    <a:bodyPr/>
+                    <a:lstStyle/>
+                    <a:p>
+                      <a:r>
+                        <a:rPr lang="en-US" sz="2000" dirty="0" smtClean="0"/>
+                        <a:t>Oil &amp; Gas</a:t>
+                      </a:r>
+                      <a:endParaRPr lang="en-US" sz="2000" dirty="0"/>
+                    </a:p>
+                  </a:txBody>
+                  <a:tcPr/>
+                </a:tc>
+              </a:tr>
+            </a:tbl>
+          </a:graphicData>
+        </a:graphic>
+      </p:graphicFrame>
+    </p:spTree>
+    <p:extLst>
+      <p:ext uri="{BB962C8B-B14F-4D97-AF65-F5344CB8AC3E}">
+        <p14:creationId xmlns:p14="http://schemas.microsoft.com/office/powerpoint/2010/main" val="4066648977"/>
+      </p:ext>
+    </p:extLst>
+  </p:cSld>
+  <p:clrMapOvr>
+    <a:masterClrMapping/>
+  </p:clrMapOvr>
+  <p:timing>
+    <p:tnLst>
+      <p:par>
+        <p:cTn id="1" dur="indefinite" restart="never" nodeType="tmRoot"/>
+      </p:par>
+    </p:tnLst>
+  </p:timing>
+</p:sld>
+</file>
+
+<file path=ppt/slides/slide11.xml><?xml version="1.0" encoding="utf-8"?>
+<p:sld xmlns:a="http://schemas.openxmlformats.org/drawingml/2006/main" xmlns:r="http://schemas.openxmlformats.org/officeDocument/2006/relationships" xmlns:p="http://schemas.openxmlformats.org/presentationml/2006/main">
+  <p:cSld>
+    <p:spTree>
+      <p:nvGrpSpPr>
+        <p:cNvPr id="1" name=""/>
+        <p:cNvGrpSpPr/>
+        <p:nvPr/>
+      </p:nvGrpSpPr>
+      <p:grpSpPr>
+        <a:xfrm>
+          <a:off x="0" y="0"/>
+          <a:ext cx="0" cy="0"/>
+          <a:chOff x="0" y="0"/>
+          <a:chExt cx="0" cy="0"/>
+        </a:xfrm>
+      </p:grpSpPr>
+      <p:sp>
+        <p:nvSpPr>
+          <p:cNvPr id="2" name="Title 1"/>
+          <p:cNvSpPr>
+            <a:spLocks noGrp="1"/>
+          </p:cNvSpPr>
+          <p:nvPr>
+            <p:ph type="title"/>
+          </p:nvPr>
+        </p:nvSpPr>
+        <p:spPr>
+          <a:xfrm>
+            <a:off x="838200" y="1"/>
+            <a:ext cx="10515600" cy="876300"/>
+          </a:xfrm>
+        </p:spPr>
+        <p:txBody>
+          <a:bodyPr>
+            <a:normAutofit/>
+          </a:bodyPr>
+          <a:lstStyle/>
+          <a:p>
+            <a:r>
+              <a:rPr lang="en-US" sz="3800" dirty="0" smtClean="0"/>
+              <a:t>Summary</a:t>
+            </a:r>
+            <a:endParaRPr lang="en-US" sz="3800" dirty="0"/>
+          </a:p>
+        </p:txBody>
+      </p:sp>
+      <p:sp>
+        <p:nvSpPr>
+          <p:cNvPr id="33" name="Content Placeholder 2"/>
+          <p:cNvSpPr>
+            <a:spLocks noGrp="1"/>
+          </p:cNvSpPr>
+          <p:nvPr>
+            <p:ph idx="1"/>
+          </p:nvPr>
+        </p:nvSpPr>
+        <p:spPr>
+          <a:xfrm>
+            <a:off x="838200" y="1312015"/>
+            <a:ext cx="10882745" cy="5312521"/>
+          </a:xfrm>
+        </p:spPr>
+        <p:txBody>
+          <a:bodyPr>
+            <a:normAutofit/>
+          </a:bodyPr>
+          <a:lstStyle/>
+          <a:p>
+            <a:pPr>
+              <a:lnSpc>
+                <a:spcPct val="100000"/>
+              </a:lnSpc>
+              <a:spcBef>
+                <a:spcPts val="1200"/>
+              </a:spcBef>
+              <a:spcAft>
+                <a:spcPts val="1200"/>
+              </a:spcAft>
+            </a:pPr>
             <a:r>
               <a:rPr lang="en-US" sz="2400" dirty="0" smtClean="0"/>
-              <a:t>Relational databases are synonymous to SQL represent the data as tables with rows and columns </a:t>
+              <a:t>DBMS provide an interface between the user and database</a:t>
+            </a:r>
+          </a:p>
+          <a:p>
+            <a:pPr>
+              <a:lnSpc>
+                <a:spcPct val="100000"/>
+              </a:lnSpc>
+              <a:spcBef>
+                <a:spcPts val="1200"/>
+              </a:spcBef>
+              <a:spcAft>
+                <a:spcPts val="1200"/>
+              </a:spcAft>
+            </a:pPr>
+            <a:r>
+              <a:rPr lang="en-US" sz="2400" dirty="0" smtClean="0"/>
+              <a:t>Key functions of DBMS is CRUD operations + maintenance, administration, security</a:t>
+            </a:r>
+          </a:p>
+          <a:p>
+            <a:pPr>
+              <a:lnSpc>
+                <a:spcPct val="100000"/>
+              </a:lnSpc>
+              <a:spcBef>
+                <a:spcPts val="1200"/>
+              </a:spcBef>
+              <a:spcAft>
+                <a:spcPts val="1200"/>
+              </a:spcAft>
+            </a:pPr>
+            <a:r>
+              <a:rPr lang="en-US" sz="2400" dirty="0" smtClean="0"/>
+              <a:t>Relational databases are synonymous to </a:t>
+            </a:r>
+            <a:r>
+              <a:rPr lang="en-US" sz="2400" dirty="0" smtClean="0"/>
+              <a:t>SQL and </a:t>
+            </a:r>
+            <a:r>
+              <a:rPr lang="en-US" sz="2400" dirty="0" smtClean="0"/>
+              <a:t>represent the data as tables with rows and columns </a:t>
             </a:r>
           </a:p>
           <a:p>
@@ -4816,7 +6135,7 @@
 </p:sld>
 </file>
 
-<file path=ppt/slides/slide11.xml><?xml version="1.0" encoding="utf-8"?>
+<file path=ppt/slides/slide12.xml><?xml version="1.0" encoding="utf-8"?>
 <p:sld xmlns:a="http://schemas.openxmlformats.org/drawingml/2006/main" xmlns:r="http://schemas.openxmlformats.org/officeDocument/2006/relationships" xmlns:p="http://schemas.openxmlformats.org/presentationml/2006/main">
   <p:cSld>
     <p:spTree>
@@ -5224,21 +6543,13 @@
             </a:pPr>
             <a:r>
               <a:rPr lang="en-US" sz="2400" dirty="0" smtClean="0"/>
-              <a:t>Tutorial: introduction to MySQL</a:t>
-            </a:r>
-          </a:p>
-          <a:p>
-            <a:pPr marL="457200" indent="-457200">
-              <a:lnSpc>
-                <a:spcPct val="150000"/>
-              </a:lnSpc>
-              <a:buFont typeface="+mj-lt"/>
-              <a:buAutoNum type="arabicPeriod"/>
-            </a:pPr>
+              <a:t>Tutorial: introduction to </a:t>
+            </a:r>
             <a:r>
               <a:rPr lang="en-US" sz="2400" dirty="0" smtClean="0"/>
-              <a:t>Tutorial: building a simple API to operate a MySQL database using Python</a:t>
-            </a:r>
+              <a:t>MySQL</a:t>
+            </a:r>
+            <a:endParaRPr lang="en-US" sz="2400" dirty="0" smtClean="0"/>
           </a:p>
         </p:txBody>
       </p:sp>
@@ -11277,7 +12588,11 @@
           <a:p>
             <a:r>
               <a:rPr lang="en-US" sz="3800" dirty="0" smtClean="0"/>
-              <a:t>SQL: Primary Keys</a:t>
+              <a:t>SQL: </a:t>
+            </a:r>
+            <a:r>
+              <a:rPr lang="en-US" sz="3800" dirty="0" smtClean="0"/>
+              <a:t>Database Schema</a:t>
             </a:r>
             <a:endParaRPr lang="en-US" sz="3800" dirty="0"/>
           </a:p>
@@ -11301,7 +12616,7 @@
         </p:spPr>
         <p:txBody>
           <a:bodyPr>
-            <a:normAutofit fontScale="92500" lnSpcReduction="10000"/>
+            <a:normAutofit/>
           </a:bodyPr>
           <a:lstStyle/>
           <a:p>
@@ -11317,17 +12632,10 @@
               </a:spcAft>
             </a:pPr>
             <a:r>
-              <a:rPr lang="en-US" sz="2400" dirty="0" smtClean="0"/>
-              <a:t>A primary key </a:t>
-            </a:r>
-            <a:r>
-              <a:rPr lang="en-US" sz="2400" b="1" dirty="0" smtClean="0"/>
-              <a:t>uniquely</a:t>
-            </a:r>
-            <a:r>
-              <a:rPr lang="en-US" sz="2400" dirty="0" smtClean="0"/>
-              <a:t> identifies each row in a table</a:t>
-            </a:r>
+              <a:rPr lang="en-US" sz="2200" dirty="0" smtClean="0"/>
+              <a:t>A database schema provides layouts for data structures</a:t>
+            </a:r>
+            <a:endParaRPr lang="en-US" sz="2200" dirty="0" smtClean="0"/>
           </a:p>
           <a:p>
             <a:pPr>
@@ -11341,7 +12649,7 @@
                 <a:spcPts val="1200"/>
               </a:spcAft>
             </a:pPr>
-            <a:endParaRPr lang="en-US" sz="2400" dirty="0"/>
+            <a:endParaRPr lang="en-US" sz="2200" dirty="0"/>
           </a:p>
           <a:p>
             <a:pPr>
@@ -11355,7 +12663,7 @@
                 <a:spcPts val="1200"/>
               </a:spcAft>
             </a:pPr>
-            <a:endParaRPr lang="en-US" sz="2400" dirty="0" smtClean="0"/>
+            <a:endParaRPr lang="en-US" sz="2200" dirty="0" smtClean="0"/>
           </a:p>
           <a:p>
             <a:pPr>
@@ -11369,7 +12677,22 @@
                 <a:spcPts val="1200"/>
               </a:spcAft>
             </a:pPr>
-            <a:endParaRPr lang="en-US" sz="2400" dirty="0"/>
+            <a:endParaRPr lang="en-US" sz="2200" dirty="0"/>
+          </a:p>
+          <a:p>
+            <a:pPr marL="0" indent="0">
+              <a:lnSpc>
+                <a:spcPct val="100000"/>
+              </a:lnSpc>
+              <a:spcBef>
+                <a:spcPts val="1200"/>
+              </a:spcBef>
+              <a:spcAft>
+                <a:spcPts val="1200"/>
+              </a:spcAft>
+              <a:buNone/>
+            </a:pPr>
+            <a:endParaRPr lang="en-US" sz="2200" dirty="0"/>
           </a:p>
           <a:p>
             <a:pPr>
@@ -11383,7 +12706,38 @@
                 <a:spcPts val="1200"/>
               </a:spcAft>
             </a:pPr>
-            <a:endParaRPr lang="en-US" sz="2400" dirty="0" smtClean="0"/>
+            <a:r>
+              <a:rPr lang="en-US" sz="2200" dirty="0" smtClean="0"/>
+              <a:t>In the </a:t>
+            </a:r>
+            <a:r>
+              <a:rPr lang="en-US" sz="2200" b="1" dirty="0" smtClean="0"/>
+              <a:t>`</a:t>
+            </a:r>
+            <a:r>
+              <a:rPr lang="en-US" sz="2200" b="1" dirty="0" err="1" smtClean="0"/>
+              <a:t>stock_data</a:t>
+            </a:r>
+            <a:r>
+              <a:rPr lang="en-US" sz="2200" b="1" dirty="0" smtClean="0"/>
+              <a:t>` </a:t>
+            </a:r>
+            <a:r>
+              <a:rPr lang="en-US" sz="2200" dirty="0" smtClean="0"/>
+              <a:t>table </a:t>
+            </a:r>
+            <a:r>
+              <a:rPr lang="en-US" sz="2200" dirty="0" smtClean="0"/>
+              <a:t>to the left there are 5 columns with defined datatypes, e.g. id is </a:t>
+            </a:r>
+            <a:r>
+              <a:rPr lang="en-US" sz="2200" i="1" dirty="0" err="1" smtClean="0"/>
+              <a:t>int</a:t>
+            </a:r>
+            <a:r>
+              <a:rPr lang="en-US" sz="2200" dirty="0" smtClean="0"/>
+              <a:t> </a:t>
+            </a:r>
           </a:p>
           <a:p>
             <a:pPr>
@@ -11397,86 +12751,34 @@
                 <a:spcPts val="1200"/>
               </a:spcAft>
             </a:pPr>
-            <a:endParaRPr lang="en-US" sz="2400" dirty="0"/>
-          </a:p>
-          <a:p>
-            <a:pPr>
-              <a:lnSpc>
-                <a:spcPct val="100000"/>
-              </a:lnSpc>
-              <a:spcBef>
-                <a:spcPts val="1200"/>
-              </a:spcBef>
-              <a:spcAft>
-                <a:spcPts val="1200"/>
-              </a:spcAft>
-            </a:pPr>
-            <a:r>
-              <a:rPr lang="en-US" sz="2400" dirty="0" smtClean="0"/>
-              <a:t>In the </a:t>
-            </a:r>
-            <a:r>
-              <a:rPr lang="en-US" sz="2400" b="1" dirty="0" smtClean="0"/>
+            <a:r>
+              <a:rPr lang="en-US" sz="2200" dirty="0" smtClean="0"/>
+              <a:t>In </a:t>
+            </a:r>
+            <a:r>
+              <a:rPr lang="en-US" sz="2200" dirty="0" smtClean="0"/>
+              <a:t>the </a:t>
+            </a:r>
+            <a:r>
+              <a:rPr lang="en-US" sz="2200" b="1" dirty="0" smtClean="0"/>
               <a:t>`</a:t>
             </a:r>
             <a:r>
-              <a:rPr lang="en-US" sz="2400" b="1" dirty="0" err="1" smtClean="0"/>
-              <a:t>stock_data</a:t>
-            </a:r>
-            <a:r>
-              <a:rPr lang="en-US" sz="2400" b="1" dirty="0" smtClean="0"/>
+              <a:rPr lang="en-US" sz="2200" b="1" dirty="0" err="1" smtClean="0"/>
+              <a:t>stock_info</a:t>
+            </a:r>
+            <a:r>
+              <a:rPr lang="en-US" sz="2200" b="1" dirty="0" smtClean="0"/>
               <a:t>` </a:t>
             </a:r>
             <a:r>
-              <a:rPr lang="en-US" sz="2400" dirty="0" smtClean="0"/>
-              <a:t>table to the left the primary key is `id` allowing for duplicate rows</a:t>
-            </a:r>
-          </a:p>
-          <a:p>
-            <a:pPr>
-              <a:lnSpc>
-                <a:spcPct val="100000"/>
-              </a:lnSpc>
-              <a:spcBef>
-                <a:spcPts val="1200"/>
-              </a:spcBef>
-              <a:spcAft>
-                <a:spcPts val="1200"/>
-              </a:spcAft>
-            </a:pPr>
-            <a:r>
-              <a:rPr lang="en-US" sz="2400" dirty="0" smtClean="0"/>
-              <a:t>In the </a:t>
-            </a:r>
-            <a:r>
-              <a:rPr lang="en-US" sz="2400" b="1" dirty="0" smtClean="0"/>
-              <a:t>`</a:t>
-            </a:r>
-            <a:r>
-              <a:rPr lang="en-US" sz="2400" b="1" dirty="0" err="1" smtClean="0"/>
-              <a:t>stock_info</a:t>
-            </a:r>
-            <a:r>
-              <a:rPr lang="en-US" sz="2400" b="1" dirty="0" smtClean="0"/>
-              <a:t>` </a:t>
-            </a:r>
-            <a:r>
-              <a:rPr lang="en-US" sz="2400" dirty="0" smtClean="0"/>
-              <a:t>table to the right the primary key is ticker – we only can have one row for each unique ticker</a:t>
-            </a:r>
-          </a:p>
-          <a:p>
-            <a:pPr>
-              <a:lnSpc>
-                <a:spcPct val="100000"/>
-              </a:lnSpc>
-              <a:spcBef>
-                <a:spcPts val="1200"/>
-              </a:spcBef>
-              <a:spcAft>
-                <a:spcPts val="1200"/>
-              </a:spcAft>
-            </a:pPr>
+              <a:rPr lang="en-US" sz="2200" dirty="0" smtClean="0"/>
+              <a:t>table to the </a:t>
+            </a:r>
+            <a:r>
+              <a:rPr lang="en-US" sz="2200" dirty="0" smtClean="0"/>
+              <a:t>right there are 3 columns with strings</a:t>
+            </a:r>
             <a:endParaRPr lang="en-US" sz="2400" dirty="0"/>
           </a:p>
           <a:p>
@@ -11606,14 +12908,14 @@
           <p:nvPr>
             <p:extLst>
               <p:ext uri="{D42A27DB-BD31-4B8C-83A1-F6EECF244321}">
-                <p14:modId xmlns:p14="http://schemas.microsoft.com/office/powerpoint/2010/main" val="3739710786"/>
+                <p14:modId xmlns:p14="http://schemas.microsoft.com/office/powerpoint/2010/main" val="4135498950"/>
               </p:ext>
             </p:extLst>
           </p:nvPr>
         </p:nvGraphicFramePr>
         <p:xfrm>
           <a:off x="1224064" y="2004060"/>
-          <a:ext cx="4871936" cy="2773680"/>
+          <a:ext cx="4871936" cy="2377440"/>
         </p:xfrm>
         <a:graphic>
           <a:graphicData uri="http://schemas.openxmlformats.org/drawingml/2006/table">
@@ -12088,118 +13390,6 @@
                     </a:p>
                   </a:txBody>
                   <a:tcPr/>
-                </a:tc>
-              </a:tr>
-              <a:tr h="370840">
-                <a:tc>
-                  <a:txBody>
-                    <a:bodyPr/>
-                    <a:lstStyle/>
-                    <a:p>
-                      <a:pPr algn="l"/>
-                      <a:r>
-                        <a:rPr lang="en-US" sz="2000" dirty="0" smtClean="0"/>
-                        <a:t>6</a:t>
-                      </a:r>
-                      <a:endParaRPr lang="en-US" sz="2000" dirty="0"/>
-                    </a:p>
-                  </a:txBody>
-                  <a:tcPr>
-                    <a:solidFill>
-                      <a:schemeClr val="accent2">
-                        <a:lumMod val="40000"/>
-                        <a:lumOff val="60000"/>
-                      </a:schemeClr>
-                    </a:solidFill>
-                  </a:tcPr>
-                </a:tc>
-                <a:tc>
-                  <a:txBody>
-                    <a:bodyPr/>
-                    <a:lstStyle/>
-                    <a:p>
-                      <a:pPr algn="l"/>
-                      <a:r>
-                        <a:rPr lang="en-US" sz="2000" dirty="0" smtClean="0"/>
-                        <a:t>XOM</a:t>
-                      </a:r>
-                      <a:endParaRPr lang="en-US" sz="2000" dirty="0"/>
-                    </a:p>
-                  </a:txBody>
-                  <a:tcPr>
-                    <a:solidFill>
-                      <a:schemeClr val="accent2">
-                        <a:lumMod val="40000"/>
-                        <a:lumOff val="60000"/>
-                      </a:schemeClr>
-                    </a:solidFill>
-                  </a:tcPr>
-                </a:tc>
-                <a:tc>
-                  <a:txBody>
-                    <a:bodyPr/>
-                    <a:lstStyle/>
-                    <a:p>
-                      <a:pPr algn="r"/>
-                      <a:r>
-                        <a:rPr lang="en-US" sz="2000" dirty="0" smtClean="0"/>
-                        <a:t>2020-08-18</a:t>
-                      </a:r>
-                      <a:endParaRPr lang="en-US" sz="2000" dirty="0"/>
-                    </a:p>
-                  </a:txBody>
-                  <a:tcPr>
-                    <a:solidFill>
-                      <a:schemeClr val="accent2">
-                        <a:lumMod val="40000"/>
-                        <a:lumOff val="60000"/>
-                      </a:schemeClr>
-                    </a:solidFill>
-                  </a:tcPr>
-                </a:tc>
-                <a:tc>
-                  <a:txBody>
-                    <a:bodyPr/>
-                    <a:lstStyle/>
-                    <a:p>
-                      <a:pPr algn="r"/>
-                      <a:r>
-                        <a:rPr lang="en-US" sz="2000" dirty="0" smtClean="0"/>
-                        <a:t>-0.0049</a:t>
-                      </a:r>
-                      <a:endParaRPr lang="en-US" sz="2000" dirty="0"/>
-                    </a:p>
-                  </a:txBody>
-                  <a:tcPr>
-                    <a:solidFill>
-                      <a:schemeClr val="accent2">
-                        <a:lumMod val="40000"/>
-                        <a:lumOff val="60000"/>
-                      </a:schemeClr>
-                    </a:solidFill>
-                  </a:tcPr>
-                </a:tc>
-                <a:tc>
-                  <a:txBody>
-                    <a:bodyPr/>
-                    <a:lstStyle/>
-                    <a:p>
-                      <a:pPr algn="r"/>
-                      <a:r>
-                        <a:rPr lang="en-US" sz="2000" dirty="0" smtClean="0"/>
-                        <a:t>42.43</a:t>
-                      </a:r>
-                      <a:endParaRPr lang="en-US" sz="2000" dirty="0"/>
-                    </a:p>
-                  </a:txBody>
-                  <a:tcPr>
-                    <a:solidFill>
-                      <a:schemeClr val="accent2">
-                        <a:lumMod val="40000"/>
-                        <a:lumOff val="60000"/>
-                      </a:schemeClr>
-                    </a:solidFill>
-                  </a:tcPr>
                 </a:tc>
               </a:tr>
             </a:tbl>
@@ -12418,7 +13608,7 @@
     </p:spTree>
     <p:extLst>
       <p:ext uri="{BB962C8B-B14F-4D97-AF65-F5344CB8AC3E}">
-        <p14:creationId xmlns:p14="http://schemas.microsoft.com/office/powerpoint/2010/main" val="2871118362"/>
+        <p14:creationId xmlns:p14="http://schemas.microsoft.com/office/powerpoint/2010/main" val="2256508233"/>
       </p:ext>
     </p:extLst>
   </p:cSld>
@@ -12476,7 +13666,7 @@
           <a:p>
             <a:r>
               <a:rPr lang="en-US" sz="3800" dirty="0" smtClean="0"/>
-              <a:t>SQL: Foreign Keys</a:t>
+              <a:t>SQL: Primary Keys</a:t>
             </a:r>
             <a:endParaRPr lang="en-US" sz="3800" dirty="0"/>
           </a:p>
@@ -12500,7 +13690,7 @@
         </p:spPr>
         <p:txBody>
           <a:bodyPr>
-            <a:normAutofit/>
+            <a:normAutofit fontScale="92500" lnSpcReduction="10000"/>
           </a:bodyPr>
           <a:lstStyle/>
           <a:p>
@@ -12517,7 +13707,15 @@
             </a:pPr>
             <a:r>
               <a:rPr lang="en-US" sz="2400" dirty="0" smtClean="0"/>
-              <a:t>A foreign key is a column in a table that links this table to another one</a:t>
+              <a:t>A primary key </a:t>
+            </a:r>
+            <a:r>
+              <a:rPr lang="en-US" sz="2400" b="1" dirty="0" smtClean="0"/>
+              <a:t>uniquely</a:t>
+            </a:r>
+            <a:r>
+              <a:rPr lang="en-US" sz="2400" dirty="0" smtClean="0"/>
+              <a:t> identifies each row in a table</a:t>
             </a:r>
           </a:p>
           <a:p>
@@ -12563,6 +13761,114 @@
             <a:endParaRPr lang="en-US" sz="2400" dirty="0"/>
           </a:p>
           <a:p>
+            <a:pPr>
+              <a:lnSpc>
+                <a:spcPct val="100000"/>
+              </a:lnSpc>
+              <a:spcBef>
+                <a:spcPts val="1200"/>
+              </a:spcBef>
+              <a:spcAft>
+                <a:spcPts val="1200"/>
+              </a:spcAft>
+            </a:pPr>
+            <a:endParaRPr lang="en-US" sz="2400" dirty="0" smtClean="0"/>
+          </a:p>
+          <a:p>
+            <a:pPr>
+              <a:lnSpc>
+                <a:spcPct val="100000"/>
+              </a:lnSpc>
+              <a:spcBef>
+                <a:spcPts val="1200"/>
+              </a:spcBef>
+              <a:spcAft>
+                <a:spcPts val="1200"/>
+              </a:spcAft>
+            </a:pPr>
+            <a:endParaRPr lang="en-US" sz="2400" dirty="0"/>
+          </a:p>
+          <a:p>
+            <a:pPr>
+              <a:lnSpc>
+                <a:spcPct val="100000"/>
+              </a:lnSpc>
+              <a:spcBef>
+                <a:spcPts val="1200"/>
+              </a:spcBef>
+              <a:spcAft>
+                <a:spcPts val="1200"/>
+              </a:spcAft>
+            </a:pPr>
+            <a:r>
+              <a:rPr lang="en-US" sz="2400" dirty="0" smtClean="0"/>
+              <a:t>In the </a:t>
+            </a:r>
+            <a:r>
+              <a:rPr lang="en-US" sz="2400" b="1" dirty="0" smtClean="0"/>
+              <a:t>`</a:t>
+            </a:r>
+            <a:r>
+              <a:rPr lang="en-US" sz="2400" b="1" dirty="0" err="1" smtClean="0"/>
+              <a:t>stock_data</a:t>
+            </a:r>
+            <a:r>
+              <a:rPr lang="en-US" sz="2400" b="1" dirty="0" smtClean="0"/>
+              <a:t>` </a:t>
+            </a:r>
+            <a:r>
+              <a:rPr lang="en-US" sz="2400" dirty="0" smtClean="0"/>
+              <a:t>table to the left the primary key is `id` allowing for duplicate rows</a:t>
+            </a:r>
+          </a:p>
+          <a:p>
+            <a:pPr>
+              <a:lnSpc>
+                <a:spcPct val="100000"/>
+              </a:lnSpc>
+              <a:spcBef>
+                <a:spcPts val="1200"/>
+              </a:spcBef>
+              <a:spcAft>
+                <a:spcPts val="1200"/>
+              </a:spcAft>
+            </a:pPr>
+            <a:r>
+              <a:rPr lang="en-US" sz="2400" dirty="0" smtClean="0"/>
+              <a:t>In the </a:t>
+            </a:r>
+            <a:r>
+              <a:rPr lang="en-US" sz="2400" b="1" dirty="0" smtClean="0"/>
+              <a:t>`</a:t>
+            </a:r>
+            <a:r>
+              <a:rPr lang="en-US" sz="2400" b="1" dirty="0" err="1" smtClean="0"/>
+              <a:t>stock_info</a:t>
+            </a:r>
+            <a:r>
+              <a:rPr lang="en-US" sz="2400" b="1" dirty="0" smtClean="0"/>
+              <a:t>` </a:t>
+            </a:r>
+            <a:r>
+              <a:rPr lang="en-US" sz="2400" dirty="0" smtClean="0"/>
+              <a:t>table to the right the primary key is ticker – we only can have one row for each unique ticker</a:t>
+            </a:r>
+          </a:p>
+          <a:p>
+            <a:pPr>
+              <a:lnSpc>
+                <a:spcPct val="100000"/>
+              </a:lnSpc>
+              <a:spcBef>
+                <a:spcPts val="1200"/>
+              </a:spcBef>
+              <a:spcAft>
+                <a:spcPts val="1200"/>
+              </a:spcAft>
+            </a:pPr>
+            <a:endParaRPr lang="en-US" sz="2400" dirty="0"/>
+          </a:p>
+          <a:p>
             <a:pPr marL="0" indent="0">
               <a:lnSpc>
                 <a:spcPct val="100000"/>
@@ -12589,51 +13895,35 @@
                 <a:spcPts val="1200"/>
               </a:spcAft>
             </a:pPr>
-            <a:r>
-              <a:rPr lang="en-US" sz="2400" dirty="0" smtClean="0"/>
-              <a:t>In the example above the </a:t>
-            </a:r>
-            <a:r>
-              <a:rPr lang="en-US" sz="2400" b="1" dirty="0" smtClean="0"/>
-              <a:t>`</a:t>
-            </a:r>
-            <a:r>
-              <a:rPr lang="en-US" sz="2400" b="1" dirty="0" err="1" smtClean="0"/>
-              <a:t>stock_data</a:t>
-            </a:r>
-            <a:r>
-              <a:rPr lang="en-US" sz="2400" b="1" dirty="0" smtClean="0"/>
-              <a:t>`</a:t>
-            </a:r>
-            <a:r>
-              <a:rPr lang="en-US" sz="2400" dirty="0" smtClean="0"/>
-              <a:t> table  </a:t>
-            </a:r>
-            <a:r>
-              <a:rPr lang="en-US" sz="2400" b="1" dirty="0" smtClean="0"/>
-              <a:t>`ticker`</a:t>
-            </a:r>
-            <a:r>
-              <a:rPr lang="en-US" sz="2400" dirty="0" smtClean="0"/>
-              <a:t> is a foreign key, because it is a primary key in the </a:t>
-            </a:r>
-            <a:r>
-              <a:rPr lang="en-US" sz="2400" b="1" dirty="0" smtClean="0"/>
-              <a:t>`</a:t>
-            </a:r>
-            <a:r>
-              <a:rPr lang="en-US" sz="2400" b="1" dirty="0" err="1" smtClean="0"/>
-              <a:t>stock_info</a:t>
-            </a:r>
-            <a:r>
-              <a:rPr lang="en-US" sz="2400" b="1" dirty="0" smtClean="0"/>
-              <a:t>`</a:t>
-            </a:r>
-            <a:r>
-              <a:rPr lang="en-US" sz="2400" dirty="0" smtClean="0"/>
-              <a:t> table</a:t>
-            </a:r>
             <a:endParaRPr lang="en-US" sz="2400" dirty="0"/>
+          </a:p>
+          <a:p>
+            <a:pPr>
+              <a:lnSpc>
+                <a:spcPct val="100000"/>
+              </a:lnSpc>
+              <a:spcBef>
+                <a:spcPts val="1200"/>
+              </a:spcBef>
+              <a:spcAft>
+                <a:spcPts val="1200"/>
+              </a:spcAft>
+            </a:pPr>
+            <a:endParaRPr lang="en-US" sz="2400" dirty="0" smtClean="0"/>
+          </a:p>
+          <a:p>
+            <a:pPr>
+              <a:lnSpc>
+                <a:spcPct val="100000"/>
+              </a:lnSpc>
+              <a:spcBef>
+                <a:spcPts val="1200"/>
+              </a:spcBef>
+              <a:spcAft>
+                <a:spcPts val="1200"/>
+              </a:spcAft>
+            </a:pPr>
+            <a:endParaRPr lang="en-US" sz="2400" dirty="0" smtClean="0"/>
           </a:p>
           <a:p>
             <a:pPr marL="0" indent="0">
@@ -12648,7 +13938,7 @@
               </a:spcAft>
               <a:buNone/>
             </a:pPr>
-            <a:endParaRPr lang="en-US" sz="2400" dirty="0" smtClean="0"/>
+            <a:endParaRPr lang="en-US" sz="2400" dirty="0"/>
           </a:p>
           <a:p>
             <a:pPr>
@@ -12662,34 +13952,6 @@
                 <a:spcPts val="1200"/>
               </a:spcAft>
             </a:pPr>
-            <a:endParaRPr lang="en-US" sz="2400" dirty="0"/>
-          </a:p>
-          <a:p>
-            <a:pPr>
-              <a:lnSpc>
-                <a:spcPct val="100000"/>
-              </a:lnSpc>
-              <a:spcBef>
-                <a:spcPts val="1200"/>
-              </a:spcBef>
-              <a:spcAft>
-                <a:spcPts val="1200"/>
-              </a:spcAft>
-            </a:pPr>
-            <a:endParaRPr lang="en-US" sz="2400" dirty="0" smtClean="0"/>
-          </a:p>
-          <a:p>
-            <a:pPr>
-              <a:lnSpc>
-                <a:spcPct val="100000"/>
-              </a:lnSpc>
-              <a:spcBef>
-                <a:spcPts val="1200"/>
-              </a:spcBef>
-              <a:spcAft>
-                <a:spcPts val="1200"/>
-              </a:spcAft>
-            </a:pPr>
             <a:endParaRPr lang="en-US" sz="2400" dirty="0" smtClean="0"/>
           </a:p>
           <a:p>
@@ -12705,20 +13967,6 @@
               </a:spcAft>
               <a:buNone/>
             </a:pPr>
-            <a:endParaRPr lang="en-US" sz="2400" dirty="0"/>
-          </a:p>
-          <a:p>
-            <a:pPr>
-              <a:lnSpc>
-                <a:spcPct val="100000"/>
-              </a:lnSpc>
-              <a:spcBef>
-                <a:spcPts val="1200"/>
-              </a:spcBef>
-              <a:spcAft>
-                <a:spcPts val="1200"/>
-              </a:spcAft>
-            </a:pPr>
             <a:endParaRPr lang="en-US" sz="2400" dirty="0" smtClean="0"/>
           </a:p>
           <a:p>
@@ -12736,40 +13984,25 @@
             </a:pPr>
             <a:endParaRPr lang="en-US" sz="2400" dirty="0" smtClean="0"/>
           </a:p>
-          <a:p>
-            <a:pPr marL="0" indent="0">
-              <a:lnSpc>
-                <a:spcPct val="100000"/>
-              </a:lnSpc>
-              <a:spcBef>
-                <a:spcPts val="1200"/>
-              </a:spcBef>
-              <a:spcAft>
-                <a:spcPts val="1200"/>
-              </a:spcAft>
-              <a:buNone/>
-            </a:pPr>
-            <a:endParaRPr lang="en-US" sz="2400" dirty="0" smtClean="0"/>
-          </a:p>
         </p:txBody>
       </p:sp>
       <p:graphicFrame>
         <p:nvGraphicFramePr>
-          <p:cNvPr id="8" name="Table 7"/>
+          <p:cNvPr id="6" name="Table 5"/>
           <p:cNvGraphicFramePr>
             <a:graphicFrameLocks noGrp="1"/>
           </p:cNvGraphicFramePr>
           <p:nvPr>
             <p:extLst>
               <p:ext uri="{D42A27DB-BD31-4B8C-83A1-F6EECF244321}">
-                <p14:modId xmlns:p14="http://schemas.microsoft.com/office/powerpoint/2010/main" val="753645852"/>
+                <p14:modId xmlns:p14="http://schemas.microsoft.com/office/powerpoint/2010/main" val="3739710786"/>
               </p:ext>
             </p:extLst>
           </p:nvPr>
         </p:nvGraphicFramePr>
         <p:xfrm>
-          <a:off x="1233791" y="1955422"/>
-          <a:ext cx="4871936" cy="2377440"/>
+          <a:off x="1224064" y="2004060"/>
+          <a:ext cx="4871936" cy="2773680"/>
         </p:xfrm>
         <a:graphic>
           <a:graphicData uri="http://schemas.openxmlformats.org/drawingml/2006/table">
@@ -12807,22 +14040,457 @@
                     <a:p>
                       <a:pPr algn="l"/>
                       <a:r>
-                        <a:rPr lang="en-US" sz="2000" dirty="0" smtClean="0">
-                          <a:solidFill>
-                            <a:schemeClr val="bg2">
-                              <a:lumMod val="25000"/>
-                            </a:schemeClr>
-                          </a:solidFill>
-                        </a:rPr>
+                        <a:rPr lang="en-US" sz="2000" dirty="0" smtClean="0"/>
                         <a:t>ticker</a:t>
                       </a:r>
-                      <a:endParaRPr lang="en-US" sz="2000" dirty="0">
-                        <a:solidFill>
-                          <a:schemeClr val="bg2">
-                            <a:lumMod val="25000"/>
-                          </a:schemeClr>
-                        </a:solidFill>
-                      </a:endParaRPr>
+                      <a:endParaRPr lang="en-US" sz="2000" dirty="0"/>
+                    </a:p>
+                  </a:txBody>
+                  <a:tcPr/>
+                </a:tc>
+                <a:tc>
+                  <a:txBody>
+                    <a:bodyPr/>
+                    <a:lstStyle/>
+                    <a:p>
+                      <a:pPr algn="ctr"/>
+                      <a:r>
+                        <a:rPr lang="en-US" sz="2000" dirty="0" smtClean="0"/>
+                        <a:t>_date</a:t>
+                      </a:r>
+                      <a:endParaRPr lang="en-US" sz="2000" dirty="0"/>
+                    </a:p>
+                  </a:txBody>
+                  <a:tcPr/>
+                </a:tc>
+                <a:tc>
+                  <a:txBody>
+                    <a:bodyPr/>
+                    <a:lstStyle/>
+                    <a:p>
+                      <a:pPr algn="ctr"/>
+                      <a:r>
+                        <a:rPr lang="en-US" sz="2000" dirty="0" smtClean="0"/>
+                        <a:t>ret</a:t>
+                      </a:r>
+                      <a:endParaRPr lang="en-US" sz="2000" dirty="0"/>
+                    </a:p>
+                  </a:txBody>
+                  <a:tcPr/>
+                </a:tc>
+                <a:tc>
+                  <a:txBody>
+                    <a:bodyPr/>
+                    <a:lstStyle/>
+                    <a:p>
+                      <a:pPr algn="ctr"/>
+                      <a:r>
+                        <a:rPr lang="en-US" sz="2000" dirty="0" smtClean="0"/>
+                        <a:t>price</a:t>
+                      </a:r>
+                      <a:endParaRPr lang="en-US" sz="2000" dirty="0"/>
+                    </a:p>
+                  </a:txBody>
+                  <a:tcPr/>
+                </a:tc>
+              </a:tr>
+              <a:tr h="370840">
+                <a:tc>
+                  <a:txBody>
+                    <a:bodyPr/>
+                    <a:lstStyle/>
+                    <a:p>
+                      <a:pPr algn="l"/>
+                      <a:r>
+                        <a:rPr lang="en-US" sz="2000" dirty="0" smtClean="0"/>
+                        <a:t>1</a:t>
+                      </a:r>
+                      <a:endParaRPr lang="en-US" sz="2000" dirty="0"/>
+                    </a:p>
+                  </a:txBody>
+                  <a:tcPr/>
+                </a:tc>
+                <a:tc>
+                  <a:txBody>
+                    <a:bodyPr/>
+                    <a:lstStyle/>
+                    <a:p>
+                      <a:pPr algn="l"/>
+                      <a:r>
+                        <a:rPr lang="en-US" sz="2000" dirty="0" smtClean="0"/>
+                        <a:t>AAPL</a:t>
+                      </a:r>
+                      <a:endParaRPr lang="en-US" sz="2000" dirty="0"/>
+                    </a:p>
+                  </a:txBody>
+                  <a:tcPr/>
+                </a:tc>
+                <a:tc>
+                  <a:txBody>
+                    <a:bodyPr/>
+                    <a:lstStyle/>
+                    <a:p>
+                      <a:pPr algn="r"/>
+                      <a:r>
+                        <a:rPr lang="en-US" sz="2000" dirty="0" smtClean="0"/>
+                        <a:t>2020-08-18</a:t>
+                      </a:r>
+                      <a:endParaRPr lang="en-US" sz="2000" dirty="0"/>
+                    </a:p>
+                  </a:txBody>
+                  <a:tcPr/>
+                </a:tc>
+                <a:tc>
+                  <a:txBody>
+                    <a:bodyPr/>
+                    <a:lstStyle/>
+                    <a:p>
+                      <a:pPr algn="r"/>
+                      <a:r>
+                        <a:rPr lang="en-US" sz="2000" dirty="0" smtClean="0"/>
+                        <a:t>0.0083</a:t>
+                      </a:r>
+                      <a:endParaRPr lang="en-US" sz="2000" dirty="0"/>
+                    </a:p>
+                  </a:txBody>
+                  <a:tcPr/>
+                </a:tc>
+                <a:tc>
+                  <a:txBody>
+                    <a:bodyPr/>
+                    <a:lstStyle/>
+                    <a:p>
+                      <a:pPr algn="r"/>
+                      <a:r>
+                        <a:rPr lang="en-US" sz="2000" dirty="0" smtClean="0"/>
+                        <a:t>462.25</a:t>
+                      </a:r>
+                      <a:endParaRPr lang="en-US" sz="2000" dirty="0"/>
+                    </a:p>
+                  </a:txBody>
+                  <a:tcPr/>
+                </a:tc>
+              </a:tr>
+              <a:tr h="370840">
+                <a:tc>
+                  <a:txBody>
+                    <a:bodyPr/>
+                    <a:lstStyle/>
+                    <a:p>
+                      <a:pPr algn="l"/>
+                      <a:r>
+                        <a:rPr lang="en-US" sz="2000" dirty="0" smtClean="0"/>
+                        <a:t>2</a:t>
+                      </a:r>
+                      <a:endParaRPr lang="en-US" sz="2000" dirty="0"/>
+                    </a:p>
+                  </a:txBody>
+                  <a:tcPr/>
+                </a:tc>
+                <a:tc>
+                  <a:txBody>
+                    <a:bodyPr/>
+                    <a:lstStyle/>
+                    <a:p>
+                      <a:pPr algn="l"/>
+                      <a:r>
+                        <a:rPr lang="en-US" sz="2000" dirty="0" smtClean="0"/>
+                        <a:t>AAPL</a:t>
+                      </a:r>
+                      <a:endParaRPr lang="en-US" sz="2000" dirty="0"/>
+                    </a:p>
+                  </a:txBody>
+                  <a:tcPr/>
+                </a:tc>
+                <a:tc>
+                  <a:txBody>
+                    <a:bodyPr/>
+                    <a:lstStyle/>
+                    <a:p>
+                      <a:pPr algn="r"/>
+                      <a:r>
+                        <a:rPr lang="en-US" sz="2000" dirty="0" smtClean="0"/>
+                        <a:t>2020-08-19</a:t>
+                      </a:r>
+                      <a:endParaRPr lang="en-US" sz="2000" dirty="0"/>
+                    </a:p>
+                  </a:txBody>
+                  <a:tcPr/>
+                </a:tc>
+                <a:tc>
+                  <a:txBody>
+                    <a:bodyPr/>
+                    <a:lstStyle/>
+                    <a:p>
+                      <a:pPr algn="r"/>
+                      <a:r>
+                        <a:rPr lang="en-US" sz="2000" dirty="0" smtClean="0"/>
+                        <a:t>0.0013</a:t>
+                      </a:r>
+                      <a:endParaRPr lang="en-US" sz="2000" dirty="0"/>
+                    </a:p>
+                  </a:txBody>
+                  <a:tcPr/>
+                </a:tc>
+                <a:tc>
+                  <a:txBody>
+                    <a:bodyPr/>
+                    <a:lstStyle/>
+                    <a:p>
+                      <a:pPr algn="r"/>
+                      <a:r>
+                        <a:rPr lang="en-US" sz="2000" dirty="0" smtClean="0"/>
+                        <a:t>462.83</a:t>
+                      </a:r>
+                      <a:endParaRPr lang="en-US" sz="2000" dirty="0"/>
+                    </a:p>
+                  </a:txBody>
+                  <a:tcPr/>
+                </a:tc>
+              </a:tr>
+              <a:tr h="370840">
+                <a:tc>
+                  <a:txBody>
+                    <a:bodyPr/>
+                    <a:lstStyle/>
+                    <a:p>
+                      <a:pPr algn="l"/>
+                      <a:r>
+                        <a:rPr lang="en-US" sz="2000" dirty="0" smtClean="0"/>
+                        <a:t>3</a:t>
+                      </a:r>
+                      <a:endParaRPr lang="en-US" sz="2000" dirty="0"/>
+                    </a:p>
+                  </a:txBody>
+                  <a:tcPr/>
+                </a:tc>
+                <a:tc>
+                  <a:txBody>
+                    <a:bodyPr/>
+                    <a:lstStyle/>
+                    <a:p>
+                      <a:pPr algn="l"/>
+                      <a:r>
+                        <a:rPr lang="en-US" sz="2000" dirty="0" smtClean="0"/>
+                        <a:t>MSFT</a:t>
+                      </a:r>
+                      <a:endParaRPr lang="en-US" sz="2000" dirty="0"/>
+                    </a:p>
+                  </a:txBody>
+                  <a:tcPr/>
+                </a:tc>
+                <a:tc>
+                  <a:txBody>
+                    <a:bodyPr/>
+                    <a:lstStyle/>
+                    <a:p>
+                      <a:pPr algn="r"/>
+                      <a:r>
+                        <a:rPr lang="en-US" sz="2000" dirty="0" smtClean="0"/>
+                        <a:t>2020-08-18</a:t>
+                      </a:r>
+                      <a:endParaRPr lang="en-US" sz="2000" dirty="0"/>
+                    </a:p>
+                  </a:txBody>
+                  <a:tcPr/>
+                </a:tc>
+                <a:tc>
+                  <a:txBody>
+                    <a:bodyPr/>
+                    <a:lstStyle/>
+                    <a:p>
+                      <a:pPr algn="r"/>
+                      <a:r>
+                        <a:rPr lang="en-US" sz="2000" dirty="0" smtClean="0"/>
+                        <a:t>0.0058</a:t>
+                      </a:r>
+                      <a:endParaRPr lang="en-US" sz="2000" dirty="0"/>
+                    </a:p>
+                  </a:txBody>
+                  <a:tcPr/>
+                </a:tc>
+                <a:tc>
+                  <a:txBody>
+                    <a:bodyPr/>
+                    <a:lstStyle/>
+                    <a:p>
+                      <a:pPr algn="r"/>
+                      <a:r>
+                        <a:rPr lang="en-US" sz="2000" dirty="0" smtClean="0"/>
+                        <a:t>211.49</a:t>
+                      </a:r>
+                      <a:endParaRPr lang="en-US" sz="2000" dirty="0"/>
+                    </a:p>
+                  </a:txBody>
+                  <a:tcPr/>
+                </a:tc>
+              </a:tr>
+              <a:tr h="370840">
+                <a:tc>
+                  <a:txBody>
+                    <a:bodyPr/>
+                    <a:lstStyle/>
+                    <a:p>
+                      <a:pPr algn="l"/>
+                      <a:r>
+                        <a:rPr lang="en-US" sz="2000" dirty="0" smtClean="0"/>
+                        <a:t>4</a:t>
+                      </a:r>
+                      <a:endParaRPr lang="en-US" sz="2000" dirty="0"/>
+                    </a:p>
+                  </a:txBody>
+                  <a:tcPr/>
+                </a:tc>
+                <a:tc>
+                  <a:txBody>
+                    <a:bodyPr/>
+                    <a:lstStyle/>
+                    <a:p>
+                      <a:pPr algn="l"/>
+                      <a:r>
+                        <a:rPr lang="en-US" sz="2000" dirty="0" smtClean="0"/>
+                        <a:t>MSFT</a:t>
+                      </a:r>
+                      <a:endParaRPr lang="en-US" sz="2000" dirty="0"/>
+                    </a:p>
+                  </a:txBody>
+                  <a:tcPr/>
+                </a:tc>
+                <a:tc>
+                  <a:txBody>
+                    <a:bodyPr/>
+                    <a:lstStyle/>
+                    <a:p>
+                      <a:pPr algn="r"/>
+                      <a:r>
+                        <a:rPr lang="en-US" sz="2000" dirty="0" smtClean="0"/>
+                        <a:t>2020-08-19</a:t>
+                      </a:r>
+                      <a:endParaRPr lang="en-US" sz="2000" dirty="0"/>
+                    </a:p>
+                  </a:txBody>
+                  <a:tcPr/>
+                </a:tc>
+                <a:tc>
+                  <a:txBody>
+                    <a:bodyPr/>
+                    <a:lstStyle/>
+                    <a:p>
+                      <a:pPr algn="r"/>
+                      <a:r>
+                        <a:rPr lang="en-US" sz="2000" dirty="0" smtClean="0"/>
+                        <a:t>-0.0085</a:t>
+                      </a:r>
+                      <a:endParaRPr lang="en-US" sz="2000" dirty="0"/>
+                    </a:p>
+                  </a:txBody>
+                  <a:tcPr/>
+                </a:tc>
+                <a:tc>
+                  <a:txBody>
+                    <a:bodyPr/>
+                    <a:lstStyle/>
+                    <a:p>
+                      <a:pPr algn="r"/>
+                      <a:r>
+                        <a:rPr lang="en-US" sz="2000" dirty="0" smtClean="0"/>
+                        <a:t>209.70</a:t>
+                      </a:r>
+                      <a:endParaRPr lang="en-US" sz="2000" dirty="0"/>
+                    </a:p>
+                  </a:txBody>
+                  <a:tcPr/>
+                </a:tc>
+              </a:tr>
+              <a:tr h="370840">
+                <a:tc>
+                  <a:txBody>
+                    <a:bodyPr/>
+                    <a:lstStyle/>
+                    <a:p>
+                      <a:pPr algn="l"/>
+                      <a:r>
+                        <a:rPr lang="en-US" sz="2000" dirty="0" smtClean="0"/>
+                        <a:t>5</a:t>
+                      </a:r>
+                      <a:endParaRPr lang="en-US" sz="2000" dirty="0"/>
+                    </a:p>
+                  </a:txBody>
+                  <a:tcPr/>
+                </a:tc>
+                <a:tc>
+                  <a:txBody>
+                    <a:bodyPr/>
+                    <a:lstStyle/>
+                    <a:p>
+                      <a:pPr algn="l"/>
+                      <a:r>
+                        <a:rPr lang="en-US" sz="2000" dirty="0" smtClean="0"/>
+                        <a:t>XOM</a:t>
+                      </a:r>
+                      <a:endParaRPr lang="en-US" sz="2000" dirty="0"/>
+                    </a:p>
+                  </a:txBody>
+                  <a:tcPr/>
+                </a:tc>
+                <a:tc>
+                  <a:txBody>
+                    <a:bodyPr/>
+                    <a:lstStyle/>
+                    <a:p>
+                      <a:pPr algn="r"/>
+                      <a:r>
+                        <a:rPr lang="en-US" sz="2000" dirty="0" smtClean="0"/>
+                        <a:t>2020-08-18</a:t>
+                      </a:r>
+                      <a:endParaRPr lang="en-US" sz="2000" dirty="0"/>
+                    </a:p>
+                  </a:txBody>
+                  <a:tcPr/>
+                </a:tc>
+                <a:tc>
+                  <a:txBody>
+                    <a:bodyPr/>
+                    <a:lstStyle/>
+                    <a:p>
+                      <a:pPr algn="r"/>
+                      <a:r>
+                        <a:rPr lang="en-US" sz="2000" dirty="0" smtClean="0"/>
+                        <a:t>-0.0049</a:t>
+                      </a:r>
+                      <a:endParaRPr lang="en-US" sz="2000" dirty="0"/>
+                    </a:p>
+                  </a:txBody>
+                  <a:tcPr/>
+                </a:tc>
+                <a:tc>
+                  <a:txBody>
+                    <a:bodyPr/>
+                    <a:lstStyle/>
+                    <a:p>
+                      <a:pPr algn="r"/>
+                      <a:r>
+                        <a:rPr lang="en-US" sz="2000" dirty="0" smtClean="0"/>
+                        <a:t>42.43</a:t>
+                      </a:r>
+                      <a:endParaRPr lang="en-US" sz="2000" dirty="0"/>
+                    </a:p>
+                  </a:txBody>
+                  <a:tcPr/>
+                </a:tc>
+              </a:tr>
+              <a:tr h="370840">
+                <a:tc>
+                  <a:txBody>
+                    <a:bodyPr/>
+                    <a:lstStyle/>
+                    <a:p>
+                      <a:pPr algn="l"/>
+                      <a:r>
+                        <a:rPr lang="en-US" sz="2000" dirty="0" smtClean="0"/>
+                        <a:t>6</a:t>
+                      </a:r>
+                      <a:endParaRPr lang="en-US" sz="2000" dirty="0"/>
                     </a:p>
                   </a:txBody>
                   <a:tcPr>
@@ -12839,72 +14507,10 @@
                     <a:bodyPr/>
                     <a:lstStyle/>
                     <a:p>
-                      <a:pPr algn="ctr"/>
-                      <a:r>
-                        <a:rPr lang="en-US" sz="2000" dirty="0" smtClean="0"/>
-                        <a:t>_date</a:t>
-                      </a:r>
-                      <a:endParaRPr lang="en-US" sz="2000" dirty="0"/>
-                    </a:p>
-                  </a:txBody>
-                  <a:tcPr/>
-                </a:tc>
-                <a:tc>
-                  <a:txBody>
-                    <a:bodyPr/>
-                    <a:lstStyle/>
-                    <a:p>
-                      <a:pPr algn="ctr"/>
-                      <a:r>
-                        <a:rPr lang="en-US" sz="2000" dirty="0" smtClean="0"/>
-                        <a:t>ret</a:t>
-                      </a:r>
-                      <a:endParaRPr lang="en-US" sz="2000" dirty="0"/>
-                    </a:p>
-                  </a:txBody>
-                  <a:tcPr/>
-                </a:tc>
-                <a:tc>
-                  <a:txBody>
-                    <a:bodyPr/>
-                    <a:lstStyle/>
-                    <a:p>
-                      <a:pPr algn="ctr"/>
-                      <a:r>
-                        <a:rPr lang="en-US" sz="2000" dirty="0" smtClean="0"/>
-                        <a:t>price</a:t>
-                      </a:r>
-                      <a:endParaRPr lang="en-US" sz="2000" dirty="0"/>
-                    </a:p>
-                  </a:txBody>
-                  <a:tcPr/>
-                </a:tc>
-              </a:tr>
-              <a:tr h="370840">
-                <a:tc>
-                  <a:txBody>
-                    <a:bodyPr/>
-                    <a:lstStyle/>
-                    <a:p>
                       <a:pPr algn="l"/>
                       <a:r>
                         <a:rPr lang="en-US" sz="2000" dirty="0" smtClean="0"/>
-                        <a:t>1</a:t>
-                      </a:r>
-                      <a:endParaRPr lang="en-US" sz="2000" dirty="0"/>
-                    </a:p>
-                  </a:txBody>
-                  <a:tcPr/>
-                </a:tc>
-                <a:tc>
-                  <a:txBody>
-                    <a:bodyPr/>
-                    <a:lstStyle/>
-                    <a:p>
-                      <a:pPr algn="l"/>
-                      <a:r>
-                        <a:rPr lang="en-US" sz="2000" dirty="0" smtClean="0"/>
-                        <a:t>AAPL</a:t>
+                        <a:t>XOM</a:t>
                       </a:r>
                       <a:endParaRPr lang="en-US" sz="2000" dirty="0"/>
                     </a:p>
@@ -12931,68 +14537,6 @@
                       <a:endParaRPr lang="en-US" sz="2000" dirty="0"/>
                     </a:p>
                   </a:txBody>
-                  <a:tcPr/>
-                </a:tc>
-                <a:tc>
-                  <a:txBody>
-                    <a:bodyPr/>
-                    <a:lstStyle/>
-                    <a:p>
-                      <a:pPr algn="r"/>
-                      <a:r>
-                        <a:rPr lang="en-US" sz="2000" dirty="0" smtClean="0"/>
-                        <a:t>0.0083</a:t>
-                      </a:r>
-                      <a:endParaRPr lang="en-US" sz="2000" dirty="0"/>
-                    </a:p>
-                  </a:txBody>
-                  <a:tcPr/>
-                </a:tc>
-                <a:tc>
-                  <a:txBody>
-                    <a:bodyPr/>
-                    <a:lstStyle/>
-                    <a:p>
-                      <a:pPr algn="r"/>
-                      <a:r>
-                        <a:rPr lang="en-US" sz="2000" dirty="0" smtClean="0"/>
-                        <a:t>462.25</a:t>
-                      </a:r>
-                      <a:endParaRPr lang="en-US" sz="2000" dirty="0"/>
-                    </a:p>
-                  </a:txBody>
-                  <a:tcPr/>
-                </a:tc>
-              </a:tr>
-              <a:tr h="370840">
-                <a:tc>
-                  <a:txBody>
-                    <a:bodyPr/>
-                    <a:lstStyle/>
-                    <a:p>
-                      <a:pPr algn="l"/>
-                      <a:r>
-                        <a:rPr lang="en-US" sz="2000" dirty="0" smtClean="0"/>
-                        <a:t>2</a:t>
-                      </a:r>
-                      <a:endParaRPr lang="en-US" sz="2000" dirty="0"/>
-                    </a:p>
-                  </a:txBody>
-                  <a:tcPr/>
-                </a:tc>
-                <a:tc>
-                  <a:txBody>
-                    <a:bodyPr/>
-                    <a:lstStyle/>
-                    <a:p>
-                      <a:pPr algn="l"/>
-                      <a:r>
-                        <a:rPr lang="en-US" sz="2000" dirty="0" smtClean="0"/>
-                        <a:t>AAPL</a:t>
-                      </a:r>
-                      <a:endParaRPr lang="en-US" sz="2000" dirty="0"/>
-                    </a:p>
-                  </a:txBody>
                   <a:tcPr>
                     <a:solidFill>
                       <a:schemeClr val="accent2">
@@ -13010,69 +14554,7 @@
                       <a:pPr algn="r"/>
                       <a:r>
                         <a:rPr lang="en-US" sz="2000" dirty="0" smtClean="0"/>
-                        <a:t>2020-08-19</a:t>
-                      </a:r>
-                      <a:endParaRPr lang="en-US" sz="2000" dirty="0"/>
-                    </a:p>
-                  </a:txBody>
-                  <a:tcPr/>
-                </a:tc>
-                <a:tc>
-                  <a:txBody>
-                    <a:bodyPr/>
-                    <a:lstStyle/>
-                    <a:p>
-                      <a:pPr algn="r"/>
-                      <a:r>
-                        <a:rPr lang="en-US" sz="2000" dirty="0" smtClean="0"/>
-                        <a:t>0.0013</a:t>
-                      </a:r>
-                      <a:endParaRPr lang="en-US" sz="2000" dirty="0"/>
-                    </a:p>
-                  </a:txBody>
-                  <a:tcPr/>
-                </a:tc>
-                <a:tc>
-                  <a:txBody>
-                    <a:bodyPr/>
-                    <a:lstStyle/>
-                    <a:p>
-                      <a:pPr algn="r"/>
-                      <a:r>
-                        <a:rPr lang="en-US" sz="2000" dirty="0" smtClean="0"/>
-                        <a:t>462.83</a:t>
-                      </a:r>
-                      <a:endParaRPr lang="en-US" sz="2000" dirty="0"/>
-                    </a:p>
-                  </a:txBody>
-                  <a:tcPr/>
-                </a:tc>
-              </a:tr>
-              <a:tr h="370840">
-                <a:tc>
-                  <a:txBody>
-                    <a:bodyPr/>
-                    <a:lstStyle/>
-                    <a:p>
-                      <a:pPr algn="l"/>
-                      <a:r>
-                        <a:rPr lang="en-US" sz="2000" dirty="0" smtClean="0"/>
-                        <a:t>3</a:t>
-                      </a:r>
-                      <a:endParaRPr lang="en-US" sz="2000" dirty="0"/>
-                    </a:p>
-                  </a:txBody>
-                  <a:tcPr/>
-                </a:tc>
-                <a:tc>
-                  <a:txBody>
-                    <a:bodyPr/>
-                    <a:lstStyle/>
-                    <a:p>
-                      <a:pPr algn="l"/>
-                      <a:r>
-                        <a:rPr lang="en-US" sz="2000" dirty="0" smtClean="0"/>
-                        <a:t>MSFT</a:t>
+                        <a:t>-0.0049</a:t>
                       </a:r>
                       <a:endParaRPr lang="en-US" sz="2000" dirty="0"/>
                     </a:p>
@@ -13094,69 +14576,7 @@
                       <a:pPr algn="r"/>
                       <a:r>
                         <a:rPr lang="en-US" sz="2000" dirty="0" smtClean="0"/>
-                        <a:t>2020-08-18</a:t>
-                      </a:r>
-                      <a:endParaRPr lang="en-US" sz="2000" dirty="0"/>
-                    </a:p>
-                  </a:txBody>
-                  <a:tcPr/>
-                </a:tc>
-                <a:tc>
-                  <a:txBody>
-                    <a:bodyPr/>
-                    <a:lstStyle/>
-                    <a:p>
-                      <a:pPr algn="r"/>
-                      <a:r>
-                        <a:rPr lang="en-US" sz="2000" dirty="0" smtClean="0"/>
-                        <a:t>0.0058</a:t>
-                      </a:r>
-                      <a:endParaRPr lang="en-US" sz="2000" dirty="0"/>
-                    </a:p>
-                  </a:txBody>
-                  <a:tcPr/>
-                </a:tc>
-                <a:tc>
-                  <a:txBody>
-                    <a:bodyPr/>
-                    <a:lstStyle/>
-                    <a:p>
-                      <a:pPr algn="r"/>
-                      <a:r>
-                        <a:rPr lang="en-US" sz="2000" dirty="0" smtClean="0"/>
-                        <a:t>211.49</a:t>
-                      </a:r>
-                      <a:endParaRPr lang="en-US" sz="2000" dirty="0"/>
-                    </a:p>
-                  </a:txBody>
-                  <a:tcPr/>
-                </a:tc>
-              </a:tr>
-              <a:tr h="370840">
-                <a:tc>
-                  <a:txBody>
-                    <a:bodyPr/>
-                    <a:lstStyle/>
-                    <a:p>
-                      <a:pPr algn="l"/>
-                      <a:r>
-                        <a:rPr lang="en-US" sz="2000" dirty="0" smtClean="0"/>
-                        <a:t>4</a:t>
-                      </a:r>
-                      <a:endParaRPr lang="en-US" sz="2000" dirty="0"/>
-                    </a:p>
-                  </a:txBody>
-                  <a:tcPr/>
-                </a:tc>
-                <a:tc>
-                  <a:txBody>
-                    <a:bodyPr/>
-                    <a:lstStyle/>
-                    <a:p>
-                      <a:pPr algn="l"/>
-                      <a:r>
-                        <a:rPr lang="en-US" sz="2000" dirty="0" smtClean="0"/>
-                        <a:t>MSFT</a:t>
+                        <a:t>42.43</a:t>
                       </a:r>
                       <a:endParaRPr lang="en-US" sz="2000" dirty="0"/>
                     </a:p>
@@ -13170,135 +14590,6 @@
                     </a:solidFill>
                   </a:tcPr>
                 </a:tc>
-                <a:tc>
-                  <a:txBody>
-                    <a:bodyPr/>
-                    <a:lstStyle/>
-                    <a:p>
-                      <a:pPr algn="r"/>
-                      <a:r>
-                        <a:rPr lang="en-US" sz="2000" dirty="0" smtClean="0"/>
-                        <a:t>2020-08-19</a:t>
-                      </a:r>
-                      <a:endParaRPr lang="en-US" sz="2000" dirty="0"/>
-                    </a:p>
-                  </a:txBody>
-                  <a:tcPr/>
-                </a:tc>
-                <a:tc>
-                  <a:txBody>
-                    <a:bodyPr/>
-                    <a:lstStyle/>
-                    <a:p>
-                      <a:pPr algn="r"/>
-                      <a:r>
-                        <a:rPr lang="en-US" sz="2000" dirty="0" smtClean="0"/>
-                        <a:t>-0.0085</a:t>
-                      </a:r>
-                      <a:endParaRPr lang="en-US" sz="2000" dirty="0"/>
-                    </a:p>
-                  </a:txBody>
-                  <a:tcPr/>
-                </a:tc>
-                <a:tc>
-                  <a:txBody>
-                    <a:bodyPr/>
-                    <a:lstStyle/>
-                    <a:p>
-                      <a:pPr algn="r"/>
-                      <a:r>
-                        <a:rPr lang="en-US" sz="2000" dirty="0" smtClean="0"/>
-                        <a:t>209.70</a:t>
-                      </a:r>
-                      <a:endParaRPr lang="en-US" sz="2000" dirty="0"/>
-                    </a:p>
-                  </a:txBody>
-                  <a:tcPr/>
-                </a:tc>
-              </a:tr>
-              <a:tr h="370840">
-                <a:tc>
-                  <a:txBody>
-                    <a:bodyPr/>
-                    <a:lstStyle/>
-                    <a:p>
-                      <a:pPr algn="l"/>
-                      <a:r>
-                        <a:rPr lang="en-US" sz="2000" dirty="0" smtClean="0"/>
-                        <a:t>5</a:t>
-                      </a:r>
-                      <a:endParaRPr lang="en-US" sz="2000" dirty="0"/>
-                    </a:p>
-                  </a:txBody>
-                  <a:tcPr/>
-                </a:tc>
-                <a:tc>
-                  <a:txBody>
-                    <a:bodyPr/>
-                    <a:lstStyle/>
-                    <a:p>
-                      <a:pPr algn="l"/>
-                      <a:r>
-                        <a:rPr lang="en-US" sz="2000" dirty="0" smtClean="0"/>
-                        <a:t>XOM</a:t>
-                      </a:r>
-                      <a:endParaRPr lang="en-US" sz="2000" dirty="0"/>
-                    </a:p>
-                  </a:txBody>
-                  <a:tcPr>
-                    <a:solidFill>
-                      <a:schemeClr val="accent2">
-                        <a:lumMod val="40000"/>
-                        <a:lumOff val="60000"/>
-                      </a:schemeClr>
-                    </a:solidFill>
-                  </a:tcPr>
-                </a:tc>
-                <a:tc>
-                  <a:txBody>
-                    <a:bodyPr/>
-                    <a:lstStyle/>
-                    <a:p>
-                      <a:pPr algn="r"/>
-                      <a:r>
-                        <a:rPr lang="en-US" sz="2000" dirty="0" smtClean="0"/>
-                        <a:t>2020-08-18</a:t>
-                      </a:r>
-                      <a:endParaRPr lang="en-US" sz="2000" dirty="0"/>
-                    </a:p>
-                  </a:txBody>
-                  <a:tcPr/>
-                </a:tc>
-                <a:tc>
-                  <a:txBody>
-                    <a:bodyPr/>
-                    <a:lstStyle/>
-                    <a:p>
-                      <a:pPr algn="r"/>
-                      <a:r>
-                        <a:rPr lang="en-US" sz="2000" dirty="0" smtClean="0"/>
-                        <a:t>-0.0049</a:t>
-                      </a:r>
-                      <a:endParaRPr lang="en-US" sz="2000" dirty="0"/>
-                    </a:p>
-                  </a:txBody>
-                  <a:tcPr/>
-                </a:tc>
-                <a:tc>
-                  <a:txBody>
-                    <a:bodyPr/>
-                    <a:lstStyle/>
-                    <a:p>
-                      <a:pPr algn="r"/>
-                      <a:r>
-                        <a:rPr lang="en-US" sz="2000" dirty="0" smtClean="0"/>
-                        <a:t>42.43</a:t>
-                      </a:r>
-                      <a:endParaRPr lang="en-US" sz="2000" dirty="0"/>
-                    </a:p>
-                  </a:txBody>
-                  <a:tcPr/>
-                </a:tc>
               </a:tr>
             </a:tbl>
           </a:graphicData>
@@ -13306,20 +14597,20 @@
       </p:graphicFrame>
       <p:graphicFrame>
         <p:nvGraphicFramePr>
-          <p:cNvPr id="9" name="Table 8"/>
+          <p:cNvPr id="7" name="Table 6"/>
           <p:cNvGraphicFramePr>
             <a:graphicFrameLocks noGrp="1"/>
           </p:cNvGraphicFramePr>
           <p:nvPr>
             <p:extLst>
               <p:ext uri="{D42A27DB-BD31-4B8C-83A1-F6EECF244321}">
-                <p14:modId xmlns:p14="http://schemas.microsoft.com/office/powerpoint/2010/main" val="1952846452"/>
+                <p14:modId xmlns:p14="http://schemas.microsoft.com/office/powerpoint/2010/main" val="2866819878"/>
               </p:ext>
             </p:extLst>
           </p:nvPr>
         </p:nvGraphicFramePr>
         <p:xfrm>
-          <a:off x="6805137" y="1945857"/>
+          <a:off x="6800273" y="2004060"/>
           <a:ext cx="4216398" cy="1584960"/>
         </p:xfrm>
         <a:graphic>
@@ -13340,32 +14631,13 @@
                     <a:lstStyle/>
                     <a:p>
                       <a:r>
-                        <a:rPr lang="en-US" sz="2000" dirty="0" smtClean="0">
-                          <a:solidFill>
-                            <a:schemeClr val="bg2">
-                              <a:lumMod val="25000"/>
-                            </a:schemeClr>
-                          </a:solidFill>
-                        </a:rPr>
+                        <a:rPr lang="en-US" sz="2000" dirty="0" smtClean="0"/>
                         <a:t>ticker</a:t>
                       </a:r>
-                      <a:endParaRPr lang="en-US" sz="2000" dirty="0">
-                        <a:solidFill>
-                          <a:schemeClr val="bg2">
-                            <a:lumMod val="25000"/>
-                          </a:schemeClr>
-                        </a:solidFill>
-                      </a:endParaRPr>
-                    </a:p>
-                  </a:txBody>
-                  <a:tcPr>
-                    <a:solidFill>
-                      <a:schemeClr val="accent2">
-                        <a:lumMod val="40000"/>
-                        <a:lumOff val="60000"/>
-                      </a:schemeClr>
-                    </a:solidFill>
-                  </a:tcPr>
+                      <a:endParaRPr lang="en-US" sz="2000" dirty="0"/>
+                    </a:p>
+                  </a:txBody>
+                  <a:tcPr/>
                 </a:tc>
                 <a:tc>
                   <a:txBody>
@@ -13409,14 +14681,7 @@
                       <a:endParaRPr lang="en-US" sz="2000" dirty="0"/>
                     </a:p>
                   </a:txBody>
-                  <a:tcPr>
-                    <a:solidFill>
-                      <a:schemeClr val="accent2">
-                        <a:lumMod val="40000"/>
-                        <a:lumOff val="60000"/>
-                      </a:schemeClr>
-                    </a:solidFill>
-                  </a:tcPr>
+                  <a:tcPr/>
                 </a:tc>
                 <a:tc>
                   <a:txBody>
@@ -13460,14 +14725,7 @@
                       <a:endParaRPr lang="en-US" sz="2000" dirty="0"/>
                     </a:p>
                   </a:txBody>
-                  <a:tcPr>
-                    <a:solidFill>
-                      <a:schemeClr val="accent2">
-                        <a:lumMod val="40000"/>
-                        <a:lumOff val="60000"/>
-                      </a:schemeClr>
-                    </a:solidFill>
-                  </a:tcPr>
+                  <a:tcPr/>
                 </a:tc>
                 <a:tc>
                   <a:txBody>
@@ -13511,14 +14769,7 @@
                       <a:endParaRPr lang="en-US" sz="2000" dirty="0"/>
                     </a:p>
                   </a:txBody>
-                  <a:tcPr>
-                    <a:solidFill>
-                      <a:schemeClr val="accent2">
-                        <a:lumMod val="40000"/>
-                        <a:lumOff val="60000"/>
-                      </a:schemeClr>
-                    </a:solidFill>
-                  </a:tcPr>
+                  <a:tcPr/>
                 </a:tc>
                 <a:tc>
                   <a:txBody>
@@ -13556,7 +14807,7 @@
     </p:spTree>
     <p:extLst>
       <p:ext uri="{BB962C8B-B14F-4D97-AF65-F5344CB8AC3E}">
-        <p14:creationId xmlns:p14="http://schemas.microsoft.com/office/powerpoint/2010/main" val="2240526998"/>
+        <p14:creationId xmlns:p14="http://schemas.microsoft.com/office/powerpoint/2010/main" val="2871118362"/>
       </p:ext>
     </p:extLst>
   </p:cSld>
@@ -13614,7 +14865,7 @@
           <a:p>
             <a:r>
               <a:rPr lang="en-US" sz="3800" dirty="0" smtClean="0"/>
-              <a:t>SQL: Composite Keys</a:t>
+              <a:t>SQL: Foreign Keys</a:t>
             </a:r>
             <a:endParaRPr lang="en-US" sz="3800" dirty="0"/>
           </a:p>
@@ -13655,24 +14906,21 @@
             </a:pPr>
             <a:r>
               <a:rPr lang="en-US" sz="2400" dirty="0" smtClean="0"/>
-              <a:t>This one is easy, we can uniquely identify a row with two columns, which totally makes sense in the case of the </a:t>
-            </a:r>
-            <a:r>
-              <a:rPr lang="en-US" sz="2400" b="1" dirty="0" smtClean="0"/>
-              <a:t>`</a:t>
-            </a:r>
-            <a:r>
-              <a:rPr lang="en-US" sz="2400" b="1" dirty="0" err="1" smtClean="0"/>
-              <a:t>stock_info</a:t>
-            </a:r>
-            <a:r>
-              <a:rPr lang="en-US" sz="2400" b="1" dirty="0" smtClean="0"/>
-              <a:t>`</a:t>
+              <a:t>A foreign key is a column in a table that links </a:t>
             </a:r>
             <a:r>
               <a:rPr lang="en-US" sz="2400" dirty="0" smtClean="0"/>
-              <a:t> table:</a:t>
-            </a:r>
+              <a:t>it</a:t>
+            </a:r>
+            <a:r>
+              <a:rPr lang="en-US" sz="2400" dirty="0" smtClean="0"/>
+              <a:t> to </a:t>
+            </a:r>
+            <a:r>
+              <a:rPr lang="en-US" sz="2400" dirty="0" smtClean="0"/>
+              <a:t>the primary key of another table</a:t>
+            </a:r>
+            <a:endParaRPr lang="en-US" sz="2400" dirty="0" smtClean="0"/>
           </a:p>
           <a:p>
             <a:pPr>
@@ -13686,7 +14934,7 @@
                 <a:spcPts val="1200"/>
               </a:spcAft>
             </a:pPr>
-            <a:endParaRPr lang="en-US" sz="2400" dirty="0" smtClean="0"/>
+            <a:endParaRPr lang="en-US" sz="2400" dirty="0"/>
           </a:p>
           <a:p>
             <a:pPr>
@@ -13714,6 +14962,79 @@
                 <a:spcPts val="1200"/>
               </a:spcAft>
             </a:pPr>
+            <a:endParaRPr lang="en-US" sz="2400" dirty="0"/>
+          </a:p>
+          <a:p>
+            <a:pPr marL="0" indent="0">
+              <a:lnSpc>
+                <a:spcPct val="100000"/>
+              </a:lnSpc>
+              <a:spcBef>
+                <a:spcPts val="1200"/>
+              </a:spcBef>
+              <a:spcAft>
+                <a:spcPts val="1200"/>
+              </a:spcAft>
+              <a:buNone/>
+            </a:pPr>
+            <a:endParaRPr lang="en-US" sz="2400" dirty="0" smtClean="0"/>
+          </a:p>
+          <a:p>
+            <a:pPr>
+              <a:lnSpc>
+                <a:spcPct val="100000"/>
+              </a:lnSpc>
+              <a:spcBef>
+                <a:spcPts val="1200"/>
+              </a:spcBef>
+              <a:spcAft>
+                <a:spcPts val="1200"/>
+              </a:spcAft>
+            </a:pPr>
+            <a:r>
+              <a:rPr lang="en-US" sz="2400" dirty="0" smtClean="0"/>
+              <a:t>In the example above the </a:t>
+            </a:r>
+            <a:r>
+              <a:rPr lang="en-US" sz="2400" b="1" dirty="0" smtClean="0"/>
+              <a:t>`</a:t>
+            </a:r>
+            <a:r>
+              <a:rPr lang="en-US" sz="2400" b="1" dirty="0" err="1" smtClean="0"/>
+              <a:t>stock_data</a:t>
+            </a:r>
+            <a:r>
+              <a:rPr lang="en-US" sz="2400" b="1" dirty="0" smtClean="0"/>
+              <a:t>`</a:t>
+            </a:r>
+            <a:r>
+              <a:rPr lang="en-US" sz="2400" dirty="0" smtClean="0"/>
+              <a:t> table  </a:t>
+            </a:r>
+            <a:r>
+              <a:rPr lang="en-US" sz="2400" b="1" dirty="0" smtClean="0"/>
+              <a:t>`ticker`</a:t>
+            </a:r>
+            <a:r>
+              <a:rPr lang="en-US" sz="2400" dirty="0" smtClean="0"/>
+              <a:t> is a foreign key, because it is a primary key in the </a:t>
+            </a:r>
+            <a:r>
+              <a:rPr lang="en-US" sz="2400" b="1" dirty="0" smtClean="0"/>
+              <a:t>`</a:t>
+            </a:r>
+            <a:r>
+              <a:rPr lang="en-US" sz="2400" b="1" dirty="0" err="1" smtClean="0"/>
+              <a:t>stock_info</a:t>
+            </a:r>
+            <a:r>
+              <a:rPr lang="en-US" sz="2400" b="1" dirty="0" smtClean="0"/>
+              <a:t>`</a:t>
+            </a:r>
+            <a:r>
+              <a:rPr lang="en-US" sz="2400" dirty="0" smtClean="0"/>
+              <a:t> table</a:t>
+            </a:r>
             <a:endParaRPr lang="en-US" sz="2400" dirty="0"/>
           </a:p>
           <a:p>
@@ -13843,14 +15164,14 @@
           <p:nvPr>
             <p:extLst>
               <p:ext uri="{D42A27DB-BD31-4B8C-83A1-F6EECF244321}">
-                <p14:modId xmlns:p14="http://schemas.microsoft.com/office/powerpoint/2010/main" val="2423432526"/>
+                <p14:modId xmlns:p14="http://schemas.microsoft.com/office/powerpoint/2010/main" val="753645852"/>
               </p:ext>
             </p:extLst>
           </p:nvPr>
         </p:nvGraphicFramePr>
         <p:xfrm>
-          <a:off x="1760166" y="2497577"/>
-          <a:ext cx="4335834" cy="2377440"/>
+          <a:off x="1233791" y="1955422"/>
+          <a:ext cx="4871936" cy="2377440"/>
         </p:xfrm>
         <a:graphic>
           <a:graphicData uri="http://schemas.openxmlformats.org/drawingml/2006/table">
@@ -13859,12 +15180,28 @@
                 <a:tableStyleId>{5C22544A-7EE6-4342-B048-85BDC9FD1C3A}</a:tableStyleId>
               </a:tblPr>
               <a:tblGrid>
+                <a:gridCol w="536102"/>
                 <a:gridCol w="826851"/>
                 <a:gridCol w="1417536"/>
                 <a:gridCol w="1001949"/>
                 <a:gridCol w="1089498"/>
               </a:tblGrid>
               <a:tr h="370840">
+                <a:tc>
+                  <a:txBody>
+                    <a:bodyPr/>
+                    <a:lstStyle/>
+                    <a:p>
+                      <a:pPr algn="l"/>
+                      <a:r>
+                        <a:rPr lang="en-US" sz="2000" dirty="0" smtClean="0"/>
+                        <a:t>id</a:t>
+                      </a:r>
+                      <a:endParaRPr lang="en-US" sz="2000" dirty="0"/>
+                    </a:p>
+                  </a:txBody>
+                  <a:tcPr/>
+                </a:tc>
                 <a:tc>
                   <a:txBody>
                     <a:bodyPr/>
@@ -13906,22 +15243,72 @@
                     <a:p>
                       <a:pPr algn="ctr"/>
                       <a:r>
-                        <a:rPr lang="en-US" sz="2000" dirty="0" smtClean="0">
-                          <a:solidFill>
-                            <a:schemeClr val="bg2">
-                              <a:lumMod val="25000"/>
-                            </a:schemeClr>
-                          </a:solidFill>
-                        </a:rPr>
+                        <a:rPr lang="en-US" sz="2000" dirty="0" smtClean="0"/>
                         <a:t>_date</a:t>
                       </a:r>
-                      <a:endParaRPr lang="en-US" sz="2000" dirty="0">
-                        <a:solidFill>
-                          <a:schemeClr val="bg2">
-                            <a:lumMod val="25000"/>
-                          </a:schemeClr>
-                        </a:solidFill>
-                      </a:endParaRPr>
+                      <a:endParaRPr lang="en-US" sz="2000" dirty="0"/>
+                    </a:p>
+                  </a:txBody>
+                  <a:tcPr/>
+                </a:tc>
+                <a:tc>
+                  <a:txBody>
+                    <a:bodyPr/>
+                    <a:lstStyle/>
+                    <a:p>
+                      <a:pPr algn="ctr"/>
+                      <a:r>
+                        <a:rPr lang="en-US" sz="2000" dirty="0" smtClean="0"/>
+                        <a:t>ret</a:t>
+                      </a:r>
+                      <a:endParaRPr lang="en-US" sz="2000" dirty="0"/>
+                    </a:p>
+                  </a:txBody>
+                  <a:tcPr/>
+                </a:tc>
+                <a:tc>
+                  <a:txBody>
+                    <a:bodyPr/>
+                    <a:lstStyle/>
+                    <a:p>
+                      <a:pPr algn="ctr"/>
+                      <a:r>
+                        <a:rPr lang="en-US" sz="2000" dirty="0" smtClean="0"/>
+                        <a:t>price</a:t>
+                      </a:r>
+                      <a:endParaRPr lang="en-US" sz="2000" dirty="0"/>
+                    </a:p>
+                  </a:txBody>
+                  <a:tcPr/>
+                </a:tc>
+              </a:tr>
+              <a:tr h="370840">
+                <a:tc>
+                  <a:txBody>
+                    <a:bodyPr/>
+                    <a:lstStyle/>
+                    <a:p>
+                      <a:pPr algn="l"/>
+                      <a:r>
+                        <a:rPr lang="en-US" sz="2000" dirty="0" smtClean="0"/>
+                        <a:t>1</a:t>
+                      </a:r>
+                      <a:endParaRPr lang="en-US" sz="2000" dirty="0"/>
+                    </a:p>
+                  </a:txBody>
+                  <a:tcPr/>
+                </a:tc>
+                <a:tc>
+                  <a:txBody>
+                    <a:bodyPr/>
+                    <a:lstStyle/>
+                    <a:p>
+                      <a:pPr algn="l"/>
+                      <a:r>
+                        <a:rPr lang="en-US" sz="2000" dirty="0" smtClean="0"/>
+                        <a:t>AAPL</a:t>
+                      </a:r>
+                      <a:endParaRPr lang="en-US" sz="2000" dirty="0"/>
                     </a:p>
                   </a:txBody>
                   <a:tcPr>
@@ -13938,25 +15325,40 @@
                     <a:bodyPr/>
                     <a:lstStyle/>
                     <a:p>
-                      <a:pPr algn="ctr"/>
-                      <a:r>
-                        <a:rPr lang="en-US" sz="2000" dirty="0" smtClean="0"/>
-                        <a:t>ret</a:t>
-                      </a:r>
-                      <a:endParaRPr lang="en-US" sz="2000" dirty="0"/>
-                    </a:p>
-                  </a:txBody>
-                  <a:tcPr/>
-                </a:tc>
-                <a:tc>
-                  <a:txBody>
-                    <a:bodyPr/>
-                    <a:lstStyle/>
-                    <a:p>
-                      <a:pPr algn="ctr"/>
-                      <a:r>
-                        <a:rPr lang="en-US" sz="2000" dirty="0" smtClean="0"/>
-                        <a:t>price</a:t>
+                      <a:pPr algn="r"/>
+                      <a:r>
+                        <a:rPr lang="en-US" sz="2000" dirty="0" smtClean="0"/>
+                        <a:t>2020-08-18</a:t>
+                      </a:r>
+                      <a:endParaRPr lang="en-US" sz="2000" dirty="0"/>
+                    </a:p>
+                  </a:txBody>
+                  <a:tcPr/>
+                </a:tc>
+                <a:tc>
+                  <a:txBody>
+                    <a:bodyPr/>
+                    <a:lstStyle/>
+                    <a:p>
+                      <a:pPr algn="r"/>
+                      <a:r>
+                        <a:rPr lang="en-US" sz="2000" dirty="0" smtClean="0"/>
+                        <a:t>0.0083</a:t>
+                      </a:r>
+                      <a:endParaRPr lang="en-US" sz="2000" dirty="0"/>
+                    </a:p>
+                  </a:txBody>
+                  <a:tcPr/>
+                </a:tc>
+                <a:tc>
+                  <a:txBody>
+                    <a:bodyPr/>
+                    <a:lstStyle/>
+                    <a:p>
+                      <a:pPr algn="r"/>
+                      <a:r>
+                        <a:rPr lang="en-US" sz="2000" dirty="0" smtClean="0"/>
+                        <a:t>462.25</a:t>
                       </a:r>
                       <a:endParaRPr lang="en-US" sz="2000" dirty="0"/>
                     </a:p>
@@ -13965,6 +15367,21 @@
                 </a:tc>
               </a:tr>
               <a:tr h="370840">
+                <a:tc>
+                  <a:txBody>
+                    <a:bodyPr/>
+                    <a:lstStyle/>
+                    <a:p>
+                      <a:pPr algn="l"/>
+                      <a:r>
+                        <a:rPr lang="en-US" sz="2000" dirty="0" smtClean="0"/>
+                        <a:t>2</a:t>
+                      </a:r>
+                      <a:endParaRPr lang="en-US" sz="2000" dirty="0"/>
+                    </a:p>
+                  </a:txBody>
+                  <a:tcPr/>
+                </a:tc>
                 <a:tc>
                   <a:txBody>
                     <a:bodyPr/>
@@ -13995,7 +15412,69 @@
                       <a:pPr algn="r"/>
                       <a:r>
                         <a:rPr lang="en-US" sz="2000" dirty="0" smtClean="0"/>
-                        <a:t>2020-08-18</a:t>
+                        <a:t>2020-08-19</a:t>
+                      </a:r>
+                      <a:endParaRPr lang="en-US" sz="2000" dirty="0"/>
+                    </a:p>
+                  </a:txBody>
+                  <a:tcPr/>
+                </a:tc>
+                <a:tc>
+                  <a:txBody>
+                    <a:bodyPr/>
+                    <a:lstStyle/>
+                    <a:p>
+                      <a:pPr algn="r"/>
+                      <a:r>
+                        <a:rPr lang="en-US" sz="2000" dirty="0" smtClean="0"/>
+                        <a:t>0.0013</a:t>
+                      </a:r>
+                      <a:endParaRPr lang="en-US" sz="2000" dirty="0"/>
+                    </a:p>
+                  </a:txBody>
+                  <a:tcPr/>
+                </a:tc>
+                <a:tc>
+                  <a:txBody>
+                    <a:bodyPr/>
+                    <a:lstStyle/>
+                    <a:p>
+                      <a:pPr algn="r"/>
+                      <a:r>
+                        <a:rPr lang="en-US" sz="2000" dirty="0" smtClean="0"/>
+                        <a:t>462.83</a:t>
+                      </a:r>
+                      <a:endParaRPr lang="en-US" sz="2000" dirty="0"/>
+                    </a:p>
+                  </a:txBody>
+                  <a:tcPr/>
+                </a:tc>
+              </a:tr>
+              <a:tr h="370840">
+                <a:tc>
+                  <a:txBody>
+                    <a:bodyPr/>
+                    <a:lstStyle/>
+                    <a:p>
+                      <a:pPr algn="l"/>
+                      <a:r>
+                        <a:rPr lang="en-US" sz="2000" dirty="0" smtClean="0"/>
+                        <a:t>3</a:t>
+                      </a:r>
+                      <a:endParaRPr lang="en-US" sz="2000" dirty="0"/>
+                    </a:p>
+                  </a:txBody>
+                  <a:tcPr/>
+                </a:tc>
+                <a:tc>
+                  <a:txBody>
+                    <a:bodyPr/>
+                    <a:lstStyle/>
+                    <a:p>
+                      <a:pPr algn="l"/>
+                      <a:r>
+                        <a:rPr lang="en-US" sz="2000" dirty="0" smtClean="0"/>
+                        <a:t>MSFT</a:t>
                       </a:r>
                       <a:endParaRPr lang="en-US" sz="2000" dirty="0"/>
                     </a:p>
@@ -14017,7 +15496,7 @@
                       <a:pPr algn="r"/>
                       <a:r>
                         <a:rPr lang="en-US" sz="2000" dirty="0" smtClean="0"/>
-                        <a:t>0.0083</a:t>
+                        <a:t>2020-08-18</a:t>
                       </a:r>
                       <a:endParaRPr lang="en-US" sz="2000" dirty="0"/>
                     </a:p>
@@ -14032,7 +15511,22 @@
                       <a:pPr algn="r"/>
                       <a:r>
                         <a:rPr lang="en-US" sz="2000" dirty="0" smtClean="0"/>
-                        <a:t>462.25</a:t>
+                        <a:t>0.0058</a:t>
+                      </a:r>
+                      <a:endParaRPr lang="en-US" sz="2000" dirty="0"/>
+                    </a:p>
+                  </a:txBody>
+                  <a:tcPr/>
+                </a:tc>
+                <a:tc>
+                  <a:txBody>
+                    <a:bodyPr/>
+                    <a:lstStyle/>
+                    <a:p>
+                      <a:pPr algn="r"/>
+                      <a:r>
+                        <a:rPr lang="en-US" sz="2000" dirty="0" smtClean="0"/>
+                        <a:t>211.49</a:t>
                       </a:r>
                       <a:endParaRPr lang="en-US" sz="2000" dirty="0"/>
                     </a:p>
@@ -14049,7 +15543,22 @@
                       <a:pPr algn="l"/>
                       <a:r>
                         <a:rPr lang="en-US" sz="2000" dirty="0" smtClean="0"/>
-                        <a:t>AAPL</a:t>
+                        <a:t>4</a:t>
+                      </a:r>
+                      <a:endParaRPr lang="en-US" sz="2000" dirty="0"/>
+                    </a:p>
+                  </a:txBody>
+                  <a:tcPr/>
+                </a:tc>
+                <a:tc>
+                  <a:txBody>
+                    <a:bodyPr/>
+                    <a:lstStyle/>
+                    <a:p>
+                      <a:pPr algn="l"/>
+                      <a:r>
+                        <a:rPr lang="en-US" sz="2000" dirty="0" smtClean="0"/>
+                        <a:t>MSFT</a:t>
                       </a:r>
                       <a:endParaRPr lang="en-US" sz="2000" dirty="0"/>
                     </a:p>
@@ -14076,6 +15585,68 @@
                       <a:endParaRPr lang="en-US" sz="2000" dirty="0"/>
                     </a:p>
                   </a:txBody>
+                  <a:tcPr/>
+                </a:tc>
+                <a:tc>
+                  <a:txBody>
+                    <a:bodyPr/>
+                    <a:lstStyle/>
+                    <a:p>
+                      <a:pPr algn="r"/>
+                      <a:r>
+                        <a:rPr lang="en-US" sz="2000" dirty="0" smtClean="0"/>
+                        <a:t>-0.0085</a:t>
+                      </a:r>
+                      <a:endParaRPr lang="en-US" sz="2000" dirty="0"/>
+                    </a:p>
+                  </a:txBody>
+                  <a:tcPr/>
+                </a:tc>
+                <a:tc>
+                  <a:txBody>
+                    <a:bodyPr/>
+                    <a:lstStyle/>
+                    <a:p>
+                      <a:pPr algn="r"/>
+                      <a:r>
+                        <a:rPr lang="en-US" sz="2000" dirty="0" smtClean="0"/>
+                        <a:t>209.70</a:t>
+                      </a:r>
+                      <a:endParaRPr lang="en-US" sz="2000" dirty="0"/>
+                    </a:p>
+                  </a:txBody>
+                  <a:tcPr/>
+                </a:tc>
+              </a:tr>
+              <a:tr h="370840">
+                <a:tc>
+                  <a:txBody>
+                    <a:bodyPr/>
+                    <a:lstStyle/>
+                    <a:p>
+                      <a:pPr algn="l"/>
+                      <a:r>
+                        <a:rPr lang="en-US" sz="2000" dirty="0" smtClean="0"/>
+                        <a:t>5</a:t>
+                      </a:r>
+                      <a:endParaRPr lang="en-US" sz="2000" dirty="0"/>
+                    </a:p>
+                  </a:txBody>
+                  <a:tcPr/>
+                </a:tc>
+                <a:tc>
+                  <a:txBody>
+                    <a:bodyPr/>
+                    <a:lstStyle/>
+                    <a:p>
+                      <a:pPr algn="l"/>
+                      <a:r>
+                        <a:rPr lang="en-US" sz="2000" dirty="0" smtClean="0"/>
+                        <a:t>XOM</a:t>
+                      </a:r>
+                      <a:endParaRPr lang="en-US" sz="2000" dirty="0"/>
+                    </a:p>
+                  </a:txBody>
                   <a:tcPr>
                     <a:solidFill>
                       <a:schemeClr val="accent2">
@@ -14093,225 +15664,12 @@
                       <a:pPr algn="r"/>
                       <a:r>
                         <a:rPr lang="en-US" sz="2000" dirty="0" smtClean="0"/>
-                        <a:t>0.0013</a:t>
-                      </a:r>
-                      <a:endParaRPr lang="en-US" sz="2000" dirty="0"/>
-                    </a:p>
-                  </a:txBody>
-                  <a:tcPr/>
-                </a:tc>
-                <a:tc>
-                  <a:txBody>
-                    <a:bodyPr/>
-                    <a:lstStyle/>
-                    <a:p>
-                      <a:pPr algn="r"/>
-                      <a:r>
-                        <a:rPr lang="en-US" sz="2000" dirty="0" smtClean="0"/>
-                        <a:t>462.83</a:t>
-                      </a:r>
-                      <a:endParaRPr lang="en-US" sz="2000" dirty="0"/>
-                    </a:p>
-                  </a:txBody>
-                  <a:tcPr/>
-                </a:tc>
-              </a:tr>
-              <a:tr h="370840">
-                <a:tc>
-                  <a:txBody>
-                    <a:bodyPr/>
-                    <a:lstStyle/>
-                    <a:p>
-                      <a:pPr algn="l"/>
-                      <a:r>
-                        <a:rPr lang="en-US" sz="2000" dirty="0" smtClean="0"/>
-                        <a:t>MSFT</a:t>
-                      </a:r>
-                      <a:endParaRPr lang="en-US" sz="2000" dirty="0"/>
-                    </a:p>
-                  </a:txBody>
-                  <a:tcPr>
-                    <a:solidFill>
-                      <a:schemeClr val="accent2">
-                        <a:lumMod val="40000"/>
-                        <a:lumOff val="60000"/>
-                      </a:schemeClr>
-                    </a:solidFill>
-                  </a:tcPr>
-                </a:tc>
-                <a:tc>
-                  <a:txBody>
-                    <a:bodyPr/>
-                    <a:lstStyle/>
-                    <a:p>
-                      <a:pPr algn="r"/>
-                      <a:r>
-                        <a:rPr lang="en-US" sz="2000" dirty="0" smtClean="0"/>
                         <a:t>2020-08-18</a:t>
                       </a:r>
                       <a:endParaRPr lang="en-US" sz="2000" dirty="0"/>
                     </a:p>
                   </a:txBody>
-                  <a:tcPr>
-                    <a:solidFill>
-                      <a:schemeClr val="accent2">
-                        <a:lumMod val="40000"/>
-                        <a:lumOff val="60000"/>
-                      </a:schemeClr>
-                    </a:solidFill>
-                  </a:tcPr>
-                </a:tc>
-                <a:tc>
-                  <a:txBody>
-                    <a:bodyPr/>
-                    <a:lstStyle/>
-                    <a:p>
-                      <a:pPr algn="r"/>
-                      <a:r>
-                        <a:rPr lang="en-US" sz="2000" dirty="0" smtClean="0"/>
-                        <a:t>0.0058</a:t>
-                      </a:r>
-                      <a:endParaRPr lang="en-US" sz="2000" dirty="0"/>
-                    </a:p>
-                  </a:txBody>
-                  <a:tcPr/>
-                </a:tc>
-                <a:tc>
-                  <a:txBody>
-                    <a:bodyPr/>
-                    <a:lstStyle/>
-                    <a:p>
-                      <a:pPr algn="r"/>
-                      <a:r>
-                        <a:rPr lang="en-US" sz="2000" dirty="0" smtClean="0"/>
-                        <a:t>211.49</a:t>
-                      </a:r>
-                      <a:endParaRPr lang="en-US" sz="2000" dirty="0"/>
-                    </a:p>
-                  </a:txBody>
-                  <a:tcPr/>
-                </a:tc>
-              </a:tr>
-              <a:tr h="370840">
-                <a:tc>
-                  <a:txBody>
-                    <a:bodyPr/>
-                    <a:lstStyle/>
-                    <a:p>
-                      <a:pPr algn="l"/>
-                      <a:r>
-                        <a:rPr lang="en-US" sz="2000" dirty="0" smtClean="0"/>
-                        <a:t>MSFT</a:t>
-                      </a:r>
-                      <a:endParaRPr lang="en-US" sz="2000" dirty="0"/>
-                    </a:p>
-                  </a:txBody>
-                  <a:tcPr>
-                    <a:solidFill>
-                      <a:schemeClr val="accent2">
-                        <a:lumMod val="40000"/>
-                        <a:lumOff val="60000"/>
-                      </a:schemeClr>
-                    </a:solidFill>
-                  </a:tcPr>
-                </a:tc>
-                <a:tc>
-                  <a:txBody>
-                    <a:bodyPr/>
-                    <a:lstStyle/>
-                    <a:p>
-                      <a:pPr algn="r"/>
-                      <a:r>
-                        <a:rPr lang="en-US" sz="2000" dirty="0" smtClean="0"/>
-                        <a:t>2020-08-19</a:t>
-                      </a:r>
-                      <a:endParaRPr lang="en-US" sz="2000" dirty="0"/>
-                    </a:p>
-                  </a:txBody>
-                  <a:tcPr>
-                    <a:solidFill>
-                      <a:schemeClr val="accent2">
-                        <a:lumMod val="40000"/>
-                        <a:lumOff val="60000"/>
-                      </a:schemeClr>
-                    </a:solidFill>
-                  </a:tcPr>
-                </a:tc>
-                <a:tc>
-                  <a:txBody>
-                    <a:bodyPr/>
-                    <a:lstStyle/>
-                    <a:p>
-                      <a:pPr algn="r"/>
-                      <a:r>
-                        <a:rPr lang="en-US" sz="2000" dirty="0" smtClean="0"/>
-                        <a:t>-0.0085</a:t>
-                      </a:r>
-                      <a:endParaRPr lang="en-US" sz="2000" dirty="0"/>
-                    </a:p>
-                  </a:txBody>
-                  <a:tcPr/>
-                </a:tc>
-                <a:tc>
-                  <a:txBody>
-                    <a:bodyPr/>
-                    <a:lstStyle/>
-                    <a:p>
-                      <a:pPr algn="r"/>
-                      <a:r>
-                        <a:rPr lang="en-US" sz="2000" dirty="0" smtClean="0"/>
-                        <a:t>209.70</a:t>
-                      </a:r>
-                      <a:endParaRPr lang="en-US" sz="2000" dirty="0"/>
-                    </a:p>
-                  </a:txBody>
-                  <a:tcPr/>
-                </a:tc>
-              </a:tr>
-              <a:tr h="370840">
-                <a:tc>
-                  <a:txBody>
-                    <a:bodyPr/>
-                    <a:lstStyle/>
-                    <a:p>
-                      <a:pPr algn="l"/>
-                      <a:r>
-                        <a:rPr lang="en-US" sz="2000" dirty="0" smtClean="0"/>
-                        <a:t>XOM</a:t>
-                      </a:r>
-                      <a:endParaRPr lang="en-US" sz="2000" dirty="0"/>
-                    </a:p>
-                  </a:txBody>
-                  <a:tcPr>
-                    <a:solidFill>
-                      <a:schemeClr val="accent2">
-                        <a:lumMod val="40000"/>
-                        <a:lumOff val="60000"/>
-                      </a:schemeClr>
-                    </a:solidFill>
-                  </a:tcPr>
-                </a:tc>
-                <a:tc>
-                  <a:txBody>
-                    <a:bodyPr/>
-                    <a:lstStyle/>
-                    <a:p>
-                      <a:pPr algn="r"/>
-                      <a:r>
-                        <a:rPr lang="en-US" sz="2000" dirty="0" smtClean="0"/>
-                        <a:t>2020-08-18</a:t>
-                      </a:r>
-                      <a:endParaRPr lang="en-US" sz="2000" dirty="0"/>
-                    </a:p>
-                  </a:txBody>
-                  <a:tcPr>
-                    <a:solidFill>
-                      <a:schemeClr val="accent2">
-                        <a:lumMod val="40000"/>
-                        <a:lumOff val="60000"/>
-                      </a:schemeClr>
-                    </a:solidFill>
-                  </a:tcPr>
+                  <a:tcPr/>
                 </a:tc>
                 <a:tc>
                   <a:txBody>
@@ -14350,20 +15708,20 @@
       </p:graphicFrame>
       <p:graphicFrame>
         <p:nvGraphicFramePr>
-          <p:cNvPr id="6" name="Table 5"/>
+          <p:cNvPr id="9" name="Table 8"/>
           <p:cNvGraphicFramePr>
             <a:graphicFrameLocks noGrp="1"/>
           </p:cNvGraphicFramePr>
           <p:nvPr>
             <p:extLst>
               <p:ext uri="{D42A27DB-BD31-4B8C-83A1-F6EECF244321}">
-                <p14:modId xmlns:p14="http://schemas.microsoft.com/office/powerpoint/2010/main" val="675656683"/>
+                <p14:modId xmlns:p14="http://schemas.microsoft.com/office/powerpoint/2010/main" val="1952846452"/>
               </p:ext>
             </p:extLst>
           </p:nvPr>
         </p:nvGraphicFramePr>
         <p:xfrm>
-          <a:off x="6800273" y="2497577"/>
+          <a:off x="6805137" y="1945857"/>
           <a:ext cx="4216398" cy="1584960"/>
         </p:xfrm>
         <a:graphic>
@@ -14384,13 +15742,32 @@
                     <a:lstStyle/>
                     <a:p>
                       <a:r>
-                        <a:rPr lang="en-US" sz="2000" dirty="0" smtClean="0"/>
+                        <a:rPr lang="en-US" sz="2000" dirty="0" smtClean="0">
+                          <a:solidFill>
+                            <a:schemeClr val="bg2">
+                              <a:lumMod val="25000"/>
+                            </a:schemeClr>
+                          </a:solidFill>
+                        </a:rPr>
                         <a:t>ticker</a:t>
                       </a:r>
-                      <a:endParaRPr lang="en-US" sz="2000" dirty="0"/>
-                    </a:p>
-                  </a:txBody>
-                  <a:tcPr/>
+                      <a:endParaRPr lang="en-US" sz="2000" dirty="0">
+                        <a:solidFill>
+                          <a:schemeClr val="bg2">
+                            <a:lumMod val="25000"/>
+                          </a:schemeClr>
+                        </a:solidFill>
+                      </a:endParaRPr>
+                    </a:p>
+                  </a:txBody>
+                  <a:tcPr>
+                    <a:solidFill>
+                      <a:schemeClr val="accent2">
+                        <a:lumMod val="40000"/>
+                        <a:lumOff val="60000"/>
+                      </a:schemeClr>
+                    </a:solidFill>
+                  </a:tcPr>
                 </a:tc>
                 <a:tc>
                   <a:txBody>
@@ -14434,7 +15811,14 @@
                       <a:endParaRPr lang="en-US" sz="2000" dirty="0"/>
                     </a:p>
                   </a:txBody>
-                  <a:tcPr/>
+                  <a:tcPr>
+                    <a:solidFill>
+                      <a:schemeClr val="accent2">
+                        <a:lumMod val="40000"/>
+                        <a:lumOff val="60000"/>
+                      </a:schemeClr>
+                    </a:solidFill>
+                  </a:tcPr>
                 </a:tc>
                 <a:tc>
                   <a:txBody>
@@ -14478,7 +15862,14 @@
                       <a:endParaRPr lang="en-US" sz="2000" dirty="0"/>
                     </a:p>
                   </a:txBody>
-                  <a:tcPr/>
+                  <a:tcPr>
+                    <a:solidFill>
+                      <a:schemeClr val="accent2">
+                        <a:lumMod val="40000"/>
+                        <a:lumOff val="60000"/>
+                      </a:schemeClr>
+                    </a:solidFill>
+                  </a:tcPr>
                 </a:tc>
                 <a:tc>
                   <a:txBody>
@@ -14522,7 +15913,14 @@
                       <a:endParaRPr lang="en-US" sz="2000" dirty="0"/>
                     </a:p>
                   </a:txBody>
-                  <a:tcPr/>
+                  <a:tcPr>
+                    <a:solidFill>
+                      <a:schemeClr val="accent2">
+                        <a:lumMod val="40000"/>
+                        <a:lumOff val="60000"/>
+                      </a:schemeClr>
+                    </a:solidFill>
+                  </a:tcPr>
                 </a:tc>
                 <a:tc>
                   <a:txBody>
@@ -14560,7 +15958,7 @@
     </p:spTree>
     <p:extLst>
       <p:ext uri="{BB962C8B-B14F-4D97-AF65-F5344CB8AC3E}">
-        <p14:creationId xmlns:p14="http://schemas.microsoft.com/office/powerpoint/2010/main" val="4066648977"/>
+        <p14:creationId xmlns:p14="http://schemas.microsoft.com/office/powerpoint/2010/main" val="2240526998"/>
       </p:ext>
     </p:extLst>
   </p:cSld>

</xml_diff>

<commit_message>
data in visualization lecture
</commit_message>
<xml_diff>
--- a/databases/databases_slides.pptx
+++ b/databases/databases_slides.pptx
@@ -229,7 +229,7 @@
           <a:p>
             <a:fld id="{FB4ABF83-DE1D-439A-9038-821E6E7BE630}" type="datetimeFigureOut">
               <a:rPr lang="en-US" smtClean="0"/>
-              <a:t>11/1/2020</a:t>
+              <a:t>11/2/2020</a:t>
             </a:fld>
             <a:endParaRPr lang="en-US"/>
           </a:p>
@@ -1129,19 +1129,7 @@
             </a:r>
             <a:r>
               <a:rPr lang="en-US" baseline="0" dirty="0" smtClean="0"/>
-              <a:t> </a:t>
-            </a:r>
-            <a:r>
-              <a:rPr lang="en-US" baseline="0" dirty="0" smtClean="0"/>
-              <a:t>and </a:t>
-            </a:r>
-            <a:r>
-              <a:rPr lang="en-US" baseline="0" dirty="0" smtClean="0"/>
-              <a:t>give it instructions to query or modify the data</a:t>
-            </a:r>
-            <a:r>
-              <a:rPr lang="en-US" baseline="0" dirty="0" smtClean="0"/>
-              <a:t>.</a:t>
+              <a:t> and give it instructions to query or modify the data.</a:t>
             </a:r>
           </a:p>
           <a:p>
@@ -1344,11 +1332,7 @@
             </a:pPr>
             <a:r>
               <a:rPr lang="en-US" baseline="0" dirty="0" smtClean="0"/>
-              <a:t>SQL </a:t>
-            </a:r>
-            <a:r>
-              <a:rPr lang="en-US" baseline="0" dirty="0" smtClean="0"/>
-              <a:t>is a standardized language for managing RDBMS</a:t>
+              <a:t>SQL is a standardized language for managing RDBMS</a:t>
             </a:r>
           </a:p>
           <a:p>
@@ -1994,7 +1978,7 @@
           <a:p>
             <a:fld id="{BAEB4113-CC9A-4791-AE56-CF423D86ED9A}" type="datetimeFigureOut">
               <a:rPr lang="en-US" smtClean="0"/>
-              <a:t>11/1/2020</a:t>
+              <a:t>11/2/2020</a:t>
             </a:fld>
             <a:endParaRPr lang="en-US"/>
           </a:p>
@@ -2164,7 +2148,7 @@
           <a:p>
             <a:fld id="{BAEB4113-CC9A-4791-AE56-CF423D86ED9A}" type="datetimeFigureOut">
               <a:rPr lang="en-US" smtClean="0"/>
-              <a:t>11/1/2020</a:t>
+              <a:t>11/2/2020</a:t>
             </a:fld>
             <a:endParaRPr lang="en-US"/>
           </a:p>
@@ -2344,7 +2328,7 @@
           <a:p>
             <a:fld id="{BAEB4113-CC9A-4791-AE56-CF423D86ED9A}" type="datetimeFigureOut">
               <a:rPr lang="en-US" smtClean="0"/>
-              <a:t>11/1/2020</a:t>
+              <a:t>11/2/2020</a:t>
             </a:fld>
             <a:endParaRPr lang="en-US"/>
           </a:p>
@@ -2514,7 +2498,7 @@
           <a:p>
             <a:fld id="{BAEB4113-CC9A-4791-AE56-CF423D86ED9A}" type="datetimeFigureOut">
               <a:rPr lang="en-US" smtClean="0"/>
-              <a:t>11/1/2020</a:t>
+              <a:t>11/2/2020</a:t>
             </a:fld>
             <a:endParaRPr lang="en-US"/>
           </a:p>
@@ -2760,7 +2744,7 @@
           <a:p>
             <a:fld id="{BAEB4113-CC9A-4791-AE56-CF423D86ED9A}" type="datetimeFigureOut">
               <a:rPr lang="en-US" smtClean="0"/>
-              <a:t>11/1/2020</a:t>
+              <a:t>11/2/2020</a:t>
             </a:fld>
             <a:endParaRPr lang="en-US"/>
           </a:p>
@@ -2992,7 +2976,7 @@
           <a:p>
             <a:fld id="{BAEB4113-CC9A-4791-AE56-CF423D86ED9A}" type="datetimeFigureOut">
               <a:rPr lang="en-US" smtClean="0"/>
-              <a:t>11/1/2020</a:t>
+              <a:t>11/2/2020</a:t>
             </a:fld>
             <a:endParaRPr lang="en-US"/>
           </a:p>
@@ -3359,7 +3343,7 @@
           <a:p>
             <a:fld id="{BAEB4113-CC9A-4791-AE56-CF423D86ED9A}" type="datetimeFigureOut">
               <a:rPr lang="en-US" smtClean="0"/>
-              <a:t>11/1/2020</a:t>
+              <a:t>11/2/2020</a:t>
             </a:fld>
             <a:endParaRPr lang="en-US"/>
           </a:p>
@@ -3477,7 +3461,7 @@
           <a:p>
             <a:fld id="{BAEB4113-CC9A-4791-AE56-CF423D86ED9A}" type="datetimeFigureOut">
               <a:rPr lang="en-US" smtClean="0"/>
-              <a:t>11/1/2020</a:t>
+              <a:t>11/2/2020</a:t>
             </a:fld>
             <a:endParaRPr lang="en-US"/>
           </a:p>
@@ -3572,7 +3556,7 @@
           <a:p>
             <a:fld id="{BAEB4113-CC9A-4791-AE56-CF423D86ED9A}" type="datetimeFigureOut">
               <a:rPr lang="en-US" smtClean="0"/>
-              <a:t>11/1/2020</a:t>
+              <a:t>11/2/2020</a:t>
             </a:fld>
             <a:endParaRPr lang="en-US"/>
           </a:p>
@@ -3849,7 +3833,7 @@
           <a:p>
             <a:fld id="{BAEB4113-CC9A-4791-AE56-CF423D86ED9A}" type="datetimeFigureOut">
               <a:rPr lang="en-US" smtClean="0"/>
-              <a:t>11/1/2020</a:t>
+              <a:t>11/2/2020</a:t>
             </a:fld>
             <a:endParaRPr lang="en-US"/>
           </a:p>
@@ -4102,7 +4086,7 @@
           <a:p>
             <a:fld id="{BAEB4113-CC9A-4791-AE56-CF423D86ED9A}" type="datetimeFigureOut">
               <a:rPr lang="en-US" smtClean="0"/>
-              <a:t>11/1/2020</a:t>
+              <a:t>11/2/2020</a:t>
             </a:fld>
             <a:endParaRPr lang="en-US"/>
           </a:p>
@@ -4315,7 +4299,7 @@
           <a:p>
             <a:fld id="{BAEB4113-CC9A-4791-AE56-CF423D86ED9A}" type="datetimeFigureOut">
               <a:rPr lang="en-US" smtClean="0"/>
-              <a:t>11/1/2020</a:t>
+              <a:t>11/2/2020</a:t>
             </a:fld>
             <a:endParaRPr lang="en-US"/>
           </a:p>
@@ -4884,11 +4868,7 @@
             </a:r>
             <a:r>
               <a:rPr lang="en-US" sz="2400" dirty="0" smtClean="0"/>
-              <a:t> </a:t>
-            </a:r>
-            <a:r>
-              <a:rPr lang="en-US" sz="2400" dirty="0" smtClean="0"/>
-              <a:t>table:</a:t>
+              <a:t> table:</a:t>
             </a:r>
           </a:p>
           <a:p>
@@ -5910,15 +5890,7 @@
             </a:pPr>
             <a:r>
               <a:rPr lang="en-US" sz="2400" dirty="0" smtClean="0"/>
-              <a:t>Relational databases are synonymous to </a:t>
-            </a:r>
-            <a:r>
-              <a:rPr lang="en-US" sz="2400" dirty="0" smtClean="0"/>
-              <a:t>SQL and </a:t>
-            </a:r>
-            <a:r>
-              <a:rPr lang="en-US" sz="2400" dirty="0" smtClean="0"/>
-              <a:t>represent the data as tables with rows and columns </a:t>
+              <a:t>Relational databases are synonymous to SQL and represent the data as tables with rows and columns </a:t>
             </a:r>
           </a:p>
           <a:p>
@@ -6543,13 +6515,8 @@
             </a:pPr>
             <a:r>
               <a:rPr lang="en-US" sz="2400" dirty="0" smtClean="0"/>
-              <a:t>Tutorial: introduction to </a:t>
-            </a:r>
-            <a:r>
-              <a:rPr lang="en-US" sz="2400" dirty="0" smtClean="0"/>
-              <a:t>MySQL</a:t>
-            </a:r>
-            <a:endParaRPr lang="en-US" sz="2400" dirty="0" smtClean="0"/>
+              <a:t>Tutorial: introduction to MySQL</a:t>
+            </a:r>
           </a:p>
         </p:txBody>
       </p:sp>
@@ -12588,11 +12555,7 @@
           <a:p>
             <a:r>
               <a:rPr lang="en-US" sz="3800" dirty="0" smtClean="0"/>
-              <a:t>SQL: </a:t>
-            </a:r>
-            <a:r>
-              <a:rPr lang="en-US" sz="3800" dirty="0" smtClean="0"/>
-              <a:t>Database Schema</a:t>
+              <a:t>SQL: Database Schema</a:t>
             </a:r>
             <a:endParaRPr lang="en-US" sz="3800" dirty="0"/>
           </a:p>
@@ -12635,7 +12598,6 @@
               <a:rPr lang="en-US" sz="2200" dirty="0" smtClean="0"/>
               <a:t>A database schema provides layouts for data structures</a:t>
             </a:r>
-            <a:endParaRPr lang="en-US" sz="2200" dirty="0" smtClean="0"/>
           </a:p>
           <a:p>
             <a:pPr>
@@ -12724,11 +12686,7 @@
             </a:r>
             <a:r>
               <a:rPr lang="en-US" sz="2200" dirty="0" smtClean="0"/>
-              <a:t>table </a:t>
-            </a:r>
-            <a:r>
-              <a:rPr lang="en-US" sz="2200" dirty="0" smtClean="0"/>
-              <a:t>to the left there are 5 columns with defined datatypes, e.g. id is </a:t>
+              <a:t>table to the left there are 5 columns with defined datatypes, e.g. id is </a:t>
             </a:r>
             <a:r>
               <a:rPr lang="en-US" sz="2200" i="1" dirty="0" err="1" smtClean="0"/>
@@ -12753,11 +12711,7 @@
             </a:pPr>
             <a:r>
               <a:rPr lang="en-US" sz="2200" dirty="0" smtClean="0"/>
-              <a:t>In </a:t>
-            </a:r>
-            <a:r>
-              <a:rPr lang="en-US" sz="2200" dirty="0" smtClean="0"/>
-              <a:t>the </a:t>
+              <a:t>In the </a:t>
             </a:r>
             <a:r>
               <a:rPr lang="en-US" sz="2200" b="1" dirty="0" smtClean="0"/>
@@ -12773,11 +12727,7 @@
             </a:r>
             <a:r>
               <a:rPr lang="en-US" sz="2200" dirty="0" smtClean="0"/>
-              <a:t>table to the </a:t>
-            </a:r>
-            <a:r>
-              <a:rPr lang="en-US" sz="2200" dirty="0" smtClean="0"/>
-              <a:t>right there are 3 columns with strings</a:t>
+              <a:t>table to the right there are 3 columns with strings</a:t>
             </a:r>
             <a:endParaRPr lang="en-US" sz="2400" dirty="0"/>
           </a:p>
@@ -14906,21 +14856,8 @@
             </a:pPr>
             <a:r>
               <a:rPr lang="en-US" sz="2400" dirty="0" smtClean="0"/>
-              <a:t>A foreign key is a column in a table that links </a:t>
-            </a:r>
-            <a:r>
-              <a:rPr lang="en-US" sz="2400" dirty="0" smtClean="0"/>
-              <a:t>it</a:t>
-            </a:r>
-            <a:r>
-              <a:rPr lang="en-US" sz="2400" dirty="0" smtClean="0"/>
-              <a:t> to </a:t>
-            </a:r>
-            <a:r>
-              <a:rPr lang="en-US" sz="2400" dirty="0" smtClean="0"/>
-              <a:t>the primary key of another table</a:t>
-            </a:r>
-            <a:endParaRPr lang="en-US" sz="2400" dirty="0" smtClean="0"/>
+              <a:t>A foreign key is a column in a table that links it to the primary key of another table</a:t>
+            </a:r>
           </a:p>
           <a:p>
             <a:pPr>

</xml_diff>